<commit_message>
modified spatial diagram with more detail
</commit_message>
<xml_diff>
--- a/figures/pvr.pptx
+++ b/figures/pvr.pptx
@@ -104,6 +104,11 @@
       </a:defRPr>
     </a:lvl9pPr>
   </p:defaultTextStyle>
+  <p:extLst>
+    <p:ext uri="{EFAFB233-063F-42B5-8137-9DF3F51BA10A}">
+      <p15:sldGuideLst xmlns:p15="http://schemas.microsoft.com/office/powerpoint/2012/main"/>
+    </p:ext>
+  </p:extLst>
 </p:presentation>
 </file>
 
@@ -4277,6 +4282,1044 @@
       </p:grpSp>
       <p:grpSp>
         <p:nvGrpSpPr>
+          <p:cNvPr id="49" name="Group 48">
+            <a:extLst>
+              <a:ext uri="{FF2B5EF4-FFF2-40B4-BE49-F238E27FC236}">
+                <a16:creationId xmlns:a16="http://schemas.microsoft.com/office/drawing/2014/main" id="{CD206267-3200-2329-1C86-AF8F325A51D9}"/>
+              </a:ext>
+            </a:extLst>
+          </p:cNvPr>
+          <p:cNvGrpSpPr/>
+          <p:nvPr/>
+        </p:nvGrpSpPr>
+        <p:grpSpPr>
+          <a:xfrm>
+            <a:off x="4839024" y="2589144"/>
+            <a:ext cx="653122" cy="2700752"/>
+            <a:chOff x="2923685" y="1288471"/>
+            <a:chExt cx="627293" cy="2700752"/>
+          </a:xfrm>
+        </p:grpSpPr>
+        <p:sp>
+          <p:nvSpPr>
+            <p:cNvPr id="50" name="TextBox 49">
+              <a:extLst>
+                <a:ext uri="{FF2B5EF4-FFF2-40B4-BE49-F238E27FC236}">
+                  <a16:creationId xmlns:a16="http://schemas.microsoft.com/office/drawing/2014/main" id="{2E8B8498-BB62-E6D6-A037-A8AAD2E8507A}"/>
+                </a:ext>
+              </a:extLst>
+            </p:cNvPr>
+            <p:cNvSpPr txBox="1"/>
+            <p:nvPr/>
+          </p:nvSpPr>
+          <p:spPr>
+            <a:xfrm>
+              <a:off x="2923685" y="1288471"/>
+              <a:ext cx="623454" cy="461665"/>
+            </a:xfrm>
+            <a:prstGeom prst="rect">
+              <a:avLst/>
+            </a:prstGeom>
+            <a:noFill/>
+          </p:spPr>
+          <p:txBody>
+            <a:bodyPr wrap="square" rtlCol="0">
+              <a:spAutoFit/>
+            </a:bodyPr>
+            <a:lstStyle/>
+            <a:p>
+              <a:pPr algn="ctr"/>
+              <a:r>
+                <a:rPr lang="en-US" sz="2400" b="1" dirty="0">
+                  <a:ln>
+                    <a:solidFill>
+                      <a:schemeClr val="tx1"/>
+                    </a:solidFill>
+                  </a:ln>
+                  <a:solidFill>
+                    <a:srgbClr val="008B45"/>
+                  </a:solidFill>
+                </a:rPr>
+                <a:t>ME</a:t>
+              </a:r>
+            </a:p>
+          </p:txBody>
+        </p:sp>
+        <p:sp>
+          <p:nvSpPr>
+            <p:cNvPr id="51" name="TextBox 50">
+              <a:extLst>
+                <a:ext uri="{FF2B5EF4-FFF2-40B4-BE49-F238E27FC236}">
+                  <a16:creationId xmlns:a16="http://schemas.microsoft.com/office/drawing/2014/main" id="{A1691DC0-EA13-5ADB-B832-0D51B66B63AC}"/>
+                </a:ext>
+              </a:extLst>
+            </p:cNvPr>
+            <p:cNvSpPr txBox="1"/>
+            <p:nvPr/>
+          </p:nvSpPr>
+          <p:spPr>
+            <a:xfrm>
+              <a:off x="2923685" y="3527558"/>
+              <a:ext cx="623454" cy="461665"/>
+            </a:xfrm>
+            <a:prstGeom prst="rect">
+              <a:avLst/>
+            </a:prstGeom>
+            <a:noFill/>
+          </p:spPr>
+          <p:txBody>
+            <a:bodyPr wrap="square" rtlCol="0">
+              <a:spAutoFit/>
+            </a:bodyPr>
+            <a:lstStyle/>
+            <a:p>
+              <a:pPr algn="ctr"/>
+              <a:r>
+                <a:rPr lang="en-US" sz="2400" b="1" dirty="0">
+                  <a:ln>
+                    <a:solidFill>
+                      <a:schemeClr val="tx1"/>
+                    </a:solidFill>
+                  </a:ln>
+                </a:rPr>
+                <a:t>HE</a:t>
+              </a:r>
+            </a:p>
+          </p:txBody>
+        </p:sp>
+        <p:sp>
+          <p:nvSpPr>
+            <p:cNvPr id="52" name="TextBox 51">
+              <a:extLst>
+                <a:ext uri="{FF2B5EF4-FFF2-40B4-BE49-F238E27FC236}">
+                  <a16:creationId xmlns:a16="http://schemas.microsoft.com/office/drawing/2014/main" id="{02917354-2C4A-5149-CC86-464DC898EE72}"/>
+                </a:ext>
+              </a:extLst>
+            </p:cNvPr>
+            <p:cNvSpPr txBox="1"/>
+            <p:nvPr/>
+          </p:nvSpPr>
+          <p:spPr>
+            <a:xfrm>
+              <a:off x="2927524" y="2390593"/>
+              <a:ext cx="623454" cy="461665"/>
+            </a:xfrm>
+            <a:prstGeom prst="rect">
+              <a:avLst/>
+            </a:prstGeom>
+            <a:noFill/>
+          </p:spPr>
+          <p:txBody>
+            <a:bodyPr wrap="square" rtlCol="0">
+              <a:spAutoFit/>
+            </a:bodyPr>
+            <a:lstStyle/>
+            <a:p>
+              <a:pPr algn="ctr"/>
+              <a:r>
+                <a:rPr lang="en-US" sz="2400" b="1" dirty="0">
+                  <a:ln>
+                    <a:solidFill>
+                      <a:schemeClr val="tx1"/>
+                    </a:solidFill>
+                  </a:ln>
+                  <a:solidFill>
+                    <a:srgbClr val="EE6A50"/>
+                  </a:solidFill>
+                </a:rPr>
+                <a:t>LE</a:t>
+              </a:r>
+            </a:p>
+          </p:txBody>
+        </p:sp>
+      </p:grpSp>
+      <p:grpSp>
+        <p:nvGrpSpPr>
+          <p:cNvPr id="53" name="Group 52">
+            <a:extLst>
+              <a:ext uri="{FF2B5EF4-FFF2-40B4-BE49-F238E27FC236}">
+                <a16:creationId xmlns:a16="http://schemas.microsoft.com/office/drawing/2014/main" id="{9F235338-93A2-121E-5967-8316D4C089F0}"/>
+              </a:ext>
+            </a:extLst>
+          </p:cNvPr>
+          <p:cNvGrpSpPr/>
+          <p:nvPr/>
+        </p:nvGrpSpPr>
+        <p:grpSpPr>
+          <a:xfrm rot="16200000">
+            <a:off x="8548340" y="355773"/>
+            <a:ext cx="465504" cy="2980411"/>
+            <a:chOff x="2973801" y="1176799"/>
+            <a:chExt cx="465504" cy="2862543"/>
+          </a:xfrm>
+        </p:grpSpPr>
+        <p:sp>
+          <p:nvSpPr>
+            <p:cNvPr id="54" name="TextBox 53">
+              <a:extLst>
+                <a:ext uri="{FF2B5EF4-FFF2-40B4-BE49-F238E27FC236}">
+                  <a16:creationId xmlns:a16="http://schemas.microsoft.com/office/drawing/2014/main" id="{86D78F30-77F6-71E3-BECC-AC10C7A5ECA7}"/>
+                </a:ext>
+              </a:extLst>
+            </p:cNvPr>
+            <p:cNvSpPr txBox="1"/>
+            <p:nvPr/>
+          </p:nvSpPr>
+          <p:spPr>
+            <a:xfrm rot="5400000">
+              <a:off x="2892908" y="1257693"/>
+              <a:ext cx="623454" cy="461665"/>
+            </a:xfrm>
+            <a:prstGeom prst="rect">
+              <a:avLst/>
+            </a:prstGeom>
+            <a:noFill/>
+          </p:spPr>
+          <p:txBody>
+            <a:bodyPr wrap="square" rtlCol="0">
+              <a:spAutoFit/>
+            </a:bodyPr>
+            <a:lstStyle/>
+            <a:p>
+              <a:pPr algn="ctr"/>
+              <a:r>
+                <a:rPr lang="en-US" sz="2400" b="1" dirty="0">
+                  <a:ln>
+                    <a:solidFill>
+                      <a:schemeClr val="tx1"/>
+                    </a:solidFill>
+                  </a:ln>
+                  <a:solidFill>
+                    <a:srgbClr val="551A8B"/>
+                  </a:solidFill>
+                </a:rPr>
+                <a:t>ME</a:t>
+              </a:r>
+            </a:p>
+          </p:txBody>
+        </p:sp>
+        <p:sp>
+          <p:nvSpPr>
+            <p:cNvPr id="55" name="TextBox 54">
+              <a:extLst>
+                <a:ext uri="{FF2B5EF4-FFF2-40B4-BE49-F238E27FC236}">
+                  <a16:creationId xmlns:a16="http://schemas.microsoft.com/office/drawing/2014/main" id="{974EC33B-E6CB-5FF2-D2EB-0B25E36E13AC}"/>
+                </a:ext>
+              </a:extLst>
+            </p:cNvPr>
+            <p:cNvSpPr txBox="1"/>
+            <p:nvPr/>
+          </p:nvSpPr>
+          <p:spPr>
+            <a:xfrm rot="5400000">
+              <a:off x="2892907" y="3496782"/>
+              <a:ext cx="623454" cy="461665"/>
+            </a:xfrm>
+            <a:prstGeom prst="rect">
+              <a:avLst/>
+            </a:prstGeom>
+            <a:noFill/>
+          </p:spPr>
+          <p:txBody>
+            <a:bodyPr wrap="square" rtlCol="0">
+              <a:spAutoFit/>
+            </a:bodyPr>
+            <a:lstStyle/>
+            <a:p>
+              <a:pPr algn="ctr"/>
+              <a:r>
+                <a:rPr lang="en-US" sz="2400" b="1" dirty="0">
+                  <a:ln>
+                    <a:solidFill>
+                      <a:schemeClr val="tx1"/>
+                    </a:solidFill>
+                  </a:ln>
+                  <a:solidFill>
+                    <a:srgbClr val="4F94CD"/>
+                  </a:solidFill>
+                </a:rPr>
+                <a:t>HE</a:t>
+              </a:r>
+            </a:p>
+          </p:txBody>
+        </p:sp>
+        <p:sp>
+          <p:nvSpPr>
+            <p:cNvPr id="56" name="TextBox 55">
+              <a:extLst>
+                <a:ext uri="{FF2B5EF4-FFF2-40B4-BE49-F238E27FC236}">
+                  <a16:creationId xmlns:a16="http://schemas.microsoft.com/office/drawing/2014/main" id="{57E9C646-CACC-D32C-C79D-5CD20FD139FD}"/>
+                </a:ext>
+              </a:extLst>
+            </p:cNvPr>
+            <p:cNvSpPr txBox="1"/>
+            <p:nvPr/>
+          </p:nvSpPr>
+          <p:spPr>
+            <a:xfrm rot="5400000">
+              <a:off x="2896746" y="2359816"/>
+              <a:ext cx="623454" cy="461665"/>
+            </a:xfrm>
+            <a:prstGeom prst="rect">
+              <a:avLst/>
+            </a:prstGeom>
+            <a:noFill/>
+          </p:spPr>
+          <p:txBody>
+            <a:bodyPr wrap="square" rtlCol="0">
+              <a:spAutoFit/>
+            </a:bodyPr>
+            <a:lstStyle/>
+            <a:p>
+              <a:pPr algn="ctr"/>
+              <a:r>
+                <a:rPr lang="en-US" sz="2400" b="1" dirty="0">
+                  <a:ln>
+                    <a:solidFill>
+                      <a:schemeClr val="tx1"/>
+                    </a:solidFill>
+                  </a:ln>
+                  <a:solidFill>
+                    <a:srgbClr val="551A8B"/>
+                  </a:solidFill>
+                </a:rPr>
+                <a:t>LE</a:t>
+              </a:r>
+            </a:p>
+          </p:txBody>
+        </p:sp>
+      </p:grpSp>
+      <p:grpSp>
+        <p:nvGrpSpPr>
+          <p:cNvPr id="57" name="Group 56">
+            <a:extLst>
+              <a:ext uri="{FF2B5EF4-FFF2-40B4-BE49-F238E27FC236}">
+                <a16:creationId xmlns:a16="http://schemas.microsoft.com/office/drawing/2014/main" id="{5AE14666-8080-387B-FEC4-84F5C8F99A5B}"/>
+              </a:ext>
+            </a:extLst>
+          </p:cNvPr>
+          <p:cNvGrpSpPr/>
+          <p:nvPr/>
+        </p:nvGrpSpPr>
+        <p:grpSpPr>
+          <a:xfrm rot="16200000">
+            <a:off x="7983018" y="3192724"/>
+            <a:ext cx="465504" cy="2980411"/>
+            <a:chOff x="2973801" y="1176799"/>
+            <a:chExt cx="465504" cy="2862543"/>
+          </a:xfrm>
+        </p:grpSpPr>
+        <p:sp>
+          <p:nvSpPr>
+            <p:cNvPr id="58" name="TextBox 57">
+              <a:extLst>
+                <a:ext uri="{FF2B5EF4-FFF2-40B4-BE49-F238E27FC236}">
+                  <a16:creationId xmlns:a16="http://schemas.microsoft.com/office/drawing/2014/main" id="{D1E6E0B4-B646-198D-9B86-AAEA85570C4B}"/>
+                </a:ext>
+              </a:extLst>
+            </p:cNvPr>
+            <p:cNvSpPr txBox="1"/>
+            <p:nvPr/>
+          </p:nvSpPr>
+          <p:spPr>
+            <a:xfrm rot="5400000">
+              <a:off x="2892907" y="1257693"/>
+              <a:ext cx="623454" cy="461665"/>
+            </a:xfrm>
+            <a:prstGeom prst="rect">
+              <a:avLst/>
+            </a:prstGeom>
+            <a:noFill/>
+          </p:spPr>
+          <p:txBody>
+            <a:bodyPr wrap="square" rtlCol="0">
+              <a:spAutoFit/>
+            </a:bodyPr>
+            <a:lstStyle/>
+            <a:p>
+              <a:pPr algn="ctr"/>
+              <a:r>
+                <a:rPr lang="en-US" sz="2400" b="1" dirty="0">
+                  <a:ln>
+                    <a:solidFill>
+                      <a:schemeClr val="tx1"/>
+                    </a:solidFill>
+                  </a:ln>
+                  <a:solidFill>
+                    <a:srgbClr val="EE6A50"/>
+                  </a:solidFill>
+                </a:rPr>
+                <a:t>HE</a:t>
+              </a:r>
+            </a:p>
+          </p:txBody>
+        </p:sp>
+        <p:sp>
+          <p:nvSpPr>
+            <p:cNvPr id="59" name="TextBox 58">
+              <a:extLst>
+                <a:ext uri="{FF2B5EF4-FFF2-40B4-BE49-F238E27FC236}">
+                  <a16:creationId xmlns:a16="http://schemas.microsoft.com/office/drawing/2014/main" id="{49CFD952-0F6E-5D47-9DAC-98781654DE1C}"/>
+                </a:ext>
+              </a:extLst>
+            </p:cNvPr>
+            <p:cNvSpPr txBox="1"/>
+            <p:nvPr/>
+          </p:nvSpPr>
+          <p:spPr>
+            <a:xfrm rot="5400000">
+              <a:off x="2892907" y="3496782"/>
+              <a:ext cx="623454" cy="461665"/>
+            </a:xfrm>
+            <a:prstGeom prst="rect">
+              <a:avLst/>
+            </a:prstGeom>
+            <a:noFill/>
+          </p:spPr>
+          <p:txBody>
+            <a:bodyPr wrap="square" rtlCol="0">
+              <a:spAutoFit/>
+            </a:bodyPr>
+            <a:lstStyle/>
+            <a:p>
+              <a:pPr algn="ctr"/>
+              <a:r>
+                <a:rPr lang="en-US" sz="2400" b="1" dirty="0">
+                  <a:ln>
+                    <a:solidFill>
+                      <a:schemeClr val="tx1"/>
+                    </a:solidFill>
+                  </a:ln>
+                  <a:solidFill>
+                    <a:srgbClr val="4F94CD"/>
+                  </a:solidFill>
+                </a:rPr>
+                <a:t>ME</a:t>
+              </a:r>
+            </a:p>
+          </p:txBody>
+        </p:sp>
+        <p:sp>
+          <p:nvSpPr>
+            <p:cNvPr id="60" name="TextBox 59">
+              <a:extLst>
+                <a:ext uri="{FF2B5EF4-FFF2-40B4-BE49-F238E27FC236}">
+                  <a16:creationId xmlns:a16="http://schemas.microsoft.com/office/drawing/2014/main" id="{284E9369-026B-CC2B-E179-A6256B60D586}"/>
+                </a:ext>
+              </a:extLst>
+            </p:cNvPr>
+            <p:cNvSpPr txBox="1"/>
+            <p:nvPr/>
+          </p:nvSpPr>
+          <p:spPr>
+            <a:xfrm rot="5400000">
+              <a:off x="2896746" y="2359816"/>
+              <a:ext cx="623454" cy="461665"/>
+            </a:xfrm>
+            <a:prstGeom prst="rect">
+              <a:avLst/>
+            </a:prstGeom>
+            <a:noFill/>
+          </p:spPr>
+          <p:txBody>
+            <a:bodyPr wrap="square" rtlCol="0">
+              <a:spAutoFit/>
+            </a:bodyPr>
+            <a:lstStyle/>
+            <a:p>
+              <a:pPr algn="ctr"/>
+              <a:r>
+                <a:rPr lang="en-US" sz="2400" b="1" dirty="0">
+                  <a:ln>
+                    <a:solidFill>
+                      <a:schemeClr val="tx1"/>
+                    </a:solidFill>
+                  </a:ln>
+                  <a:solidFill>
+                    <a:srgbClr val="EE6A50"/>
+                  </a:solidFill>
+                </a:rPr>
+                <a:t>LE</a:t>
+              </a:r>
+            </a:p>
+          </p:txBody>
+        </p:sp>
+      </p:grpSp>
+      <p:sp>
+        <p:nvSpPr>
+          <p:cNvPr id="61" name="TextBox 60">
+            <a:extLst>
+              <a:ext uri="{FF2B5EF4-FFF2-40B4-BE49-F238E27FC236}">
+                <a16:creationId xmlns:a16="http://schemas.microsoft.com/office/drawing/2014/main" id="{F969892B-537C-32BF-053A-ED80BBE3C9DB}"/>
+              </a:ext>
+            </a:extLst>
+          </p:cNvPr>
+          <p:cNvSpPr txBox="1"/>
+          <p:nvPr/>
+        </p:nvSpPr>
+        <p:spPr>
+          <a:xfrm>
+            <a:off x="4471534" y="967800"/>
+            <a:ext cx="3248932" cy="584775"/>
+          </a:xfrm>
+          <a:prstGeom prst="rect">
+            <a:avLst/>
+          </a:prstGeom>
+          <a:noFill/>
+        </p:spPr>
+        <p:txBody>
+          <a:bodyPr wrap="square" rtlCol="0">
+            <a:spAutoFit/>
+          </a:bodyPr>
+          <a:lstStyle/>
+          <a:p>
+            <a:pPr algn="ctr"/>
+            <a:r>
+              <a:rPr lang="en-US" sz="3200" b="1" dirty="0"/>
+              <a:t>Inshore</a:t>
+            </a:r>
+          </a:p>
+        </p:txBody>
+      </p:sp>
+      <p:sp>
+        <p:nvSpPr>
+          <p:cNvPr id="62" name="TextBox 61">
+            <a:extLst>
+              <a:ext uri="{FF2B5EF4-FFF2-40B4-BE49-F238E27FC236}">
+                <a16:creationId xmlns:a16="http://schemas.microsoft.com/office/drawing/2014/main" id="{2F083685-B08B-2C9C-22A8-18D1CB73875B}"/>
+              </a:ext>
+            </a:extLst>
+          </p:cNvPr>
+          <p:cNvSpPr txBox="1"/>
+          <p:nvPr/>
+        </p:nvSpPr>
+        <p:spPr>
+          <a:xfrm>
+            <a:off x="4554479" y="5868845"/>
+            <a:ext cx="3248932" cy="584775"/>
+          </a:xfrm>
+          <a:prstGeom prst="rect">
+            <a:avLst/>
+          </a:prstGeom>
+          <a:noFill/>
+        </p:spPr>
+        <p:txBody>
+          <a:bodyPr wrap="square" rtlCol="0">
+            <a:spAutoFit/>
+          </a:bodyPr>
+          <a:lstStyle/>
+          <a:p>
+            <a:pPr algn="ctr"/>
+            <a:r>
+              <a:rPr lang="en-US" sz="3200" b="1" dirty="0"/>
+              <a:t>Offshore</a:t>
+            </a:r>
+          </a:p>
+        </p:txBody>
+      </p:sp>
+      <p:sp>
+        <p:nvSpPr>
+          <p:cNvPr id="63" name="TextBox 62">
+            <a:extLst>
+              <a:ext uri="{FF2B5EF4-FFF2-40B4-BE49-F238E27FC236}">
+                <a16:creationId xmlns:a16="http://schemas.microsoft.com/office/drawing/2014/main" id="{157FD705-9E0A-8AA2-5622-61B2F9B10DFF}"/>
+              </a:ext>
+            </a:extLst>
+          </p:cNvPr>
+          <p:cNvSpPr txBox="1"/>
+          <p:nvPr/>
+        </p:nvSpPr>
+        <p:spPr>
+          <a:xfrm>
+            <a:off x="-237420" y="3028418"/>
+            <a:ext cx="3141943" cy="584775"/>
+          </a:xfrm>
+          <a:prstGeom prst="rect">
+            <a:avLst/>
+          </a:prstGeom>
+          <a:noFill/>
+        </p:spPr>
+        <p:txBody>
+          <a:bodyPr wrap="square" rtlCol="0">
+            <a:spAutoFit/>
+          </a:bodyPr>
+          <a:lstStyle/>
+          <a:p>
+            <a:pPr algn="ctr"/>
+            <a:r>
+              <a:rPr lang="en-US" sz="3200" b="1" dirty="0"/>
+              <a:t>West</a:t>
+            </a:r>
+          </a:p>
+        </p:txBody>
+      </p:sp>
+      <p:sp>
+        <p:nvSpPr>
+          <p:cNvPr id="64" name="TextBox 63">
+            <a:extLst>
+              <a:ext uri="{FF2B5EF4-FFF2-40B4-BE49-F238E27FC236}">
+                <a16:creationId xmlns:a16="http://schemas.microsoft.com/office/drawing/2014/main" id="{2AE7439E-4651-E4C6-4DEC-086E776F5CD8}"/>
+              </a:ext>
+            </a:extLst>
+          </p:cNvPr>
+          <p:cNvSpPr txBox="1"/>
+          <p:nvPr/>
+        </p:nvSpPr>
+        <p:spPr>
+          <a:xfrm>
+            <a:off x="9543911" y="3026388"/>
+            <a:ext cx="3248932" cy="584775"/>
+          </a:xfrm>
+          <a:prstGeom prst="rect">
+            <a:avLst/>
+          </a:prstGeom>
+          <a:noFill/>
+        </p:spPr>
+        <p:txBody>
+          <a:bodyPr wrap="square" rtlCol="0">
+            <a:spAutoFit/>
+          </a:bodyPr>
+          <a:lstStyle/>
+          <a:p>
+            <a:pPr algn="ctr"/>
+            <a:r>
+              <a:rPr lang="en-US" sz="3200" b="1" dirty="0"/>
+              <a:t>East</a:t>
+            </a:r>
+          </a:p>
+        </p:txBody>
+      </p:sp>
+      <p:sp>
+        <p:nvSpPr>
+          <p:cNvPr id="65" name="TextBox 64">
+            <a:extLst>
+              <a:ext uri="{FF2B5EF4-FFF2-40B4-BE49-F238E27FC236}">
+                <a16:creationId xmlns:a16="http://schemas.microsoft.com/office/drawing/2014/main" id="{6FACAE33-7D1A-E5DF-A23F-BB06434460AB}"/>
+              </a:ext>
+            </a:extLst>
+          </p:cNvPr>
+          <p:cNvSpPr txBox="1"/>
+          <p:nvPr/>
+        </p:nvSpPr>
+        <p:spPr>
+          <a:xfrm>
+            <a:off x="2101659" y="233344"/>
+            <a:ext cx="3248932" cy="646331"/>
+          </a:xfrm>
+          <a:prstGeom prst="rect">
+            <a:avLst/>
+          </a:prstGeom>
+          <a:noFill/>
+        </p:spPr>
+        <p:txBody>
+          <a:bodyPr wrap="square" rtlCol="0">
+            <a:spAutoFit/>
+          </a:bodyPr>
+          <a:lstStyle/>
+          <a:p>
+            <a:pPr algn="ctr"/>
+            <a:r>
+              <a:rPr lang="en-US" sz="3600" b="1" dirty="0"/>
+              <a:t>Perpendicular</a:t>
+            </a:r>
+          </a:p>
+        </p:txBody>
+      </p:sp>
+      <p:sp>
+        <p:nvSpPr>
+          <p:cNvPr id="66" name="TextBox 65">
+            <a:extLst>
+              <a:ext uri="{FF2B5EF4-FFF2-40B4-BE49-F238E27FC236}">
+                <a16:creationId xmlns:a16="http://schemas.microsoft.com/office/drawing/2014/main" id="{1C4FE13F-9474-A513-C504-3BC3FBD176D6}"/>
+              </a:ext>
+            </a:extLst>
+          </p:cNvPr>
+          <p:cNvSpPr txBox="1"/>
+          <p:nvPr/>
+        </p:nvSpPr>
+        <p:spPr>
+          <a:xfrm>
+            <a:off x="7097688" y="233343"/>
+            <a:ext cx="3248932" cy="646331"/>
+          </a:xfrm>
+          <a:prstGeom prst="rect">
+            <a:avLst/>
+          </a:prstGeom>
+          <a:noFill/>
+        </p:spPr>
+        <p:txBody>
+          <a:bodyPr wrap="square" rtlCol="0">
+            <a:spAutoFit/>
+          </a:bodyPr>
+          <a:lstStyle/>
+          <a:p>
+            <a:pPr algn="ctr"/>
+            <a:r>
+              <a:rPr lang="en-US" sz="3600" b="1" dirty="0"/>
+              <a:t>Parallel</a:t>
+            </a:r>
+          </a:p>
+        </p:txBody>
+      </p:sp>
+      <p:sp>
+        <p:nvSpPr>
+          <p:cNvPr id="2" name="Right Brace 1">
+            <a:extLst>
+              <a:ext uri="{FF2B5EF4-FFF2-40B4-BE49-F238E27FC236}">
+                <a16:creationId xmlns:a16="http://schemas.microsoft.com/office/drawing/2014/main" id="{E9056A52-B786-A51E-6B0F-B9119CA92A7F}"/>
+              </a:ext>
+            </a:extLst>
+          </p:cNvPr>
+          <p:cNvSpPr/>
+          <p:nvPr/>
+        </p:nvSpPr>
+        <p:spPr>
+          <a:xfrm rot="5400000">
+            <a:off x="7947929" y="3548631"/>
+            <a:ext cx="425782" cy="3383955"/>
+          </a:xfrm>
+          <a:prstGeom prst="rightBrace">
+            <a:avLst>
+              <a:gd name="adj1" fmla="val 136885"/>
+              <a:gd name="adj2" fmla="val 47716"/>
+            </a:avLst>
+          </a:prstGeom>
+          <a:ln w="28575"/>
+        </p:spPr>
+        <p:style>
+          <a:lnRef idx="2">
+            <a:schemeClr val="dk1"/>
+          </a:lnRef>
+          <a:fillRef idx="0">
+            <a:schemeClr val="dk1"/>
+          </a:fillRef>
+          <a:effectRef idx="1">
+            <a:schemeClr val="dk1"/>
+          </a:effectRef>
+          <a:fontRef idx="minor">
+            <a:schemeClr val="tx1"/>
+          </a:fontRef>
+        </p:style>
+        <p:txBody>
+          <a:bodyPr rtlCol="0" anchor="ctr"/>
+          <a:lstStyle/>
+          <a:p>
+            <a:pPr algn="ctr"/>
+            <a:endParaRPr lang="en-US"/>
+          </a:p>
+        </p:txBody>
+      </p:sp>
+      <p:sp>
+        <p:nvSpPr>
+          <p:cNvPr id="3" name="TextBox 2">
+            <a:extLst>
+              <a:ext uri="{FF2B5EF4-FFF2-40B4-BE49-F238E27FC236}">
+                <a16:creationId xmlns:a16="http://schemas.microsoft.com/office/drawing/2014/main" id="{6B716CD7-9904-22C6-21B3-8E1F3AC1B228}"/>
+              </a:ext>
+            </a:extLst>
+          </p:cNvPr>
+          <p:cNvSpPr txBox="1"/>
+          <p:nvPr/>
+        </p:nvSpPr>
+        <p:spPr>
+          <a:xfrm>
+            <a:off x="7803411" y="5400822"/>
+            <a:ext cx="869769" cy="400110"/>
+          </a:xfrm>
+          <a:prstGeom prst="rect">
+            <a:avLst/>
+          </a:prstGeom>
+          <a:noFill/>
+        </p:spPr>
+        <p:txBody>
+          <a:bodyPr wrap="square" rtlCol="0">
+            <a:spAutoFit/>
+          </a:bodyPr>
+          <a:lstStyle/>
+          <a:p>
+            <a:pPr algn="ctr"/>
+            <a:r>
+              <a:rPr lang="en-US" sz="2000" b="1" dirty="0">
+                <a:ln>
+                  <a:solidFill>
+                    <a:schemeClr val="tx1"/>
+                  </a:solidFill>
+                </a:ln>
+              </a:rPr>
+              <a:t>48 m</a:t>
+            </a:r>
+          </a:p>
+        </p:txBody>
+      </p:sp>
+      <p:sp>
+        <p:nvSpPr>
+          <p:cNvPr id="18" name="Right Brace 17">
+            <a:extLst>
+              <a:ext uri="{FF2B5EF4-FFF2-40B4-BE49-F238E27FC236}">
+                <a16:creationId xmlns:a16="http://schemas.microsoft.com/office/drawing/2014/main" id="{959DF4D5-EBDF-523D-9E92-42022AE1A98C}"/>
+              </a:ext>
+            </a:extLst>
+          </p:cNvPr>
+          <p:cNvSpPr/>
+          <p:nvPr/>
+        </p:nvSpPr>
+        <p:spPr>
+          <a:xfrm>
+            <a:off x="9896341" y="3332474"/>
+            <a:ext cx="425782" cy="941533"/>
+          </a:xfrm>
+          <a:prstGeom prst="rightBrace">
+            <a:avLst>
+              <a:gd name="adj1" fmla="val 136885"/>
+              <a:gd name="adj2" fmla="val 47716"/>
+            </a:avLst>
+          </a:prstGeom>
+          <a:ln w="28575"/>
+        </p:spPr>
+        <p:style>
+          <a:lnRef idx="2">
+            <a:schemeClr val="dk1"/>
+          </a:lnRef>
+          <a:fillRef idx="0">
+            <a:schemeClr val="dk1"/>
+          </a:fillRef>
+          <a:effectRef idx="1">
+            <a:schemeClr val="dk1"/>
+          </a:effectRef>
+          <a:fontRef idx="minor">
+            <a:schemeClr val="tx1"/>
+          </a:fontRef>
+        </p:style>
+        <p:txBody>
+          <a:bodyPr rtlCol="0" anchor="ctr"/>
+          <a:lstStyle/>
+          <a:p>
+            <a:pPr algn="ctr"/>
+            <a:endParaRPr lang="en-US"/>
+          </a:p>
+        </p:txBody>
+      </p:sp>
+      <p:sp>
+        <p:nvSpPr>
+          <p:cNvPr id="19" name="TextBox 18">
+            <a:extLst>
+              <a:ext uri="{FF2B5EF4-FFF2-40B4-BE49-F238E27FC236}">
+                <a16:creationId xmlns:a16="http://schemas.microsoft.com/office/drawing/2014/main" id="{DB1F2074-88E9-CB03-427D-4B78CD0AFA71}"/>
+              </a:ext>
+            </a:extLst>
+          </p:cNvPr>
+          <p:cNvSpPr txBox="1"/>
+          <p:nvPr/>
+        </p:nvSpPr>
+        <p:spPr>
+          <a:xfrm>
+            <a:off x="10233031" y="3590278"/>
+            <a:ext cx="910847" cy="400110"/>
+          </a:xfrm>
+          <a:prstGeom prst="rect">
+            <a:avLst/>
+          </a:prstGeom>
+          <a:noFill/>
+        </p:spPr>
+        <p:txBody>
+          <a:bodyPr wrap="square" rtlCol="0">
+            <a:spAutoFit/>
+          </a:bodyPr>
+          <a:lstStyle/>
+          <a:p>
+            <a:pPr algn="ctr"/>
+            <a:r>
+              <a:rPr lang="en-US" sz="2000" b="1" dirty="0">
+                <a:ln>
+                  <a:solidFill>
+                    <a:schemeClr val="tx1"/>
+                  </a:solidFill>
+                </a:ln>
+              </a:rPr>
+              <a:t>16 m</a:t>
+            </a:r>
+          </a:p>
+        </p:txBody>
+      </p:sp>
+      <p:sp>
+        <p:nvSpPr>
+          <p:cNvPr id="35" name="Rectangle 34">
+            <a:extLst>
+              <a:ext uri="{FF2B5EF4-FFF2-40B4-BE49-F238E27FC236}">
+                <a16:creationId xmlns:a16="http://schemas.microsoft.com/office/drawing/2014/main" id="{6CEB0E51-D2F8-3053-6267-EE7264C7B8B3}"/>
+              </a:ext>
+            </a:extLst>
+          </p:cNvPr>
+          <p:cNvSpPr>
+            <a:spLocks/>
+          </p:cNvSpPr>
+          <p:nvPr/>
+        </p:nvSpPr>
+        <p:spPr>
+          <a:xfrm rot="5400000">
+            <a:off x="2606502" y="2136578"/>
+            <a:ext cx="1124292" cy="152401"/>
+          </a:xfrm>
+          <a:prstGeom prst="rect">
+            <a:avLst/>
+          </a:prstGeom>
+          <a:solidFill>
+            <a:schemeClr val="tx1">
+              <a:lumMod val="75000"/>
+              <a:lumOff val="25000"/>
+            </a:schemeClr>
+          </a:solidFill>
+          <a:ln w="38100">
+            <a:solidFill>
+              <a:schemeClr val="tx1"/>
+            </a:solidFill>
+          </a:ln>
+        </p:spPr>
+        <p:style>
+          <a:lnRef idx="2">
+            <a:schemeClr val="accent1">
+              <a:shade val="15000"/>
+            </a:schemeClr>
+          </a:lnRef>
+          <a:fillRef idx="1">
+            <a:schemeClr val="accent1"/>
+          </a:fillRef>
+          <a:effectRef idx="0">
+            <a:schemeClr val="accent1"/>
+          </a:effectRef>
+          <a:fontRef idx="minor">
+            <a:schemeClr val="lt1"/>
+          </a:fontRef>
+        </p:style>
+        <p:txBody>
+          <a:bodyPr rtlCol="0" anchor="ctr"/>
+          <a:lstStyle/>
+          <a:p>
+            <a:pPr algn="ctr"/>
+            <a:endParaRPr lang="en-US"/>
+          </a:p>
+        </p:txBody>
+      </p:sp>
+      <p:sp>
+        <p:nvSpPr>
+          <p:cNvPr id="36" name="Rectangle 35">
+            <a:extLst>
+              <a:ext uri="{FF2B5EF4-FFF2-40B4-BE49-F238E27FC236}">
+                <a16:creationId xmlns:a16="http://schemas.microsoft.com/office/drawing/2014/main" id="{287ED6D5-B71D-B3ED-D79D-4B7F2392594B}"/>
+              </a:ext>
+            </a:extLst>
+          </p:cNvPr>
+          <p:cNvSpPr>
+            <a:spLocks/>
+          </p:cNvSpPr>
+          <p:nvPr/>
+        </p:nvSpPr>
+        <p:spPr>
+          <a:xfrm rot="5400000">
+            <a:off x="2603327" y="3270396"/>
+            <a:ext cx="1130643" cy="152401"/>
+          </a:xfrm>
+          <a:prstGeom prst="rect">
+            <a:avLst/>
+          </a:prstGeom>
+          <a:solidFill>
+            <a:schemeClr val="tx1">
+              <a:lumMod val="75000"/>
+              <a:lumOff val="25000"/>
+            </a:schemeClr>
+          </a:solidFill>
+          <a:ln w="38100">
+            <a:solidFill>
+              <a:schemeClr val="tx1"/>
+            </a:solidFill>
+          </a:ln>
+        </p:spPr>
+        <p:style>
+          <a:lnRef idx="2">
+            <a:schemeClr val="accent1">
+              <a:shade val="15000"/>
+            </a:schemeClr>
+          </a:lnRef>
+          <a:fillRef idx="1">
+            <a:schemeClr val="accent1"/>
+          </a:fillRef>
+          <a:effectRef idx="0">
+            <a:schemeClr val="accent1"/>
+          </a:effectRef>
+          <a:fontRef idx="minor">
+            <a:schemeClr val="lt1"/>
+          </a:fontRef>
+        </p:style>
+        <p:txBody>
+          <a:bodyPr rtlCol="0" anchor="ctr"/>
+          <a:lstStyle/>
+          <a:p>
+            <a:pPr algn="ctr"/>
+            <a:endParaRPr lang="en-US"/>
+          </a:p>
+        </p:txBody>
+      </p:sp>
+      <p:sp>
+        <p:nvSpPr>
+          <p:cNvPr id="67" name="Rectangle 66">
+            <a:extLst>
+              <a:ext uri="{FF2B5EF4-FFF2-40B4-BE49-F238E27FC236}">
+                <a16:creationId xmlns:a16="http://schemas.microsoft.com/office/drawing/2014/main" id="{352CE183-EC99-984E-BC46-4E8E352A57F7}"/>
+              </a:ext>
+            </a:extLst>
+          </p:cNvPr>
+          <p:cNvSpPr>
+            <a:spLocks/>
+          </p:cNvSpPr>
+          <p:nvPr/>
+        </p:nvSpPr>
+        <p:spPr>
+          <a:xfrm rot="5400000">
+            <a:off x="2604913" y="4399451"/>
+            <a:ext cx="1127467" cy="152401"/>
+          </a:xfrm>
+          <a:prstGeom prst="rect">
+            <a:avLst/>
+          </a:prstGeom>
+          <a:solidFill>
+            <a:schemeClr val="tx1">
+              <a:lumMod val="75000"/>
+              <a:lumOff val="25000"/>
+            </a:schemeClr>
+          </a:solidFill>
+          <a:ln w="38100">
+            <a:solidFill>
+              <a:schemeClr val="tx1"/>
+            </a:solidFill>
+          </a:ln>
+        </p:spPr>
+        <p:style>
+          <a:lnRef idx="2">
+            <a:schemeClr val="accent1">
+              <a:shade val="15000"/>
+            </a:schemeClr>
+          </a:lnRef>
+          <a:fillRef idx="1">
+            <a:schemeClr val="accent1"/>
+          </a:fillRef>
+          <a:effectRef idx="0">
+            <a:schemeClr val="accent1"/>
+          </a:effectRef>
+          <a:fontRef idx="minor">
+            <a:schemeClr val="lt1"/>
+          </a:fontRef>
+        </p:style>
+        <p:txBody>
+          <a:bodyPr rtlCol="0" anchor="ctr"/>
+          <a:lstStyle/>
+          <a:p>
+            <a:pPr algn="ctr"/>
+            <a:endParaRPr lang="en-US"/>
+          </a:p>
+        </p:txBody>
+      </p:sp>
+      <p:grpSp>
+        <p:nvGrpSpPr>
           <p:cNvPr id="23" name="Group 22">
             <a:extLst>
               <a:ext uri="{FF2B5EF4-FFF2-40B4-BE49-F238E27FC236}">
@@ -4431,6 +5474,675 @@
           </p:txBody>
         </p:sp>
       </p:grpSp>
+      <p:sp>
+        <p:nvSpPr>
+          <p:cNvPr id="68" name="Rectangle 67">
+            <a:extLst>
+              <a:ext uri="{FF2B5EF4-FFF2-40B4-BE49-F238E27FC236}">
+                <a16:creationId xmlns:a16="http://schemas.microsoft.com/office/drawing/2014/main" id="{A51FE04B-8C5E-DE55-0C86-0EC6621EEA52}"/>
+              </a:ext>
+            </a:extLst>
+          </p:cNvPr>
+          <p:cNvSpPr>
+            <a:spLocks/>
+          </p:cNvSpPr>
+          <p:nvPr/>
+        </p:nvSpPr>
+        <p:spPr>
+          <a:xfrm rot="5400000">
+            <a:off x="2011208" y="2138166"/>
+            <a:ext cx="1130643" cy="152401"/>
+          </a:xfrm>
+          <a:prstGeom prst="rect">
+            <a:avLst/>
+          </a:prstGeom>
+          <a:solidFill>
+            <a:srgbClr val="B2A138"/>
+          </a:solidFill>
+          <a:ln w="38100">
+            <a:solidFill>
+              <a:schemeClr val="tx1"/>
+            </a:solidFill>
+          </a:ln>
+        </p:spPr>
+        <p:style>
+          <a:lnRef idx="2">
+            <a:schemeClr val="accent1">
+              <a:shade val="15000"/>
+            </a:schemeClr>
+          </a:lnRef>
+          <a:fillRef idx="1">
+            <a:schemeClr val="accent1"/>
+          </a:fillRef>
+          <a:effectRef idx="0">
+            <a:schemeClr val="accent1"/>
+          </a:effectRef>
+          <a:fontRef idx="minor">
+            <a:schemeClr val="lt1"/>
+          </a:fontRef>
+        </p:style>
+        <p:txBody>
+          <a:bodyPr rtlCol="0" anchor="ctr"/>
+          <a:lstStyle/>
+          <a:p>
+            <a:pPr algn="ctr"/>
+            <a:endParaRPr lang="en-US"/>
+          </a:p>
+        </p:txBody>
+      </p:sp>
+      <p:sp>
+        <p:nvSpPr>
+          <p:cNvPr id="69" name="Rectangle 68">
+            <a:extLst>
+              <a:ext uri="{FF2B5EF4-FFF2-40B4-BE49-F238E27FC236}">
+                <a16:creationId xmlns:a16="http://schemas.microsoft.com/office/drawing/2014/main" id="{5E5889C6-0CDA-E4B6-2CC8-1CA2A900A573}"/>
+              </a:ext>
+            </a:extLst>
+          </p:cNvPr>
+          <p:cNvSpPr>
+            <a:spLocks/>
+          </p:cNvSpPr>
+          <p:nvPr/>
+        </p:nvSpPr>
+        <p:spPr>
+          <a:xfrm rot="5400000">
+            <a:off x="2011209" y="3268809"/>
+            <a:ext cx="1130643" cy="152401"/>
+          </a:xfrm>
+          <a:prstGeom prst="rect">
+            <a:avLst/>
+          </a:prstGeom>
+          <a:solidFill>
+            <a:srgbClr val="B2A138"/>
+          </a:solidFill>
+          <a:ln w="38100">
+            <a:solidFill>
+              <a:schemeClr val="tx1"/>
+            </a:solidFill>
+          </a:ln>
+        </p:spPr>
+        <p:style>
+          <a:lnRef idx="2">
+            <a:schemeClr val="accent1">
+              <a:shade val="15000"/>
+            </a:schemeClr>
+          </a:lnRef>
+          <a:fillRef idx="1">
+            <a:schemeClr val="accent1"/>
+          </a:fillRef>
+          <a:effectRef idx="0">
+            <a:schemeClr val="accent1"/>
+          </a:effectRef>
+          <a:fontRef idx="minor">
+            <a:schemeClr val="lt1"/>
+          </a:fontRef>
+        </p:style>
+        <p:txBody>
+          <a:bodyPr rtlCol="0" anchor="ctr"/>
+          <a:lstStyle/>
+          <a:p>
+            <a:pPr algn="ctr"/>
+            <a:endParaRPr lang="en-US"/>
+          </a:p>
+        </p:txBody>
+      </p:sp>
+      <p:sp>
+        <p:nvSpPr>
+          <p:cNvPr id="70" name="Rectangle 69">
+            <a:extLst>
+              <a:ext uri="{FF2B5EF4-FFF2-40B4-BE49-F238E27FC236}">
+                <a16:creationId xmlns:a16="http://schemas.microsoft.com/office/drawing/2014/main" id="{4019F8EE-4C44-BDFF-CDB5-325DF6FA5549}"/>
+              </a:ext>
+            </a:extLst>
+          </p:cNvPr>
+          <p:cNvSpPr>
+            <a:spLocks/>
+          </p:cNvSpPr>
+          <p:nvPr/>
+        </p:nvSpPr>
+        <p:spPr>
+          <a:xfrm rot="5400000">
+            <a:off x="2011208" y="4391638"/>
+            <a:ext cx="1130643" cy="152401"/>
+          </a:xfrm>
+          <a:prstGeom prst="rect">
+            <a:avLst/>
+          </a:prstGeom>
+          <a:solidFill>
+            <a:srgbClr val="B2A138"/>
+          </a:solidFill>
+          <a:ln w="38100">
+            <a:solidFill>
+              <a:schemeClr val="tx1"/>
+            </a:solidFill>
+          </a:ln>
+        </p:spPr>
+        <p:style>
+          <a:lnRef idx="2">
+            <a:schemeClr val="accent1">
+              <a:shade val="15000"/>
+            </a:schemeClr>
+          </a:lnRef>
+          <a:fillRef idx="1">
+            <a:schemeClr val="accent1"/>
+          </a:fillRef>
+          <a:effectRef idx="0">
+            <a:schemeClr val="accent1"/>
+          </a:effectRef>
+          <a:fontRef idx="minor">
+            <a:schemeClr val="lt1"/>
+          </a:fontRef>
+        </p:style>
+        <p:txBody>
+          <a:bodyPr rtlCol="0" anchor="ctr"/>
+          <a:lstStyle/>
+          <a:p>
+            <a:pPr algn="ctr"/>
+            <a:endParaRPr lang="en-US"/>
+          </a:p>
+        </p:txBody>
+      </p:sp>
+      <p:grpSp>
+        <p:nvGrpSpPr>
+          <p:cNvPr id="45" name="Group 44">
+            <a:extLst>
+              <a:ext uri="{FF2B5EF4-FFF2-40B4-BE49-F238E27FC236}">
+                <a16:creationId xmlns:a16="http://schemas.microsoft.com/office/drawing/2014/main" id="{CCB90112-247A-307C-DC58-7BD8DCFD5431}"/>
+              </a:ext>
+            </a:extLst>
+          </p:cNvPr>
+          <p:cNvGrpSpPr/>
+          <p:nvPr/>
+        </p:nvGrpSpPr>
+        <p:grpSpPr>
+          <a:xfrm>
+            <a:off x="1940298" y="2034921"/>
+            <a:ext cx="653330" cy="2677478"/>
+            <a:chOff x="2887697" y="1281830"/>
+            <a:chExt cx="627492" cy="2677478"/>
+          </a:xfrm>
+        </p:grpSpPr>
+        <p:sp>
+          <p:nvSpPr>
+            <p:cNvPr id="46" name="TextBox 45">
+              <a:extLst>
+                <a:ext uri="{FF2B5EF4-FFF2-40B4-BE49-F238E27FC236}">
+                  <a16:creationId xmlns:a16="http://schemas.microsoft.com/office/drawing/2014/main" id="{17E7AC71-F6BD-B0E1-1E0D-186B7CFFF65C}"/>
+                </a:ext>
+              </a:extLst>
+            </p:cNvPr>
+            <p:cNvSpPr txBox="1"/>
+            <p:nvPr/>
+          </p:nvSpPr>
+          <p:spPr>
+            <a:xfrm>
+              <a:off x="2887697" y="1281830"/>
+              <a:ext cx="623454" cy="461665"/>
+            </a:xfrm>
+            <a:prstGeom prst="rect">
+              <a:avLst/>
+            </a:prstGeom>
+            <a:noFill/>
+          </p:spPr>
+          <p:txBody>
+            <a:bodyPr wrap="square" rtlCol="0">
+              <a:spAutoFit/>
+            </a:bodyPr>
+            <a:lstStyle/>
+            <a:p>
+              <a:pPr algn="ctr"/>
+              <a:r>
+                <a:rPr lang="en-US" sz="2400" b="1" dirty="0">
+                  <a:ln>
+                    <a:solidFill>
+                      <a:schemeClr val="tx1"/>
+                    </a:solidFill>
+                  </a:ln>
+                  <a:solidFill>
+                    <a:srgbClr val="008B45"/>
+                  </a:solidFill>
+                </a:rPr>
+                <a:t>HE</a:t>
+              </a:r>
+            </a:p>
+          </p:txBody>
+        </p:sp>
+        <p:sp>
+          <p:nvSpPr>
+            <p:cNvPr id="47" name="TextBox 46">
+              <a:extLst>
+                <a:ext uri="{FF2B5EF4-FFF2-40B4-BE49-F238E27FC236}">
+                  <a16:creationId xmlns:a16="http://schemas.microsoft.com/office/drawing/2014/main" id="{FC6FB455-5B57-2FDE-DCE8-728134333EDF}"/>
+                </a:ext>
+              </a:extLst>
+            </p:cNvPr>
+            <p:cNvSpPr txBox="1"/>
+            <p:nvPr/>
+          </p:nvSpPr>
+          <p:spPr>
+            <a:xfrm>
+              <a:off x="2891735" y="3497643"/>
+              <a:ext cx="623454" cy="461665"/>
+            </a:xfrm>
+            <a:prstGeom prst="rect">
+              <a:avLst/>
+            </a:prstGeom>
+            <a:noFill/>
+          </p:spPr>
+          <p:txBody>
+            <a:bodyPr wrap="square" rtlCol="0">
+              <a:spAutoFit/>
+            </a:bodyPr>
+            <a:lstStyle/>
+            <a:p>
+              <a:pPr algn="ctr"/>
+              <a:r>
+                <a:rPr lang="en-US" sz="2400" b="1" dirty="0">
+                  <a:ln>
+                    <a:solidFill>
+                      <a:schemeClr val="tx1"/>
+                    </a:solidFill>
+                  </a:ln>
+                  <a:solidFill>
+                    <a:srgbClr val="EE6A50"/>
+                  </a:solidFill>
+                </a:rPr>
+                <a:t>ME</a:t>
+              </a:r>
+            </a:p>
+          </p:txBody>
+        </p:sp>
+        <p:sp>
+          <p:nvSpPr>
+            <p:cNvPr id="48" name="TextBox 47">
+              <a:extLst>
+                <a:ext uri="{FF2B5EF4-FFF2-40B4-BE49-F238E27FC236}">
+                  <a16:creationId xmlns:a16="http://schemas.microsoft.com/office/drawing/2014/main" id="{F36A2740-0823-E507-0B6C-913BADCE88BE}"/>
+                </a:ext>
+              </a:extLst>
+            </p:cNvPr>
+            <p:cNvSpPr txBox="1"/>
+            <p:nvPr/>
+          </p:nvSpPr>
+          <p:spPr>
+            <a:xfrm>
+              <a:off x="2890109" y="2368990"/>
+              <a:ext cx="623454" cy="461665"/>
+            </a:xfrm>
+            <a:prstGeom prst="rect">
+              <a:avLst/>
+            </a:prstGeom>
+            <a:noFill/>
+          </p:spPr>
+          <p:txBody>
+            <a:bodyPr wrap="square" rtlCol="0">
+              <a:spAutoFit/>
+            </a:bodyPr>
+            <a:lstStyle/>
+            <a:p>
+              <a:pPr algn="ctr"/>
+              <a:r>
+                <a:rPr lang="en-US" sz="2400" b="1" dirty="0">
+                  <a:ln>
+                    <a:solidFill>
+                      <a:schemeClr val="tx1"/>
+                    </a:solidFill>
+                  </a:ln>
+                  <a:solidFill>
+                    <a:srgbClr val="008B45"/>
+                  </a:solidFill>
+                </a:rPr>
+                <a:t>LE</a:t>
+              </a:r>
+            </a:p>
+          </p:txBody>
+        </p:sp>
+      </p:grpSp>
+      <p:sp>
+        <p:nvSpPr>
+          <p:cNvPr id="71" name="Rectangle 70">
+            <a:extLst>
+              <a:ext uri="{FF2B5EF4-FFF2-40B4-BE49-F238E27FC236}">
+                <a16:creationId xmlns:a16="http://schemas.microsoft.com/office/drawing/2014/main" id="{904CC05B-B584-5683-DCB5-3F91AB20C6F5}"/>
+              </a:ext>
+            </a:extLst>
+          </p:cNvPr>
+          <p:cNvSpPr>
+            <a:spLocks/>
+          </p:cNvSpPr>
+          <p:nvPr/>
+        </p:nvSpPr>
+        <p:spPr>
+          <a:xfrm rot="5400000">
+            <a:off x="3681974" y="2705074"/>
+            <a:ext cx="1130643" cy="152401"/>
+          </a:xfrm>
+          <a:prstGeom prst="rect">
+            <a:avLst/>
+          </a:prstGeom>
+          <a:solidFill>
+            <a:schemeClr val="tx1">
+              <a:lumMod val="75000"/>
+              <a:lumOff val="25000"/>
+            </a:schemeClr>
+          </a:solidFill>
+          <a:ln w="38100">
+            <a:solidFill>
+              <a:schemeClr val="tx1"/>
+            </a:solidFill>
+          </a:ln>
+        </p:spPr>
+        <p:style>
+          <a:lnRef idx="2">
+            <a:schemeClr val="accent1">
+              <a:shade val="15000"/>
+            </a:schemeClr>
+          </a:lnRef>
+          <a:fillRef idx="1">
+            <a:schemeClr val="accent1"/>
+          </a:fillRef>
+          <a:effectRef idx="0">
+            <a:schemeClr val="accent1"/>
+          </a:effectRef>
+          <a:fontRef idx="minor">
+            <a:schemeClr val="lt1"/>
+          </a:fontRef>
+        </p:style>
+        <p:txBody>
+          <a:bodyPr rtlCol="0" anchor="ctr"/>
+          <a:lstStyle/>
+          <a:p>
+            <a:pPr algn="ctr"/>
+            <a:endParaRPr lang="en-US"/>
+          </a:p>
+        </p:txBody>
+      </p:sp>
+      <p:sp>
+        <p:nvSpPr>
+          <p:cNvPr id="72" name="Rectangle 71">
+            <a:extLst>
+              <a:ext uri="{FF2B5EF4-FFF2-40B4-BE49-F238E27FC236}">
+                <a16:creationId xmlns:a16="http://schemas.microsoft.com/office/drawing/2014/main" id="{50325FDA-F355-6F55-759D-9132A98517FE}"/>
+              </a:ext>
+            </a:extLst>
+          </p:cNvPr>
+          <p:cNvSpPr>
+            <a:spLocks/>
+          </p:cNvSpPr>
+          <p:nvPr/>
+        </p:nvSpPr>
+        <p:spPr>
+          <a:xfrm rot="5400000">
+            <a:off x="3681974" y="3842067"/>
+            <a:ext cx="1130643" cy="152401"/>
+          </a:xfrm>
+          <a:prstGeom prst="rect">
+            <a:avLst/>
+          </a:prstGeom>
+          <a:solidFill>
+            <a:schemeClr val="tx1">
+              <a:lumMod val="75000"/>
+              <a:lumOff val="25000"/>
+            </a:schemeClr>
+          </a:solidFill>
+          <a:ln w="38100">
+            <a:solidFill>
+              <a:schemeClr val="tx1"/>
+            </a:solidFill>
+          </a:ln>
+        </p:spPr>
+        <p:style>
+          <a:lnRef idx="2">
+            <a:schemeClr val="accent1">
+              <a:shade val="15000"/>
+            </a:schemeClr>
+          </a:lnRef>
+          <a:fillRef idx="1">
+            <a:schemeClr val="accent1"/>
+          </a:fillRef>
+          <a:effectRef idx="0">
+            <a:schemeClr val="accent1"/>
+          </a:effectRef>
+          <a:fontRef idx="minor">
+            <a:schemeClr val="lt1"/>
+          </a:fontRef>
+        </p:style>
+        <p:txBody>
+          <a:bodyPr rtlCol="0" anchor="ctr"/>
+          <a:lstStyle/>
+          <a:p>
+            <a:pPr algn="ctr"/>
+            <a:endParaRPr lang="en-US"/>
+          </a:p>
+        </p:txBody>
+      </p:sp>
+      <p:sp>
+        <p:nvSpPr>
+          <p:cNvPr id="73" name="Rectangle 72">
+            <a:extLst>
+              <a:ext uri="{FF2B5EF4-FFF2-40B4-BE49-F238E27FC236}">
+                <a16:creationId xmlns:a16="http://schemas.microsoft.com/office/drawing/2014/main" id="{AF573F9A-52FD-6835-978E-1B036B3D9D96}"/>
+              </a:ext>
+            </a:extLst>
+          </p:cNvPr>
+          <p:cNvSpPr>
+            <a:spLocks/>
+          </p:cNvSpPr>
+          <p:nvPr/>
+        </p:nvSpPr>
+        <p:spPr>
+          <a:xfrm rot="5400000">
+            <a:off x="3686735" y="4967948"/>
+            <a:ext cx="1121118" cy="152401"/>
+          </a:xfrm>
+          <a:prstGeom prst="rect">
+            <a:avLst/>
+          </a:prstGeom>
+          <a:solidFill>
+            <a:schemeClr val="tx1">
+              <a:lumMod val="75000"/>
+              <a:lumOff val="25000"/>
+            </a:schemeClr>
+          </a:solidFill>
+          <a:ln w="38100">
+            <a:solidFill>
+              <a:schemeClr val="tx1"/>
+            </a:solidFill>
+          </a:ln>
+        </p:spPr>
+        <p:style>
+          <a:lnRef idx="2">
+            <a:schemeClr val="accent1">
+              <a:shade val="15000"/>
+            </a:schemeClr>
+          </a:lnRef>
+          <a:fillRef idx="1">
+            <a:schemeClr val="accent1"/>
+          </a:fillRef>
+          <a:effectRef idx="0">
+            <a:schemeClr val="accent1"/>
+          </a:effectRef>
+          <a:fontRef idx="minor">
+            <a:schemeClr val="lt1"/>
+          </a:fontRef>
+        </p:style>
+        <p:txBody>
+          <a:bodyPr rtlCol="0" anchor="ctr"/>
+          <a:lstStyle/>
+          <a:p>
+            <a:pPr algn="ctr"/>
+            <a:endParaRPr lang="en-US"/>
+          </a:p>
+        </p:txBody>
+      </p:sp>
+      <p:sp>
+        <p:nvSpPr>
+          <p:cNvPr id="74" name="Rectangle 73">
+            <a:extLst>
+              <a:ext uri="{FF2B5EF4-FFF2-40B4-BE49-F238E27FC236}">
+                <a16:creationId xmlns:a16="http://schemas.microsoft.com/office/drawing/2014/main" id="{3926DF57-9DF5-F0AA-38D9-6B1DE7762350}"/>
+              </a:ext>
+            </a:extLst>
+          </p:cNvPr>
+          <p:cNvSpPr>
+            <a:spLocks/>
+          </p:cNvSpPr>
+          <p:nvPr/>
+        </p:nvSpPr>
+        <p:spPr>
+          <a:xfrm rot="5400000">
+            <a:off x="4287935" y="2701899"/>
+            <a:ext cx="1130643" cy="152401"/>
+          </a:xfrm>
+          <a:prstGeom prst="rect">
+            <a:avLst/>
+          </a:prstGeom>
+          <a:solidFill>
+            <a:srgbClr val="B2A138"/>
+          </a:solidFill>
+          <a:ln w="38100">
+            <a:solidFill>
+              <a:schemeClr val="tx1"/>
+            </a:solidFill>
+          </a:ln>
+        </p:spPr>
+        <p:style>
+          <a:lnRef idx="2">
+            <a:schemeClr val="accent1">
+              <a:shade val="15000"/>
+            </a:schemeClr>
+          </a:lnRef>
+          <a:fillRef idx="1">
+            <a:schemeClr val="accent1"/>
+          </a:fillRef>
+          <a:effectRef idx="0">
+            <a:schemeClr val="accent1"/>
+          </a:effectRef>
+          <a:fontRef idx="minor">
+            <a:schemeClr val="lt1"/>
+          </a:fontRef>
+        </p:style>
+        <p:txBody>
+          <a:bodyPr rtlCol="0" anchor="ctr"/>
+          <a:lstStyle/>
+          <a:p>
+            <a:pPr algn="ctr"/>
+            <a:endParaRPr lang="en-US"/>
+          </a:p>
+        </p:txBody>
+      </p:sp>
+      <p:sp>
+        <p:nvSpPr>
+          <p:cNvPr id="75" name="Rectangle 74">
+            <a:extLst>
+              <a:ext uri="{FF2B5EF4-FFF2-40B4-BE49-F238E27FC236}">
+                <a16:creationId xmlns:a16="http://schemas.microsoft.com/office/drawing/2014/main" id="{77EDEFC7-DC48-C39A-B154-3E0DA154DBB3}"/>
+              </a:ext>
+            </a:extLst>
+          </p:cNvPr>
+          <p:cNvSpPr>
+            <a:spLocks/>
+          </p:cNvSpPr>
+          <p:nvPr/>
+        </p:nvSpPr>
+        <p:spPr>
+          <a:xfrm rot="5400000">
+            <a:off x="4287936" y="3832542"/>
+            <a:ext cx="1130643" cy="152401"/>
+          </a:xfrm>
+          <a:prstGeom prst="rect">
+            <a:avLst/>
+          </a:prstGeom>
+          <a:solidFill>
+            <a:srgbClr val="B2A138"/>
+          </a:solidFill>
+          <a:ln w="38100">
+            <a:solidFill>
+              <a:schemeClr val="tx1"/>
+            </a:solidFill>
+          </a:ln>
+        </p:spPr>
+        <p:style>
+          <a:lnRef idx="2">
+            <a:schemeClr val="accent1">
+              <a:shade val="15000"/>
+            </a:schemeClr>
+          </a:lnRef>
+          <a:fillRef idx="1">
+            <a:schemeClr val="accent1"/>
+          </a:fillRef>
+          <a:effectRef idx="0">
+            <a:schemeClr val="accent1"/>
+          </a:effectRef>
+          <a:fontRef idx="minor">
+            <a:schemeClr val="lt1"/>
+          </a:fontRef>
+        </p:style>
+        <p:txBody>
+          <a:bodyPr rtlCol="0" anchor="ctr"/>
+          <a:lstStyle/>
+          <a:p>
+            <a:pPr algn="ctr"/>
+            <a:endParaRPr lang="en-US"/>
+          </a:p>
+        </p:txBody>
+      </p:sp>
+      <p:sp>
+        <p:nvSpPr>
+          <p:cNvPr id="76" name="Rectangle 75">
+            <a:extLst>
+              <a:ext uri="{FF2B5EF4-FFF2-40B4-BE49-F238E27FC236}">
+                <a16:creationId xmlns:a16="http://schemas.microsoft.com/office/drawing/2014/main" id="{9B5C14E1-1E83-5437-9F8A-0CBD07CB24A7}"/>
+              </a:ext>
+            </a:extLst>
+          </p:cNvPr>
+          <p:cNvSpPr>
+            <a:spLocks/>
+          </p:cNvSpPr>
+          <p:nvPr/>
+        </p:nvSpPr>
+        <p:spPr>
+          <a:xfrm rot="5400000">
+            <a:off x="4291841" y="4959278"/>
+            <a:ext cx="1122829" cy="152401"/>
+          </a:xfrm>
+          <a:prstGeom prst="rect">
+            <a:avLst/>
+          </a:prstGeom>
+          <a:solidFill>
+            <a:srgbClr val="B2A138"/>
+          </a:solidFill>
+          <a:ln w="38100">
+            <a:solidFill>
+              <a:schemeClr val="tx1"/>
+            </a:solidFill>
+          </a:ln>
+        </p:spPr>
+        <p:style>
+          <a:lnRef idx="2">
+            <a:schemeClr val="accent1">
+              <a:shade val="15000"/>
+            </a:schemeClr>
+          </a:lnRef>
+          <a:fillRef idx="1">
+            <a:schemeClr val="accent1"/>
+          </a:fillRef>
+          <a:effectRef idx="0">
+            <a:schemeClr val="accent1"/>
+          </a:effectRef>
+          <a:fontRef idx="minor">
+            <a:schemeClr val="lt1"/>
+          </a:fontRef>
+        </p:style>
+        <p:txBody>
+          <a:bodyPr rtlCol="0" anchor="ctr"/>
+          <a:lstStyle/>
+          <a:p>
+            <a:pPr algn="ctr"/>
+            <a:endParaRPr lang="en-US"/>
+          </a:p>
+        </p:txBody>
+      </p:sp>
       <p:grpSp>
         <p:nvGrpSpPr>
           <p:cNvPr id="24" name="Group 23">
@@ -4587,162 +6299,441 @@
           </p:txBody>
         </p:sp>
       </p:grpSp>
-      <p:grpSp>
-        <p:nvGrpSpPr>
-          <p:cNvPr id="29" name="Group 28">
-            <a:extLst>
-              <a:ext uri="{FF2B5EF4-FFF2-40B4-BE49-F238E27FC236}">
-                <a16:creationId xmlns:a16="http://schemas.microsoft.com/office/drawing/2014/main" id="{C6F33F4F-C1D8-53C0-0E1E-462736622033}"/>
-              </a:ext>
-            </a:extLst>
-          </p:cNvPr>
-          <p:cNvGrpSpPr/>
+      <p:sp>
+        <p:nvSpPr>
+          <p:cNvPr id="77" name="Right Brace 76">
+            <a:extLst>
+              <a:ext uri="{FF2B5EF4-FFF2-40B4-BE49-F238E27FC236}">
+                <a16:creationId xmlns:a16="http://schemas.microsoft.com/office/drawing/2014/main" id="{5BC8C632-9BB8-DD38-6917-95D3C12284A9}"/>
+              </a:ext>
+            </a:extLst>
+          </p:cNvPr>
+          <p:cNvSpPr/>
           <p:nvPr/>
-        </p:nvGrpSpPr>
-        <p:grpSpPr>
-          <a:xfrm rot="16200000">
-            <a:off x="8363674" y="1469358"/>
-            <a:ext cx="834836" cy="2980411"/>
-            <a:chOff x="2604470" y="1176799"/>
-            <a:chExt cx="834836" cy="2862543"/>
+        </p:nvSpPr>
+        <p:spPr>
+          <a:xfrm rot="5400000">
+            <a:off x="2760958" y="4883485"/>
+            <a:ext cx="225704" cy="649125"/>
           </a:xfrm>
-        </p:grpSpPr>
-        <p:sp>
-          <p:nvSpPr>
-            <p:cNvPr id="30" name="TextBox 29">
-              <a:extLst>
-                <a:ext uri="{FF2B5EF4-FFF2-40B4-BE49-F238E27FC236}">
-                  <a16:creationId xmlns:a16="http://schemas.microsoft.com/office/drawing/2014/main" id="{F7E1D4C0-9BDC-0073-15A6-A3033FC47835}"/>
-                </a:ext>
-              </a:extLst>
-            </p:cNvPr>
-            <p:cNvSpPr txBox="1"/>
-            <p:nvPr/>
-          </p:nvSpPr>
-          <p:spPr>
-            <a:xfrm rot="5400000">
-              <a:off x="2708242" y="1073027"/>
-              <a:ext cx="623454" cy="830997"/>
-            </a:xfrm>
-            <a:prstGeom prst="rect">
-              <a:avLst/>
-            </a:prstGeom>
-            <a:noFill/>
-          </p:spPr>
-          <p:txBody>
-            <a:bodyPr wrap="square" rtlCol="0">
-              <a:spAutoFit/>
-            </a:bodyPr>
-            <a:lstStyle/>
-            <a:p>
-              <a:pPr algn="ctr"/>
-              <a:r>
-                <a:rPr lang="en-US" sz="2400" b="1" dirty="0">
-                  <a:ln>
-                    <a:solidFill>
-                      <a:schemeClr val="tx1"/>
-                    </a:solidFill>
-                  </a:ln>
+          <a:prstGeom prst="rightBrace">
+            <a:avLst>
+              <a:gd name="adj1" fmla="val 19378"/>
+              <a:gd name="adj2" fmla="val 49404"/>
+            </a:avLst>
+          </a:prstGeom>
+          <a:ln w="28575"/>
+        </p:spPr>
+        <p:style>
+          <a:lnRef idx="2">
+            <a:schemeClr val="dk1"/>
+          </a:lnRef>
+          <a:fillRef idx="0">
+            <a:schemeClr val="dk1"/>
+          </a:fillRef>
+          <a:effectRef idx="1">
+            <a:schemeClr val="dk1"/>
+          </a:effectRef>
+          <a:fontRef idx="minor">
+            <a:schemeClr val="tx1"/>
+          </a:fontRef>
+        </p:style>
+        <p:txBody>
+          <a:bodyPr rtlCol="0" anchor="ctr"/>
+          <a:lstStyle/>
+          <a:p>
+            <a:pPr algn="ctr"/>
+            <a:endParaRPr lang="en-US"/>
+          </a:p>
+        </p:txBody>
+      </p:sp>
+      <p:sp>
+        <p:nvSpPr>
+          <p:cNvPr id="78" name="TextBox 77">
+            <a:extLst>
+              <a:ext uri="{FF2B5EF4-FFF2-40B4-BE49-F238E27FC236}">
+                <a16:creationId xmlns:a16="http://schemas.microsoft.com/office/drawing/2014/main" id="{8826B432-7810-CF62-84E5-865B751B34C8}"/>
+              </a:ext>
+            </a:extLst>
+          </p:cNvPr>
+          <p:cNvSpPr txBox="1"/>
+          <p:nvPr/>
+        </p:nvSpPr>
+        <p:spPr>
+          <a:xfrm>
+            <a:off x="2438925" y="5320899"/>
+            <a:ext cx="869769" cy="461665"/>
+          </a:xfrm>
+          <a:prstGeom prst="rect">
+            <a:avLst/>
+          </a:prstGeom>
+          <a:noFill/>
+        </p:spPr>
+        <p:txBody>
+          <a:bodyPr wrap="square" rtlCol="0">
+            <a:spAutoFit/>
+          </a:bodyPr>
+          <a:lstStyle/>
+          <a:p>
+            <a:pPr algn="ctr"/>
+            <a:r>
+              <a:rPr lang="en-US" sz="1200" b="1" dirty="0">
+                <a:ln>
                   <a:solidFill>
-                    <a:srgbClr val="551A8B"/>
+                    <a:schemeClr val="tx1"/>
                   </a:solidFill>
-                </a:rPr>
-                <a:t>MR</a:t>
-              </a:r>
-            </a:p>
-          </p:txBody>
-        </p:sp>
-        <p:sp>
-          <p:nvSpPr>
-            <p:cNvPr id="31" name="TextBox 30">
-              <a:extLst>
-                <a:ext uri="{FF2B5EF4-FFF2-40B4-BE49-F238E27FC236}">
-                  <a16:creationId xmlns:a16="http://schemas.microsoft.com/office/drawing/2014/main" id="{283A4D71-7859-8742-D636-6813E48D6B90}"/>
-                </a:ext>
-              </a:extLst>
-            </p:cNvPr>
-            <p:cNvSpPr txBox="1"/>
-            <p:nvPr/>
-          </p:nvSpPr>
-          <p:spPr>
-            <a:xfrm rot="5400000">
-              <a:off x="2892907" y="3496782"/>
-              <a:ext cx="623454" cy="461665"/>
-            </a:xfrm>
-            <a:prstGeom prst="rect">
-              <a:avLst/>
-            </a:prstGeom>
-            <a:noFill/>
-          </p:spPr>
-          <p:txBody>
-            <a:bodyPr wrap="square" rtlCol="0">
-              <a:spAutoFit/>
-            </a:bodyPr>
-            <a:lstStyle/>
-            <a:p>
-              <a:pPr algn="ctr"/>
-              <a:r>
-                <a:rPr lang="en-US" sz="2400" b="1" dirty="0">
-                  <a:ln>
-                    <a:solidFill>
-                      <a:schemeClr val="tx1"/>
-                    </a:solidFill>
-                  </a:ln>
-                  <a:solidFill>
-                    <a:srgbClr val="008B45"/>
-                  </a:solidFill>
-                </a:rPr>
-                <a:t>HR</a:t>
-              </a:r>
-            </a:p>
-          </p:txBody>
-        </p:sp>
-        <p:sp>
-          <p:nvSpPr>
-            <p:cNvPr id="32" name="TextBox 31">
-              <a:extLst>
-                <a:ext uri="{FF2B5EF4-FFF2-40B4-BE49-F238E27FC236}">
-                  <a16:creationId xmlns:a16="http://schemas.microsoft.com/office/drawing/2014/main" id="{12ED7BEB-5AB4-025B-7B0D-90B02D0C7745}"/>
-                </a:ext>
-              </a:extLst>
-            </p:cNvPr>
-            <p:cNvSpPr txBox="1"/>
-            <p:nvPr/>
-          </p:nvSpPr>
-          <p:spPr>
-            <a:xfrm rot="5400000">
-              <a:off x="2896747" y="2359816"/>
-              <a:ext cx="623454" cy="461665"/>
-            </a:xfrm>
-            <a:prstGeom prst="rect">
-              <a:avLst/>
-            </a:prstGeom>
-            <a:noFill/>
-          </p:spPr>
-          <p:txBody>
-            <a:bodyPr wrap="square" rtlCol="0">
-              <a:spAutoFit/>
-            </a:bodyPr>
-            <a:lstStyle/>
-            <a:p>
-              <a:pPr algn="ctr"/>
-              <a:r>
-                <a:rPr lang="en-US" sz="2400" b="1" dirty="0">
-                  <a:ln>
-                    <a:solidFill>
-                      <a:schemeClr val="tx1"/>
-                    </a:solidFill>
-                  </a:ln>
-                  <a:solidFill>
-                    <a:srgbClr val="551A8B"/>
-                  </a:solidFill>
-                </a:rPr>
-                <a:t>LR</a:t>
-              </a:r>
-            </a:p>
-          </p:txBody>
-        </p:sp>
-      </p:grpSp>
+                </a:ln>
+              </a:rPr>
+              <a:t>2 m wide transects</a:t>
+            </a:r>
+          </a:p>
+        </p:txBody>
+      </p:sp>
+      <p:sp>
+        <p:nvSpPr>
+          <p:cNvPr id="79" name="Rectangle 78">
+            <a:extLst>
+              <a:ext uri="{FF2B5EF4-FFF2-40B4-BE49-F238E27FC236}">
+                <a16:creationId xmlns:a16="http://schemas.microsoft.com/office/drawing/2014/main" id="{AC2DCC0C-A05C-9BBE-11A2-619F9E76E527}"/>
+              </a:ext>
+            </a:extLst>
+          </p:cNvPr>
+          <p:cNvSpPr>
+            <a:spLocks/>
+          </p:cNvSpPr>
+          <p:nvPr/>
+        </p:nvSpPr>
+        <p:spPr>
+          <a:xfrm rot="10800000">
+            <a:off x="8721012" y="3763801"/>
+            <a:ext cx="1124292" cy="152401"/>
+          </a:xfrm>
+          <a:prstGeom prst="rect">
+            <a:avLst/>
+          </a:prstGeom>
+          <a:solidFill>
+            <a:schemeClr val="tx1">
+              <a:lumMod val="75000"/>
+              <a:lumOff val="25000"/>
+            </a:schemeClr>
+          </a:solidFill>
+          <a:ln w="38100">
+            <a:solidFill>
+              <a:schemeClr val="tx1"/>
+            </a:solidFill>
+          </a:ln>
+        </p:spPr>
+        <p:style>
+          <a:lnRef idx="2">
+            <a:schemeClr val="accent1">
+              <a:shade val="15000"/>
+            </a:schemeClr>
+          </a:lnRef>
+          <a:fillRef idx="1">
+            <a:schemeClr val="accent1"/>
+          </a:fillRef>
+          <a:effectRef idx="0">
+            <a:schemeClr val="accent1"/>
+          </a:effectRef>
+          <a:fontRef idx="minor">
+            <a:schemeClr val="lt1"/>
+          </a:fontRef>
+        </p:style>
+        <p:txBody>
+          <a:bodyPr rtlCol="0" anchor="ctr"/>
+          <a:lstStyle/>
+          <a:p>
+            <a:pPr algn="ctr"/>
+            <a:endParaRPr lang="en-US"/>
+          </a:p>
+        </p:txBody>
+      </p:sp>
+      <p:sp>
+        <p:nvSpPr>
+          <p:cNvPr id="80" name="Rectangle 79">
+            <a:extLst>
+              <a:ext uri="{FF2B5EF4-FFF2-40B4-BE49-F238E27FC236}">
+                <a16:creationId xmlns:a16="http://schemas.microsoft.com/office/drawing/2014/main" id="{E4A30397-6D77-D1AC-FF02-1927773E7DD4}"/>
+              </a:ext>
+            </a:extLst>
+          </p:cNvPr>
+          <p:cNvSpPr>
+            <a:spLocks/>
+          </p:cNvSpPr>
+          <p:nvPr/>
+        </p:nvSpPr>
+        <p:spPr>
+          <a:xfrm rot="10800000">
+            <a:off x="7591512" y="3762737"/>
+            <a:ext cx="1130643" cy="152401"/>
+          </a:xfrm>
+          <a:prstGeom prst="rect">
+            <a:avLst/>
+          </a:prstGeom>
+          <a:solidFill>
+            <a:schemeClr val="tx1">
+              <a:lumMod val="75000"/>
+              <a:lumOff val="25000"/>
+            </a:schemeClr>
+          </a:solidFill>
+          <a:ln w="38100">
+            <a:solidFill>
+              <a:schemeClr val="tx1"/>
+            </a:solidFill>
+          </a:ln>
+        </p:spPr>
+        <p:style>
+          <a:lnRef idx="2">
+            <a:schemeClr val="accent1">
+              <a:shade val="15000"/>
+            </a:schemeClr>
+          </a:lnRef>
+          <a:fillRef idx="1">
+            <a:schemeClr val="accent1"/>
+          </a:fillRef>
+          <a:effectRef idx="0">
+            <a:schemeClr val="accent1"/>
+          </a:effectRef>
+          <a:fontRef idx="minor">
+            <a:schemeClr val="lt1"/>
+          </a:fontRef>
+        </p:style>
+        <p:txBody>
+          <a:bodyPr rtlCol="0" anchor="ctr"/>
+          <a:lstStyle/>
+          <a:p>
+            <a:pPr algn="ctr"/>
+            <a:endParaRPr lang="en-US"/>
+          </a:p>
+        </p:txBody>
+      </p:sp>
+      <p:sp>
+        <p:nvSpPr>
+          <p:cNvPr id="81" name="Rectangle 80">
+            <a:extLst>
+              <a:ext uri="{FF2B5EF4-FFF2-40B4-BE49-F238E27FC236}">
+                <a16:creationId xmlns:a16="http://schemas.microsoft.com/office/drawing/2014/main" id="{549C3846-145F-B8E6-1490-A7E8318BDCFA}"/>
+              </a:ext>
+            </a:extLst>
+          </p:cNvPr>
+          <p:cNvSpPr>
+            <a:spLocks/>
+          </p:cNvSpPr>
+          <p:nvPr/>
+        </p:nvSpPr>
+        <p:spPr>
+          <a:xfrm rot="10800000">
+            <a:off x="6460868" y="3759456"/>
+            <a:ext cx="1127467" cy="152401"/>
+          </a:xfrm>
+          <a:prstGeom prst="rect">
+            <a:avLst/>
+          </a:prstGeom>
+          <a:solidFill>
+            <a:schemeClr val="tx1">
+              <a:lumMod val="75000"/>
+              <a:lumOff val="25000"/>
+            </a:schemeClr>
+          </a:solidFill>
+          <a:ln w="38100">
+            <a:solidFill>
+              <a:schemeClr val="tx1"/>
+            </a:solidFill>
+          </a:ln>
+        </p:spPr>
+        <p:style>
+          <a:lnRef idx="2">
+            <a:schemeClr val="accent1">
+              <a:shade val="15000"/>
+            </a:schemeClr>
+          </a:lnRef>
+          <a:fillRef idx="1">
+            <a:schemeClr val="accent1"/>
+          </a:fillRef>
+          <a:effectRef idx="0">
+            <a:schemeClr val="accent1"/>
+          </a:effectRef>
+          <a:fontRef idx="minor">
+            <a:schemeClr val="lt1"/>
+          </a:fontRef>
+        </p:style>
+        <p:txBody>
+          <a:bodyPr rtlCol="0" anchor="ctr"/>
+          <a:lstStyle/>
+          <a:p>
+            <a:pPr algn="ctr"/>
+            <a:endParaRPr lang="en-US"/>
+          </a:p>
+        </p:txBody>
+      </p:sp>
+      <p:sp>
+        <p:nvSpPr>
+          <p:cNvPr id="82" name="Rectangle 81">
+            <a:extLst>
+              <a:ext uri="{FF2B5EF4-FFF2-40B4-BE49-F238E27FC236}">
+                <a16:creationId xmlns:a16="http://schemas.microsoft.com/office/drawing/2014/main" id="{FF1D7820-1590-9AFC-EBD3-4D370393C641}"/>
+              </a:ext>
+            </a:extLst>
+          </p:cNvPr>
+          <p:cNvSpPr>
+            <a:spLocks/>
+          </p:cNvSpPr>
+          <p:nvPr/>
+        </p:nvSpPr>
+        <p:spPr>
+          <a:xfrm rot="10800000">
+            <a:off x="8717836" y="4341176"/>
+            <a:ext cx="1130643" cy="152401"/>
+          </a:xfrm>
+          <a:prstGeom prst="rect">
+            <a:avLst/>
+          </a:prstGeom>
+          <a:solidFill>
+            <a:srgbClr val="B2A138"/>
+          </a:solidFill>
+          <a:ln w="38100">
+            <a:solidFill>
+              <a:schemeClr val="tx1"/>
+            </a:solidFill>
+          </a:ln>
+        </p:spPr>
+        <p:style>
+          <a:lnRef idx="2">
+            <a:schemeClr val="accent1">
+              <a:shade val="15000"/>
+            </a:schemeClr>
+          </a:lnRef>
+          <a:fillRef idx="1">
+            <a:schemeClr val="accent1"/>
+          </a:fillRef>
+          <a:effectRef idx="0">
+            <a:schemeClr val="accent1"/>
+          </a:effectRef>
+          <a:fontRef idx="minor">
+            <a:schemeClr val="lt1"/>
+          </a:fontRef>
+        </p:style>
+        <p:txBody>
+          <a:bodyPr rtlCol="0" anchor="ctr"/>
+          <a:lstStyle/>
+          <a:p>
+            <a:pPr algn="ctr"/>
+            <a:endParaRPr lang="en-US"/>
+          </a:p>
+        </p:txBody>
+      </p:sp>
+      <p:sp>
+        <p:nvSpPr>
+          <p:cNvPr id="83" name="Rectangle 82">
+            <a:extLst>
+              <a:ext uri="{FF2B5EF4-FFF2-40B4-BE49-F238E27FC236}">
+                <a16:creationId xmlns:a16="http://schemas.microsoft.com/office/drawing/2014/main" id="{CEB645B3-B5A9-596F-C8CE-9CCB0D7F7B2C}"/>
+              </a:ext>
+            </a:extLst>
+          </p:cNvPr>
+          <p:cNvSpPr>
+            <a:spLocks/>
+          </p:cNvSpPr>
+          <p:nvPr/>
+        </p:nvSpPr>
+        <p:spPr>
+          <a:xfrm rot="10800000">
+            <a:off x="7592082" y="4341176"/>
+            <a:ext cx="1129501" cy="152401"/>
+          </a:xfrm>
+          <a:prstGeom prst="rect">
+            <a:avLst/>
+          </a:prstGeom>
+          <a:solidFill>
+            <a:srgbClr val="B2A138"/>
+          </a:solidFill>
+          <a:ln w="38100">
+            <a:solidFill>
+              <a:schemeClr val="tx1"/>
+            </a:solidFill>
+          </a:ln>
+        </p:spPr>
+        <p:style>
+          <a:lnRef idx="2">
+            <a:schemeClr val="accent1">
+              <a:shade val="15000"/>
+            </a:schemeClr>
+          </a:lnRef>
+          <a:fillRef idx="1">
+            <a:schemeClr val="accent1"/>
+          </a:fillRef>
+          <a:effectRef idx="0">
+            <a:schemeClr val="accent1"/>
+          </a:effectRef>
+          <a:fontRef idx="minor">
+            <a:schemeClr val="lt1"/>
+          </a:fontRef>
+        </p:style>
+        <p:txBody>
+          <a:bodyPr rtlCol="0" anchor="ctr"/>
+          <a:lstStyle/>
+          <a:p>
+            <a:pPr algn="ctr"/>
+            <a:endParaRPr lang="en-US"/>
+          </a:p>
+        </p:txBody>
+      </p:sp>
+      <p:sp>
+        <p:nvSpPr>
+          <p:cNvPr id="84" name="Rectangle 83">
+            <a:extLst>
+              <a:ext uri="{FF2B5EF4-FFF2-40B4-BE49-F238E27FC236}">
+                <a16:creationId xmlns:a16="http://schemas.microsoft.com/office/drawing/2014/main" id="{B9A0CC45-835D-E985-D029-2768003B7215}"/>
+              </a:ext>
+            </a:extLst>
+          </p:cNvPr>
+          <p:cNvSpPr>
+            <a:spLocks/>
+          </p:cNvSpPr>
+          <p:nvPr/>
+        </p:nvSpPr>
+        <p:spPr>
+          <a:xfrm rot="10800000">
+            <a:off x="6462902" y="4341175"/>
+            <a:ext cx="1131788" cy="152401"/>
+          </a:xfrm>
+          <a:prstGeom prst="rect">
+            <a:avLst/>
+          </a:prstGeom>
+          <a:solidFill>
+            <a:srgbClr val="B2A138"/>
+          </a:solidFill>
+          <a:ln w="38100">
+            <a:solidFill>
+              <a:schemeClr val="tx1"/>
+            </a:solidFill>
+          </a:ln>
+        </p:spPr>
+        <p:style>
+          <a:lnRef idx="2">
+            <a:schemeClr val="accent1">
+              <a:shade val="15000"/>
+            </a:schemeClr>
+          </a:lnRef>
+          <a:fillRef idx="1">
+            <a:schemeClr val="accent1"/>
+          </a:fillRef>
+          <a:effectRef idx="0">
+            <a:schemeClr val="accent1"/>
+          </a:effectRef>
+          <a:fontRef idx="minor">
+            <a:schemeClr val="lt1"/>
+          </a:fontRef>
+        </p:style>
+        <p:txBody>
+          <a:bodyPr rtlCol="0" anchor="ctr"/>
+          <a:lstStyle/>
+          <a:p>
+            <a:pPr algn="ctr"/>
+            <a:endParaRPr lang="en-US"/>
+          </a:p>
+        </p:txBody>
+      </p:sp>
       <p:grpSp>
         <p:nvGrpSpPr>
           <p:cNvPr id="37" name="Group 36">
@@ -4899,321 +6890,357 @@
           </p:txBody>
         </p:sp>
       </p:grpSp>
+      <p:sp>
+        <p:nvSpPr>
+          <p:cNvPr id="85" name="Rectangle 84">
+            <a:extLst>
+              <a:ext uri="{FF2B5EF4-FFF2-40B4-BE49-F238E27FC236}">
+                <a16:creationId xmlns:a16="http://schemas.microsoft.com/office/drawing/2014/main" id="{4F979AD6-F148-1F33-AE0F-FE95623EC311}"/>
+              </a:ext>
+            </a:extLst>
+          </p:cNvPr>
+          <p:cNvSpPr>
+            <a:spLocks/>
+          </p:cNvSpPr>
+          <p:nvPr/>
+        </p:nvSpPr>
+        <p:spPr>
+          <a:xfrm rot="10800000">
+            <a:off x="9288492" y="2644640"/>
+            <a:ext cx="1124292" cy="152401"/>
+          </a:xfrm>
+          <a:prstGeom prst="rect">
+            <a:avLst/>
+          </a:prstGeom>
+          <a:solidFill>
+            <a:schemeClr val="tx1">
+              <a:lumMod val="75000"/>
+              <a:lumOff val="25000"/>
+            </a:schemeClr>
+          </a:solidFill>
+          <a:ln w="38100">
+            <a:solidFill>
+              <a:schemeClr val="tx1"/>
+            </a:solidFill>
+          </a:ln>
+        </p:spPr>
+        <p:style>
+          <a:lnRef idx="2">
+            <a:schemeClr val="accent1">
+              <a:shade val="15000"/>
+            </a:schemeClr>
+          </a:lnRef>
+          <a:fillRef idx="1">
+            <a:schemeClr val="accent1"/>
+          </a:fillRef>
+          <a:effectRef idx="0">
+            <a:schemeClr val="accent1"/>
+          </a:effectRef>
+          <a:fontRef idx="minor">
+            <a:schemeClr val="lt1"/>
+          </a:fontRef>
+        </p:style>
+        <p:txBody>
+          <a:bodyPr rtlCol="0" anchor="ctr"/>
+          <a:lstStyle/>
+          <a:p>
+            <a:pPr algn="ctr"/>
+            <a:endParaRPr lang="en-US"/>
+          </a:p>
+        </p:txBody>
+      </p:sp>
+      <p:sp>
+        <p:nvSpPr>
+          <p:cNvPr id="86" name="Rectangle 85">
+            <a:extLst>
+              <a:ext uri="{FF2B5EF4-FFF2-40B4-BE49-F238E27FC236}">
+                <a16:creationId xmlns:a16="http://schemas.microsoft.com/office/drawing/2014/main" id="{A392CD8F-380E-B469-A225-69C0552F8491}"/>
+              </a:ext>
+            </a:extLst>
+          </p:cNvPr>
+          <p:cNvSpPr>
+            <a:spLocks/>
+          </p:cNvSpPr>
+          <p:nvPr/>
+        </p:nvSpPr>
+        <p:spPr>
+          <a:xfrm rot="10800000">
+            <a:off x="8158992" y="2643576"/>
+            <a:ext cx="1130643" cy="152401"/>
+          </a:xfrm>
+          <a:prstGeom prst="rect">
+            <a:avLst/>
+          </a:prstGeom>
+          <a:solidFill>
+            <a:schemeClr val="tx1">
+              <a:lumMod val="75000"/>
+              <a:lumOff val="25000"/>
+            </a:schemeClr>
+          </a:solidFill>
+          <a:ln w="38100">
+            <a:solidFill>
+              <a:schemeClr val="tx1"/>
+            </a:solidFill>
+          </a:ln>
+        </p:spPr>
+        <p:style>
+          <a:lnRef idx="2">
+            <a:schemeClr val="accent1">
+              <a:shade val="15000"/>
+            </a:schemeClr>
+          </a:lnRef>
+          <a:fillRef idx="1">
+            <a:schemeClr val="accent1"/>
+          </a:fillRef>
+          <a:effectRef idx="0">
+            <a:schemeClr val="accent1"/>
+          </a:effectRef>
+          <a:fontRef idx="minor">
+            <a:schemeClr val="lt1"/>
+          </a:fontRef>
+        </p:style>
+        <p:txBody>
+          <a:bodyPr rtlCol="0" anchor="ctr"/>
+          <a:lstStyle/>
+          <a:p>
+            <a:pPr algn="ctr"/>
+            <a:endParaRPr lang="en-US"/>
+          </a:p>
+        </p:txBody>
+      </p:sp>
+      <p:sp>
+        <p:nvSpPr>
+          <p:cNvPr id="87" name="Rectangle 86">
+            <a:extLst>
+              <a:ext uri="{FF2B5EF4-FFF2-40B4-BE49-F238E27FC236}">
+                <a16:creationId xmlns:a16="http://schemas.microsoft.com/office/drawing/2014/main" id="{2924203B-10E5-1B82-3AF6-39D98B498985}"/>
+              </a:ext>
+            </a:extLst>
+          </p:cNvPr>
+          <p:cNvSpPr>
+            <a:spLocks/>
+          </p:cNvSpPr>
+          <p:nvPr/>
+        </p:nvSpPr>
+        <p:spPr>
+          <a:xfrm rot="10800000">
+            <a:off x="7028348" y="2640295"/>
+            <a:ext cx="1127467" cy="152401"/>
+          </a:xfrm>
+          <a:prstGeom prst="rect">
+            <a:avLst/>
+          </a:prstGeom>
+          <a:solidFill>
+            <a:schemeClr val="tx1">
+              <a:lumMod val="75000"/>
+              <a:lumOff val="25000"/>
+            </a:schemeClr>
+          </a:solidFill>
+          <a:ln w="38100">
+            <a:solidFill>
+              <a:schemeClr val="tx1"/>
+            </a:solidFill>
+          </a:ln>
+        </p:spPr>
+        <p:style>
+          <a:lnRef idx="2">
+            <a:schemeClr val="accent1">
+              <a:shade val="15000"/>
+            </a:schemeClr>
+          </a:lnRef>
+          <a:fillRef idx="1">
+            <a:schemeClr val="accent1"/>
+          </a:fillRef>
+          <a:effectRef idx="0">
+            <a:schemeClr val="accent1"/>
+          </a:effectRef>
+          <a:fontRef idx="minor">
+            <a:schemeClr val="lt1"/>
+          </a:fontRef>
+        </p:style>
+        <p:txBody>
+          <a:bodyPr rtlCol="0" anchor="ctr"/>
+          <a:lstStyle/>
+          <a:p>
+            <a:pPr algn="ctr"/>
+            <a:endParaRPr lang="en-US"/>
+          </a:p>
+        </p:txBody>
+      </p:sp>
+      <p:sp>
+        <p:nvSpPr>
+          <p:cNvPr id="88" name="Rectangle 87">
+            <a:extLst>
+              <a:ext uri="{FF2B5EF4-FFF2-40B4-BE49-F238E27FC236}">
+                <a16:creationId xmlns:a16="http://schemas.microsoft.com/office/drawing/2014/main" id="{9523AE49-68A7-3629-A1EB-C3043F86ED15}"/>
+              </a:ext>
+            </a:extLst>
+          </p:cNvPr>
+          <p:cNvSpPr>
+            <a:spLocks/>
+          </p:cNvSpPr>
+          <p:nvPr/>
+        </p:nvSpPr>
+        <p:spPr>
+          <a:xfrm rot="10800000">
+            <a:off x="9285888" y="2059164"/>
+            <a:ext cx="1130643" cy="152401"/>
+          </a:xfrm>
+          <a:prstGeom prst="rect">
+            <a:avLst/>
+          </a:prstGeom>
+          <a:solidFill>
+            <a:srgbClr val="B2A138"/>
+          </a:solidFill>
+          <a:ln w="38100">
+            <a:solidFill>
+              <a:schemeClr val="tx1"/>
+            </a:solidFill>
+          </a:ln>
+        </p:spPr>
+        <p:style>
+          <a:lnRef idx="2">
+            <a:schemeClr val="accent1">
+              <a:shade val="15000"/>
+            </a:schemeClr>
+          </a:lnRef>
+          <a:fillRef idx="1">
+            <a:schemeClr val="accent1"/>
+          </a:fillRef>
+          <a:effectRef idx="0">
+            <a:schemeClr val="accent1"/>
+          </a:effectRef>
+          <a:fontRef idx="minor">
+            <a:schemeClr val="lt1"/>
+          </a:fontRef>
+        </p:style>
+        <p:txBody>
+          <a:bodyPr rtlCol="0" anchor="ctr"/>
+          <a:lstStyle/>
+          <a:p>
+            <a:pPr algn="ctr"/>
+            <a:endParaRPr lang="en-US"/>
+          </a:p>
+        </p:txBody>
+      </p:sp>
+      <p:sp>
+        <p:nvSpPr>
+          <p:cNvPr id="89" name="Rectangle 88">
+            <a:extLst>
+              <a:ext uri="{FF2B5EF4-FFF2-40B4-BE49-F238E27FC236}">
+                <a16:creationId xmlns:a16="http://schemas.microsoft.com/office/drawing/2014/main" id="{F7999FA9-DC1E-3F74-318E-D37793D791D8}"/>
+              </a:ext>
+            </a:extLst>
+          </p:cNvPr>
+          <p:cNvSpPr>
+            <a:spLocks/>
+          </p:cNvSpPr>
+          <p:nvPr/>
+        </p:nvSpPr>
+        <p:spPr>
+          <a:xfrm rot="10800000">
+            <a:off x="8161596" y="2059163"/>
+            <a:ext cx="1128038" cy="152401"/>
+          </a:xfrm>
+          <a:prstGeom prst="rect">
+            <a:avLst/>
+          </a:prstGeom>
+          <a:solidFill>
+            <a:srgbClr val="B2A138"/>
+          </a:solidFill>
+          <a:ln w="38100">
+            <a:solidFill>
+              <a:schemeClr val="tx1"/>
+            </a:solidFill>
+          </a:ln>
+        </p:spPr>
+        <p:style>
+          <a:lnRef idx="2">
+            <a:schemeClr val="accent1">
+              <a:shade val="15000"/>
+            </a:schemeClr>
+          </a:lnRef>
+          <a:fillRef idx="1">
+            <a:schemeClr val="accent1"/>
+          </a:fillRef>
+          <a:effectRef idx="0">
+            <a:schemeClr val="accent1"/>
+          </a:effectRef>
+          <a:fontRef idx="minor">
+            <a:schemeClr val="lt1"/>
+          </a:fontRef>
+        </p:style>
+        <p:txBody>
+          <a:bodyPr rtlCol="0" anchor="ctr"/>
+          <a:lstStyle/>
+          <a:p>
+            <a:pPr algn="ctr"/>
+            <a:endParaRPr lang="en-US"/>
+          </a:p>
+        </p:txBody>
+      </p:sp>
+      <p:sp>
+        <p:nvSpPr>
+          <p:cNvPr id="90" name="Rectangle 89">
+            <a:extLst>
+              <a:ext uri="{FF2B5EF4-FFF2-40B4-BE49-F238E27FC236}">
+                <a16:creationId xmlns:a16="http://schemas.microsoft.com/office/drawing/2014/main" id="{FAD8A02E-C9F2-FC57-D50E-F69D227C826E}"/>
+              </a:ext>
+            </a:extLst>
+          </p:cNvPr>
+          <p:cNvSpPr>
+            <a:spLocks/>
+          </p:cNvSpPr>
+          <p:nvPr/>
+        </p:nvSpPr>
+        <p:spPr>
+          <a:xfrm rot="10800000">
+            <a:off x="7030952" y="2059160"/>
+            <a:ext cx="1130642" cy="152401"/>
+          </a:xfrm>
+          <a:prstGeom prst="rect">
+            <a:avLst/>
+          </a:prstGeom>
+          <a:solidFill>
+            <a:srgbClr val="B2A138"/>
+          </a:solidFill>
+          <a:ln w="38100">
+            <a:solidFill>
+              <a:schemeClr val="tx1"/>
+            </a:solidFill>
+          </a:ln>
+        </p:spPr>
+        <p:style>
+          <a:lnRef idx="2">
+            <a:schemeClr val="accent1">
+              <a:shade val="15000"/>
+            </a:schemeClr>
+          </a:lnRef>
+          <a:fillRef idx="1">
+            <a:schemeClr val="accent1"/>
+          </a:fillRef>
+          <a:effectRef idx="0">
+            <a:schemeClr val="accent1"/>
+          </a:effectRef>
+          <a:fontRef idx="minor">
+            <a:schemeClr val="lt1"/>
+          </a:fontRef>
+        </p:style>
+        <p:txBody>
+          <a:bodyPr rtlCol="0" anchor="ctr"/>
+          <a:lstStyle/>
+          <a:p>
+            <a:pPr algn="ctr"/>
+            <a:endParaRPr lang="en-US"/>
+          </a:p>
+        </p:txBody>
+      </p:sp>
       <p:grpSp>
         <p:nvGrpSpPr>
-          <p:cNvPr id="45" name="Group 44">
-            <a:extLst>
-              <a:ext uri="{FF2B5EF4-FFF2-40B4-BE49-F238E27FC236}">
-                <a16:creationId xmlns:a16="http://schemas.microsoft.com/office/drawing/2014/main" id="{CCB90112-247A-307C-DC58-7BD8DCFD5431}"/>
-              </a:ext>
-            </a:extLst>
-          </p:cNvPr>
-          <p:cNvGrpSpPr/>
-          <p:nvPr/>
-        </p:nvGrpSpPr>
-        <p:grpSpPr>
-          <a:xfrm>
-            <a:off x="1996487" y="2034921"/>
-            <a:ext cx="686388" cy="2670837"/>
-            <a:chOff x="2891735" y="1288471"/>
-            <a:chExt cx="659243" cy="2670837"/>
-          </a:xfrm>
-        </p:grpSpPr>
-        <p:sp>
-          <p:nvSpPr>
-            <p:cNvPr id="46" name="TextBox 45">
-              <a:extLst>
-                <a:ext uri="{FF2B5EF4-FFF2-40B4-BE49-F238E27FC236}">
-                  <a16:creationId xmlns:a16="http://schemas.microsoft.com/office/drawing/2014/main" id="{17E7AC71-F6BD-B0E1-1E0D-186B7CFFF65C}"/>
-                </a:ext>
-              </a:extLst>
-            </p:cNvPr>
-            <p:cNvSpPr txBox="1"/>
-            <p:nvPr/>
-          </p:nvSpPr>
-          <p:spPr>
-            <a:xfrm>
-              <a:off x="2923685" y="1288471"/>
-              <a:ext cx="623454" cy="461665"/>
-            </a:xfrm>
-            <a:prstGeom prst="rect">
-              <a:avLst/>
-            </a:prstGeom>
-            <a:noFill/>
-          </p:spPr>
-          <p:txBody>
-            <a:bodyPr wrap="square" rtlCol="0">
-              <a:spAutoFit/>
-            </a:bodyPr>
-            <a:lstStyle/>
-            <a:p>
-              <a:pPr algn="ctr"/>
-              <a:r>
-                <a:rPr lang="en-US" sz="2400" b="1" dirty="0">
-                  <a:ln>
-                    <a:solidFill>
-                      <a:schemeClr val="tx1"/>
-                    </a:solidFill>
-                  </a:ln>
-                  <a:solidFill>
-                    <a:srgbClr val="008B45"/>
-                  </a:solidFill>
-                </a:rPr>
-                <a:t>HE</a:t>
-              </a:r>
-            </a:p>
-          </p:txBody>
-        </p:sp>
-        <p:sp>
-          <p:nvSpPr>
-            <p:cNvPr id="47" name="TextBox 46">
-              <a:extLst>
-                <a:ext uri="{FF2B5EF4-FFF2-40B4-BE49-F238E27FC236}">
-                  <a16:creationId xmlns:a16="http://schemas.microsoft.com/office/drawing/2014/main" id="{FC6FB455-5B57-2FDE-DCE8-728134333EDF}"/>
-                </a:ext>
-              </a:extLst>
-            </p:cNvPr>
-            <p:cNvSpPr txBox="1"/>
-            <p:nvPr/>
-          </p:nvSpPr>
-          <p:spPr>
-            <a:xfrm>
-              <a:off x="2891735" y="3497643"/>
-              <a:ext cx="623454" cy="461665"/>
-            </a:xfrm>
-            <a:prstGeom prst="rect">
-              <a:avLst/>
-            </a:prstGeom>
-            <a:noFill/>
-          </p:spPr>
-          <p:txBody>
-            <a:bodyPr wrap="square" rtlCol="0">
-              <a:spAutoFit/>
-            </a:bodyPr>
-            <a:lstStyle/>
-            <a:p>
-              <a:pPr algn="ctr"/>
-              <a:r>
-                <a:rPr lang="en-US" sz="2400" b="1" dirty="0">
-                  <a:ln>
-                    <a:solidFill>
-                      <a:schemeClr val="tx1"/>
-                    </a:solidFill>
-                  </a:ln>
-                  <a:solidFill>
-                    <a:srgbClr val="EE6A50"/>
-                  </a:solidFill>
-                </a:rPr>
-                <a:t>ME</a:t>
-              </a:r>
-            </a:p>
-          </p:txBody>
-        </p:sp>
-        <p:sp>
-          <p:nvSpPr>
-            <p:cNvPr id="48" name="TextBox 47">
-              <a:extLst>
-                <a:ext uri="{FF2B5EF4-FFF2-40B4-BE49-F238E27FC236}">
-                  <a16:creationId xmlns:a16="http://schemas.microsoft.com/office/drawing/2014/main" id="{F36A2740-0823-E507-0B6C-913BADCE88BE}"/>
-                </a:ext>
-              </a:extLst>
-            </p:cNvPr>
-            <p:cNvSpPr txBox="1"/>
-            <p:nvPr/>
-          </p:nvSpPr>
-          <p:spPr>
-            <a:xfrm>
-              <a:off x="2927524" y="2390593"/>
-              <a:ext cx="623454" cy="461665"/>
-            </a:xfrm>
-            <a:prstGeom prst="rect">
-              <a:avLst/>
-            </a:prstGeom>
-            <a:noFill/>
-          </p:spPr>
-          <p:txBody>
-            <a:bodyPr wrap="square" rtlCol="0">
-              <a:spAutoFit/>
-            </a:bodyPr>
-            <a:lstStyle/>
-            <a:p>
-              <a:pPr algn="ctr"/>
-              <a:r>
-                <a:rPr lang="en-US" sz="2400" b="1" dirty="0">
-                  <a:ln>
-                    <a:solidFill>
-                      <a:schemeClr val="tx1"/>
-                    </a:solidFill>
-                  </a:ln>
-                  <a:solidFill>
-                    <a:srgbClr val="008B45"/>
-                  </a:solidFill>
-                </a:rPr>
-                <a:t>LE</a:t>
-              </a:r>
-            </a:p>
-          </p:txBody>
-        </p:sp>
-      </p:grpSp>
-      <p:grpSp>
-        <p:nvGrpSpPr>
-          <p:cNvPr id="49" name="Group 48">
-            <a:extLst>
-              <a:ext uri="{FF2B5EF4-FFF2-40B4-BE49-F238E27FC236}">
-                <a16:creationId xmlns:a16="http://schemas.microsoft.com/office/drawing/2014/main" id="{CD206267-3200-2329-1C86-AF8F325A51D9}"/>
-              </a:ext>
-            </a:extLst>
-          </p:cNvPr>
-          <p:cNvGrpSpPr/>
-          <p:nvPr/>
-        </p:nvGrpSpPr>
-        <p:grpSpPr>
-          <a:xfrm>
-            <a:off x="4748222" y="2589144"/>
-            <a:ext cx="653122" cy="2700752"/>
-            <a:chOff x="2923685" y="1288471"/>
-            <a:chExt cx="627293" cy="2700752"/>
-          </a:xfrm>
-        </p:grpSpPr>
-        <p:sp>
-          <p:nvSpPr>
-            <p:cNvPr id="50" name="TextBox 49">
-              <a:extLst>
-                <a:ext uri="{FF2B5EF4-FFF2-40B4-BE49-F238E27FC236}">
-                  <a16:creationId xmlns:a16="http://schemas.microsoft.com/office/drawing/2014/main" id="{2E8B8498-BB62-E6D6-A037-A8AAD2E8507A}"/>
-                </a:ext>
-              </a:extLst>
-            </p:cNvPr>
-            <p:cNvSpPr txBox="1"/>
-            <p:nvPr/>
-          </p:nvSpPr>
-          <p:spPr>
-            <a:xfrm>
-              <a:off x="2923685" y="1288471"/>
-              <a:ext cx="623454" cy="461665"/>
-            </a:xfrm>
-            <a:prstGeom prst="rect">
-              <a:avLst/>
-            </a:prstGeom>
-            <a:noFill/>
-          </p:spPr>
-          <p:txBody>
-            <a:bodyPr wrap="square" rtlCol="0">
-              <a:spAutoFit/>
-            </a:bodyPr>
-            <a:lstStyle/>
-            <a:p>
-              <a:pPr algn="ctr"/>
-              <a:r>
-                <a:rPr lang="en-US" sz="2400" b="1" dirty="0">
-                  <a:ln>
-                    <a:solidFill>
-                      <a:schemeClr val="tx1"/>
-                    </a:solidFill>
-                  </a:ln>
-                  <a:solidFill>
-                    <a:srgbClr val="008B45"/>
-                  </a:solidFill>
-                </a:rPr>
-                <a:t>ME</a:t>
-              </a:r>
-            </a:p>
-          </p:txBody>
-        </p:sp>
-        <p:sp>
-          <p:nvSpPr>
-            <p:cNvPr id="51" name="TextBox 50">
-              <a:extLst>
-                <a:ext uri="{FF2B5EF4-FFF2-40B4-BE49-F238E27FC236}">
-                  <a16:creationId xmlns:a16="http://schemas.microsoft.com/office/drawing/2014/main" id="{A1691DC0-EA13-5ADB-B832-0D51B66B63AC}"/>
-                </a:ext>
-              </a:extLst>
-            </p:cNvPr>
-            <p:cNvSpPr txBox="1"/>
-            <p:nvPr/>
-          </p:nvSpPr>
-          <p:spPr>
-            <a:xfrm>
-              <a:off x="2923685" y="3527558"/>
-              <a:ext cx="623454" cy="461665"/>
-            </a:xfrm>
-            <a:prstGeom prst="rect">
-              <a:avLst/>
-            </a:prstGeom>
-            <a:noFill/>
-          </p:spPr>
-          <p:txBody>
-            <a:bodyPr wrap="square" rtlCol="0">
-              <a:spAutoFit/>
-            </a:bodyPr>
-            <a:lstStyle/>
-            <a:p>
-              <a:pPr algn="ctr"/>
-              <a:r>
-                <a:rPr lang="en-US" sz="2400" b="1" dirty="0">
-                  <a:ln>
-                    <a:solidFill>
-                      <a:schemeClr val="tx1"/>
-                    </a:solidFill>
-                  </a:ln>
-                </a:rPr>
-                <a:t>HE</a:t>
-              </a:r>
-            </a:p>
-          </p:txBody>
-        </p:sp>
-        <p:sp>
-          <p:nvSpPr>
-            <p:cNvPr id="52" name="TextBox 51">
-              <a:extLst>
-                <a:ext uri="{FF2B5EF4-FFF2-40B4-BE49-F238E27FC236}">
-                  <a16:creationId xmlns:a16="http://schemas.microsoft.com/office/drawing/2014/main" id="{02917354-2C4A-5149-CC86-464DC898EE72}"/>
-                </a:ext>
-              </a:extLst>
-            </p:cNvPr>
-            <p:cNvSpPr txBox="1"/>
-            <p:nvPr/>
-          </p:nvSpPr>
-          <p:spPr>
-            <a:xfrm>
-              <a:off x="2927524" y="2390593"/>
-              <a:ext cx="623454" cy="461665"/>
-            </a:xfrm>
-            <a:prstGeom prst="rect">
-              <a:avLst/>
-            </a:prstGeom>
-            <a:noFill/>
-          </p:spPr>
-          <p:txBody>
-            <a:bodyPr wrap="square" rtlCol="0">
-              <a:spAutoFit/>
-            </a:bodyPr>
-            <a:lstStyle/>
-            <a:p>
-              <a:pPr algn="ctr"/>
-              <a:r>
-                <a:rPr lang="en-US" sz="2400" b="1" dirty="0">
-                  <a:ln>
-                    <a:solidFill>
-                      <a:schemeClr val="tx1"/>
-                    </a:solidFill>
-                  </a:ln>
-                  <a:solidFill>
-                    <a:srgbClr val="EE6A50"/>
-                  </a:solidFill>
-                </a:rPr>
-                <a:t>LE</a:t>
-              </a:r>
-            </a:p>
-          </p:txBody>
-        </p:sp>
-      </p:grpSp>
-      <p:grpSp>
-        <p:nvGrpSpPr>
-          <p:cNvPr id="53" name="Group 52">
-            <a:extLst>
-              <a:ext uri="{FF2B5EF4-FFF2-40B4-BE49-F238E27FC236}">
-                <a16:creationId xmlns:a16="http://schemas.microsoft.com/office/drawing/2014/main" id="{9F235338-93A2-121E-5967-8316D4C089F0}"/>
+          <p:cNvPr id="29" name="Group 28">
+            <a:extLst>
+              <a:ext uri="{FF2B5EF4-FFF2-40B4-BE49-F238E27FC236}">
+                <a16:creationId xmlns:a16="http://schemas.microsoft.com/office/drawing/2014/main" id="{C6F33F4F-C1D8-53C0-0E1E-462736622033}"/>
               </a:ext>
             </a:extLst>
           </p:cNvPr>
@@ -5222,18 +7249,18 @@
         </p:nvGrpSpPr>
         <p:grpSpPr>
           <a:xfrm rot="16200000">
-            <a:off x="8548341" y="454697"/>
-            <a:ext cx="465504" cy="2980411"/>
-            <a:chOff x="2973801" y="1176799"/>
-            <a:chExt cx="465504" cy="2862543"/>
+            <a:off x="8358280" y="1418408"/>
+            <a:ext cx="834836" cy="2980411"/>
+            <a:chOff x="2604470" y="1176799"/>
+            <a:chExt cx="834836" cy="2862543"/>
           </a:xfrm>
         </p:grpSpPr>
         <p:sp>
           <p:nvSpPr>
-            <p:cNvPr id="54" name="TextBox 53">
+            <p:cNvPr id="30" name="TextBox 29">
               <a:extLst>
                 <a:ext uri="{FF2B5EF4-FFF2-40B4-BE49-F238E27FC236}">
-                  <a16:creationId xmlns:a16="http://schemas.microsoft.com/office/drawing/2014/main" id="{86D78F30-77F6-71E3-BECC-AC10C7A5ECA7}"/>
+                  <a16:creationId xmlns:a16="http://schemas.microsoft.com/office/drawing/2014/main" id="{F7E1D4C0-9BDC-0073-15A6-A3033FC47835}"/>
                 </a:ext>
               </a:extLst>
             </p:cNvPr>
@@ -5242,8 +7269,8 @@
           </p:nvSpPr>
           <p:spPr>
             <a:xfrm rot="5400000">
-              <a:off x="2892908" y="1257693"/>
-              <a:ext cx="623454" cy="461665"/>
+              <a:off x="2708242" y="1073027"/>
+              <a:ext cx="623454" cy="830997"/>
             </a:xfrm>
             <a:prstGeom prst="rect">
               <a:avLst/>
@@ -5268,17 +7295,17 @@
                     <a:srgbClr val="551A8B"/>
                   </a:solidFill>
                 </a:rPr>
-                <a:t>ME</a:t>
+                <a:t>MR</a:t>
               </a:r>
             </a:p>
           </p:txBody>
         </p:sp>
         <p:sp>
           <p:nvSpPr>
-            <p:cNvPr id="55" name="TextBox 54">
+            <p:cNvPr id="31" name="TextBox 30">
               <a:extLst>
                 <a:ext uri="{FF2B5EF4-FFF2-40B4-BE49-F238E27FC236}">
-                  <a16:creationId xmlns:a16="http://schemas.microsoft.com/office/drawing/2014/main" id="{974EC33B-E6CB-5FF2-D2EB-0B25E36E13AC}"/>
+                  <a16:creationId xmlns:a16="http://schemas.microsoft.com/office/drawing/2014/main" id="{283A4D71-7859-8742-D636-6813E48D6B90}"/>
                 </a:ext>
               </a:extLst>
             </p:cNvPr>
@@ -5310,20 +7337,20 @@
                     </a:solidFill>
                   </a:ln>
                   <a:solidFill>
-                    <a:srgbClr val="4F94CD"/>
+                    <a:srgbClr val="008B45"/>
                   </a:solidFill>
                 </a:rPr>
-                <a:t>HE</a:t>
+                <a:t>HR</a:t>
               </a:r>
             </a:p>
           </p:txBody>
         </p:sp>
         <p:sp>
           <p:nvSpPr>
-            <p:cNvPr id="56" name="TextBox 55">
+            <p:cNvPr id="32" name="TextBox 31">
               <a:extLst>
                 <a:ext uri="{FF2B5EF4-FFF2-40B4-BE49-F238E27FC236}">
-                  <a16:creationId xmlns:a16="http://schemas.microsoft.com/office/drawing/2014/main" id="{57E9C646-CACC-D32C-C79D-5CD20FD139FD}"/>
+                  <a16:creationId xmlns:a16="http://schemas.microsoft.com/office/drawing/2014/main" id="{12ED7BEB-5AB4-025B-7B0D-90B02D0C7745}"/>
                 </a:ext>
               </a:extLst>
             </p:cNvPr>
@@ -5332,7 +7359,7 @@
           </p:nvSpPr>
           <p:spPr>
             <a:xfrm rot="5400000">
-              <a:off x="2896746" y="2359816"/>
+              <a:off x="2896747" y="2359816"/>
               <a:ext cx="623454" cy="461665"/>
             </a:xfrm>
             <a:prstGeom prst="rect">
@@ -5358,384 +7385,12 @@
                     <a:srgbClr val="551A8B"/>
                   </a:solidFill>
                 </a:rPr>
-                <a:t>LE</a:t>
+                <a:t>LR</a:t>
               </a:r>
             </a:p>
           </p:txBody>
         </p:sp>
       </p:grpSp>
-      <p:grpSp>
-        <p:nvGrpSpPr>
-          <p:cNvPr id="57" name="Group 56">
-            <a:extLst>
-              <a:ext uri="{FF2B5EF4-FFF2-40B4-BE49-F238E27FC236}">
-                <a16:creationId xmlns:a16="http://schemas.microsoft.com/office/drawing/2014/main" id="{5AE14666-8080-387B-FEC4-84F5C8F99A5B}"/>
-              </a:ext>
-            </a:extLst>
-          </p:cNvPr>
-          <p:cNvGrpSpPr/>
-          <p:nvPr/>
-        </p:nvGrpSpPr>
-        <p:grpSpPr>
-          <a:xfrm rot="16200000">
-            <a:off x="7983018" y="3192724"/>
-            <a:ext cx="465504" cy="2980411"/>
-            <a:chOff x="2973801" y="1176799"/>
-            <a:chExt cx="465504" cy="2862543"/>
-          </a:xfrm>
-        </p:grpSpPr>
-        <p:sp>
-          <p:nvSpPr>
-            <p:cNvPr id="58" name="TextBox 57">
-              <a:extLst>
-                <a:ext uri="{FF2B5EF4-FFF2-40B4-BE49-F238E27FC236}">
-                  <a16:creationId xmlns:a16="http://schemas.microsoft.com/office/drawing/2014/main" id="{D1E6E0B4-B646-198D-9B86-AAEA85570C4B}"/>
-                </a:ext>
-              </a:extLst>
-            </p:cNvPr>
-            <p:cNvSpPr txBox="1"/>
-            <p:nvPr/>
-          </p:nvSpPr>
-          <p:spPr>
-            <a:xfrm rot="5400000">
-              <a:off x="2892907" y="1257693"/>
-              <a:ext cx="623454" cy="461665"/>
-            </a:xfrm>
-            <a:prstGeom prst="rect">
-              <a:avLst/>
-            </a:prstGeom>
-            <a:noFill/>
-          </p:spPr>
-          <p:txBody>
-            <a:bodyPr wrap="square" rtlCol="0">
-              <a:spAutoFit/>
-            </a:bodyPr>
-            <a:lstStyle/>
-            <a:p>
-              <a:pPr algn="ctr"/>
-              <a:r>
-                <a:rPr lang="en-US" sz="2400" b="1" dirty="0">
-                  <a:ln>
-                    <a:solidFill>
-                      <a:schemeClr val="tx1"/>
-                    </a:solidFill>
-                  </a:ln>
-                  <a:solidFill>
-                    <a:srgbClr val="EE6A50"/>
-                  </a:solidFill>
-                </a:rPr>
-                <a:t>HE</a:t>
-              </a:r>
-            </a:p>
-          </p:txBody>
-        </p:sp>
-        <p:sp>
-          <p:nvSpPr>
-            <p:cNvPr id="59" name="TextBox 58">
-              <a:extLst>
-                <a:ext uri="{FF2B5EF4-FFF2-40B4-BE49-F238E27FC236}">
-                  <a16:creationId xmlns:a16="http://schemas.microsoft.com/office/drawing/2014/main" id="{49CFD952-0F6E-5D47-9DAC-98781654DE1C}"/>
-                </a:ext>
-              </a:extLst>
-            </p:cNvPr>
-            <p:cNvSpPr txBox="1"/>
-            <p:nvPr/>
-          </p:nvSpPr>
-          <p:spPr>
-            <a:xfrm rot="5400000">
-              <a:off x="2892907" y="3496782"/>
-              <a:ext cx="623454" cy="461665"/>
-            </a:xfrm>
-            <a:prstGeom prst="rect">
-              <a:avLst/>
-            </a:prstGeom>
-            <a:noFill/>
-          </p:spPr>
-          <p:txBody>
-            <a:bodyPr wrap="square" rtlCol="0">
-              <a:spAutoFit/>
-            </a:bodyPr>
-            <a:lstStyle/>
-            <a:p>
-              <a:pPr algn="ctr"/>
-              <a:r>
-                <a:rPr lang="en-US" sz="2400" b="1" dirty="0">
-                  <a:ln>
-                    <a:solidFill>
-                      <a:schemeClr val="tx1"/>
-                    </a:solidFill>
-                  </a:ln>
-                  <a:solidFill>
-                    <a:srgbClr val="4F94CD"/>
-                  </a:solidFill>
-                </a:rPr>
-                <a:t>ME</a:t>
-              </a:r>
-            </a:p>
-          </p:txBody>
-        </p:sp>
-        <p:sp>
-          <p:nvSpPr>
-            <p:cNvPr id="60" name="TextBox 59">
-              <a:extLst>
-                <a:ext uri="{FF2B5EF4-FFF2-40B4-BE49-F238E27FC236}">
-                  <a16:creationId xmlns:a16="http://schemas.microsoft.com/office/drawing/2014/main" id="{284E9369-026B-CC2B-E179-A6256B60D586}"/>
-                </a:ext>
-              </a:extLst>
-            </p:cNvPr>
-            <p:cNvSpPr txBox="1"/>
-            <p:nvPr/>
-          </p:nvSpPr>
-          <p:spPr>
-            <a:xfrm rot="5400000">
-              <a:off x="2896746" y="2359816"/>
-              <a:ext cx="623454" cy="461665"/>
-            </a:xfrm>
-            <a:prstGeom prst="rect">
-              <a:avLst/>
-            </a:prstGeom>
-            <a:noFill/>
-          </p:spPr>
-          <p:txBody>
-            <a:bodyPr wrap="square" rtlCol="0">
-              <a:spAutoFit/>
-            </a:bodyPr>
-            <a:lstStyle/>
-            <a:p>
-              <a:pPr algn="ctr"/>
-              <a:r>
-                <a:rPr lang="en-US" sz="2400" b="1" dirty="0">
-                  <a:ln>
-                    <a:solidFill>
-                      <a:schemeClr val="tx1"/>
-                    </a:solidFill>
-                  </a:ln>
-                  <a:solidFill>
-                    <a:srgbClr val="EE6A50"/>
-                  </a:solidFill>
-                </a:rPr>
-                <a:t>LE</a:t>
-              </a:r>
-            </a:p>
-          </p:txBody>
-        </p:sp>
-      </p:grpSp>
-      <p:sp>
-        <p:nvSpPr>
-          <p:cNvPr id="61" name="TextBox 60">
-            <a:extLst>
-              <a:ext uri="{FF2B5EF4-FFF2-40B4-BE49-F238E27FC236}">
-                <a16:creationId xmlns:a16="http://schemas.microsoft.com/office/drawing/2014/main" id="{F969892B-537C-32BF-053A-ED80BBE3C9DB}"/>
-              </a:ext>
-            </a:extLst>
-          </p:cNvPr>
-          <p:cNvSpPr txBox="1"/>
-          <p:nvPr/>
-        </p:nvSpPr>
-        <p:spPr>
-          <a:xfrm>
-            <a:off x="4471534" y="967800"/>
-            <a:ext cx="3248932" cy="584775"/>
-          </a:xfrm>
-          <a:prstGeom prst="rect">
-            <a:avLst/>
-          </a:prstGeom>
-          <a:noFill/>
-        </p:spPr>
-        <p:txBody>
-          <a:bodyPr wrap="square" rtlCol="0">
-            <a:spAutoFit/>
-          </a:bodyPr>
-          <a:lstStyle/>
-          <a:p>
-            <a:pPr algn="ctr"/>
-            <a:r>
-              <a:rPr lang="en-US" sz="3200" b="1" dirty="0"/>
-              <a:t>Inshore</a:t>
-            </a:r>
-          </a:p>
-        </p:txBody>
-      </p:sp>
-      <p:sp>
-        <p:nvSpPr>
-          <p:cNvPr id="62" name="TextBox 61">
-            <a:extLst>
-              <a:ext uri="{FF2B5EF4-FFF2-40B4-BE49-F238E27FC236}">
-                <a16:creationId xmlns:a16="http://schemas.microsoft.com/office/drawing/2014/main" id="{2F083685-B08B-2C9C-22A8-18D1CB73875B}"/>
-              </a:ext>
-            </a:extLst>
-          </p:cNvPr>
-          <p:cNvSpPr txBox="1"/>
-          <p:nvPr/>
-        </p:nvSpPr>
-        <p:spPr>
-          <a:xfrm>
-            <a:off x="4554479" y="5868845"/>
-            <a:ext cx="3248932" cy="584775"/>
-          </a:xfrm>
-          <a:prstGeom prst="rect">
-            <a:avLst/>
-          </a:prstGeom>
-          <a:noFill/>
-        </p:spPr>
-        <p:txBody>
-          <a:bodyPr wrap="square" rtlCol="0">
-            <a:spAutoFit/>
-          </a:bodyPr>
-          <a:lstStyle/>
-          <a:p>
-            <a:pPr algn="ctr"/>
-            <a:r>
-              <a:rPr lang="en-US" sz="3200" b="1" dirty="0"/>
-              <a:t>Offshore</a:t>
-            </a:r>
-          </a:p>
-        </p:txBody>
-      </p:sp>
-      <p:sp>
-        <p:nvSpPr>
-          <p:cNvPr id="63" name="TextBox 62">
-            <a:extLst>
-              <a:ext uri="{FF2B5EF4-FFF2-40B4-BE49-F238E27FC236}">
-                <a16:creationId xmlns:a16="http://schemas.microsoft.com/office/drawing/2014/main" id="{157FD705-9E0A-8AA2-5622-61B2F9B10DFF}"/>
-              </a:ext>
-            </a:extLst>
-          </p:cNvPr>
-          <p:cNvSpPr txBox="1"/>
-          <p:nvPr/>
-        </p:nvSpPr>
-        <p:spPr>
-          <a:xfrm>
-            <a:off x="-237420" y="3028418"/>
-            <a:ext cx="3141943" cy="584775"/>
-          </a:xfrm>
-          <a:prstGeom prst="rect">
-            <a:avLst/>
-          </a:prstGeom>
-          <a:noFill/>
-        </p:spPr>
-        <p:txBody>
-          <a:bodyPr wrap="square" rtlCol="0">
-            <a:spAutoFit/>
-          </a:bodyPr>
-          <a:lstStyle/>
-          <a:p>
-            <a:pPr algn="ctr"/>
-            <a:r>
-              <a:rPr lang="en-US" sz="3200" b="1" dirty="0"/>
-              <a:t>West</a:t>
-            </a:r>
-          </a:p>
-        </p:txBody>
-      </p:sp>
-      <p:sp>
-        <p:nvSpPr>
-          <p:cNvPr id="64" name="TextBox 63">
-            <a:extLst>
-              <a:ext uri="{FF2B5EF4-FFF2-40B4-BE49-F238E27FC236}">
-                <a16:creationId xmlns:a16="http://schemas.microsoft.com/office/drawing/2014/main" id="{2AE7439E-4651-E4C6-4DEC-086E776F5CD8}"/>
-              </a:ext>
-            </a:extLst>
-          </p:cNvPr>
-          <p:cNvSpPr txBox="1"/>
-          <p:nvPr/>
-        </p:nvSpPr>
-        <p:spPr>
-          <a:xfrm>
-            <a:off x="9543911" y="3026388"/>
-            <a:ext cx="3248932" cy="584775"/>
-          </a:xfrm>
-          <a:prstGeom prst="rect">
-            <a:avLst/>
-          </a:prstGeom>
-          <a:noFill/>
-        </p:spPr>
-        <p:txBody>
-          <a:bodyPr wrap="square" rtlCol="0">
-            <a:spAutoFit/>
-          </a:bodyPr>
-          <a:lstStyle/>
-          <a:p>
-            <a:pPr algn="ctr"/>
-            <a:r>
-              <a:rPr lang="en-US" sz="3200" b="1" dirty="0"/>
-              <a:t>East</a:t>
-            </a:r>
-          </a:p>
-        </p:txBody>
-      </p:sp>
-      <p:sp>
-        <p:nvSpPr>
-          <p:cNvPr id="65" name="TextBox 64">
-            <a:extLst>
-              <a:ext uri="{FF2B5EF4-FFF2-40B4-BE49-F238E27FC236}">
-                <a16:creationId xmlns:a16="http://schemas.microsoft.com/office/drawing/2014/main" id="{6FACAE33-7D1A-E5DF-A23F-BB06434460AB}"/>
-              </a:ext>
-            </a:extLst>
-          </p:cNvPr>
-          <p:cNvSpPr txBox="1"/>
-          <p:nvPr/>
-        </p:nvSpPr>
-        <p:spPr>
-          <a:xfrm>
-            <a:off x="2101659" y="233344"/>
-            <a:ext cx="3248932" cy="646331"/>
-          </a:xfrm>
-          <a:prstGeom prst="rect">
-            <a:avLst/>
-          </a:prstGeom>
-          <a:noFill/>
-        </p:spPr>
-        <p:txBody>
-          <a:bodyPr wrap="square" rtlCol="0">
-            <a:spAutoFit/>
-          </a:bodyPr>
-          <a:lstStyle/>
-          <a:p>
-            <a:pPr algn="ctr"/>
-            <a:r>
-              <a:rPr lang="en-US" sz="3600" b="1" dirty="0"/>
-              <a:t>Perpendicular</a:t>
-            </a:r>
-          </a:p>
-        </p:txBody>
-      </p:sp>
-      <p:sp>
-        <p:nvSpPr>
-          <p:cNvPr id="66" name="TextBox 65">
-            <a:extLst>
-              <a:ext uri="{FF2B5EF4-FFF2-40B4-BE49-F238E27FC236}">
-                <a16:creationId xmlns:a16="http://schemas.microsoft.com/office/drawing/2014/main" id="{1C4FE13F-9474-A513-C504-3BC3FBD176D6}"/>
-              </a:ext>
-            </a:extLst>
-          </p:cNvPr>
-          <p:cNvSpPr txBox="1"/>
-          <p:nvPr/>
-        </p:nvSpPr>
-        <p:spPr>
-          <a:xfrm>
-            <a:off x="7097688" y="233343"/>
-            <a:ext cx="3248932" cy="646331"/>
-          </a:xfrm>
-          <a:prstGeom prst="rect">
-            <a:avLst/>
-          </a:prstGeom>
-          <a:noFill/>
-        </p:spPr>
-        <p:txBody>
-          <a:bodyPr wrap="square" rtlCol="0">
-            <a:spAutoFit/>
-          </a:bodyPr>
-          <a:lstStyle/>
-          <a:p>
-            <a:pPr algn="ctr"/>
-            <a:r>
-              <a:rPr lang="en-US" sz="3600" b="1" dirty="0"/>
-              <a:t>Parallel</a:t>
-            </a:r>
-          </a:p>
-        </p:txBody>
-      </p:sp>
     </p:spTree>
     <p:extLst>
       <p:ext uri="{BB962C8B-B14F-4D97-AF65-F5344CB8AC3E}">

</xml_diff>

<commit_message>
png version of spatal diagram added with better transect areas
</commit_message>
<xml_diff>
--- a/figures/pvr.pptx
+++ b/figures/pvr.pptx
@@ -4,6 +4,9 @@
   <p:sldMasterIdLst>
     <p:sldMasterId id="2147483648" r:id="rId1"/>
   </p:sldMasterIdLst>
+  <p:notesMasterIdLst>
+    <p:notesMasterId r:id="rId3"/>
+  </p:notesMasterIdLst>
   <p:sldIdLst>
     <p:sldId id="256" r:id="rId2"/>
   </p:sldIdLst>
@@ -110,6 +113,439 @@
     </p:ext>
   </p:extLst>
 </p:presentation>
+</file>
+
+<file path=ppt/notesMasters/notesMaster1.xml><?xml version="1.0" encoding="utf-8"?>
+<p:notesMaster xmlns:a="http://schemas.openxmlformats.org/drawingml/2006/main" xmlns:r="http://schemas.openxmlformats.org/officeDocument/2006/relationships" xmlns:p="http://schemas.openxmlformats.org/presentationml/2006/main">
+  <p:cSld>
+    <p:bg>
+      <p:bgRef idx="1001">
+        <a:schemeClr val="bg1"/>
+      </p:bgRef>
+    </p:bg>
+    <p:spTree>
+      <p:nvGrpSpPr>
+        <p:cNvPr id="1" name=""/>
+        <p:cNvGrpSpPr/>
+        <p:nvPr/>
+      </p:nvGrpSpPr>
+      <p:grpSpPr>
+        <a:xfrm>
+          <a:off x="0" y="0"/>
+          <a:ext cx="0" cy="0"/>
+          <a:chOff x="0" y="0"/>
+          <a:chExt cx="0" cy="0"/>
+        </a:xfrm>
+      </p:grpSpPr>
+      <p:sp>
+        <p:nvSpPr>
+          <p:cNvPr id="2" name="Header Placeholder 1"/>
+          <p:cNvSpPr>
+            <a:spLocks noGrp="1"/>
+          </p:cNvSpPr>
+          <p:nvPr>
+            <p:ph type="hdr" sz="quarter"/>
+          </p:nvPr>
+        </p:nvSpPr>
+        <p:spPr>
+          <a:xfrm>
+            <a:off x="0" y="0"/>
+            <a:ext cx="2971800" cy="458788"/>
+          </a:xfrm>
+          <a:prstGeom prst="rect">
+            <a:avLst/>
+          </a:prstGeom>
+        </p:spPr>
+        <p:txBody>
+          <a:bodyPr vert="horz" lIns="91440" tIns="45720" rIns="91440" bIns="45720" rtlCol="0"/>
+          <a:lstStyle>
+            <a:lvl1pPr algn="l">
+              <a:defRPr sz="1200"/>
+            </a:lvl1pPr>
+          </a:lstStyle>
+          <a:p>
+            <a:endParaRPr lang="en-US"/>
+          </a:p>
+        </p:txBody>
+      </p:sp>
+      <p:sp>
+        <p:nvSpPr>
+          <p:cNvPr id="3" name="Date Placeholder 2"/>
+          <p:cNvSpPr>
+            <a:spLocks noGrp="1"/>
+          </p:cNvSpPr>
+          <p:nvPr>
+            <p:ph type="dt" idx="1"/>
+          </p:nvPr>
+        </p:nvSpPr>
+        <p:spPr>
+          <a:xfrm>
+            <a:off x="3884613" y="0"/>
+            <a:ext cx="2971800" cy="458788"/>
+          </a:xfrm>
+          <a:prstGeom prst="rect">
+            <a:avLst/>
+          </a:prstGeom>
+        </p:spPr>
+        <p:txBody>
+          <a:bodyPr vert="horz" lIns="91440" tIns="45720" rIns="91440" bIns="45720" rtlCol="0"/>
+          <a:lstStyle>
+            <a:lvl1pPr algn="r">
+              <a:defRPr sz="1200"/>
+            </a:lvl1pPr>
+          </a:lstStyle>
+          <a:p>
+            <a:fld id="{99032ED0-CD1F-42F5-9566-FAD06E2559A5}" type="datetimeFigureOut">
+              <a:rPr lang="en-US" smtClean="0"/>
+              <a:t>6/30/2024</a:t>
+            </a:fld>
+            <a:endParaRPr lang="en-US"/>
+          </a:p>
+        </p:txBody>
+      </p:sp>
+      <p:sp>
+        <p:nvSpPr>
+          <p:cNvPr id="4" name="Slide Image Placeholder 3"/>
+          <p:cNvSpPr>
+            <a:spLocks noGrp="1" noRot="1" noChangeAspect="1"/>
+          </p:cNvSpPr>
+          <p:nvPr>
+            <p:ph type="sldImg" idx="2"/>
+          </p:nvPr>
+        </p:nvSpPr>
+        <p:spPr>
+          <a:xfrm>
+            <a:off x="685800" y="1143000"/>
+            <a:ext cx="5486400" cy="3086100"/>
+          </a:xfrm>
+          <a:prstGeom prst="rect">
+            <a:avLst/>
+          </a:prstGeom>
+          <a:noFill/>
+          <a:ln w="12700">
+            <a:solidFill>
+              <a:prstClr val="black"/>
+            </a:solidFill>
+          </a:ln>
+        </p:spPr>
+        <p:txBody>
+          <a:bodyPr vert="horz" lIns="91440" tIns="45720" rIns="91440" bIns="45720" rtlCol="0" anchor="ctr"/>
+          <a:lstStyle/>
+          <a:p>
+            <a:endParaRPr lang="en-US"/>
+          </a:p>
+        </p:txBody>
+      </p:sp>
+      <p:sp>
+        <p:nvSpPr>
+          <p:cNvPr id="5" name="Notes Placeholder 4"/>
+          <p:cNvSpPr>
+            <a:spLocks noGrp="1"/>
+          </p:cNvSpPr>
+          <p:nvPr>
+            <p:ph type="body" sz="quarter" idx="3"/>
+          </p:nvPr>
+        </p:nvSpPr>
+        <p:spPr>
+          <a:xfrm>
+            <a:off x="685800" y="4400550"/>
+            <a:ext cx="5486400" cy="3600450"/>
+          </a:xfrm>
+          <a:prstGeom prst="rect">
+            <a:avLst/>
+          </a:prstGeom>
+        </p:spPr>
+        <p:txBody>
+          <a:bodyPr vert="horz" lIns="91440" tIns="45720" rIns="91440" bIns="45720" rtlCol="0"/>
+          <a:lstStyle/>
+          <a:p>
+            <a:pPr lvl="0"/>
+            <a:r>
+              <a:rPr lang="en-US"/>
+              <a:t>Click to edit Master text styles</a:t>
+            </a:r>
+          </a:p>
+          <a:p>
+            <a:pPr lvl="1"/>
+            <a:r>
+              <a:rPr lang="en-US"/>
+              <a:t>Second level</a:t>
+            </a:r>
+          </a:p>
+          <a:p>
+            <a:pPr lvl="2"/>
+            <a:r>
+              <a:rPr lang="en-US"/>
+              <a:t>Third level</a:t>
+            </a:r>
+          </a:p>
+          <a:p>
+            <a:pPr lvl="3"/>
+            <a:r>
+              <a:rPr lang="en-US"/>
+              <a:t>Fourth level</a:t>
+            </a:r>
+          </a:p>
+          <a:p>
+            <a:pPr lvl="4"/>
+            <a:r>
+              <a:rPr lang="en-US"/>
+              <a:t>Fifth level</a:t>
+            </a:r>
+          </a:p>
+        </p:txBody>
+      </p:sp>
+      <p:sp>
+        <p:nvSpPr>
+          <p:cNvPr id="6" name="Footer Placeholder 5"/>
+          <p:cNvSpPr>
+            <a:spLocks noGrp="1"/>
+          </p:cNvSpPr>
+          <p:nvPr>
+            <p:ph type="ftr" sz="quarter" idx="4"/>
+          </p:nvPr>
+        </p:nvSpPr>
+        <p:spPr>
+          <a:xfrm>
+            <a:off x="0" y="8685213"/>
+            <a:ext cx="2971800" cy="458787"/>
+          </a:xfrm>
+          <a:prstGeom prst="rect">
+            <a:avLst/>
+          </a:prstGeom>
+        </p:spPr>
+        <p:txBody>
+          <a:bodyPr vert="horz" lIns="91440" tIns="45720" rIns="91440" bIns="45720" rtlCol="0" anchor="b"/>
+          <a:lstStyle>
+            <a:lvl1pPr algn="l">
+              <a:defRPr sz="1200"/>
+            </a:lvl1pPr>
+          </a:lstStyle>
+          <a:p>
+            <a:endParaRPr lang="en-US"/>
+          </a:p>
+        </p:txBody>
+      </p:sp>
+      <p:sp>
+        <p:nvSpPr>
+          <p:cNvPr id="7" name="Slide Number Placeholder 6"/>
+          <p:cNvSpPr>
+            <a:spLocks noGrp="1"/>
+          </p:cNvSpPr>
+          <p:nvPr>
+            <p:ph type="sldNum" sz="quarter" idx="5"/>
+          </p:nvPr>
+        </p:nvSpPr>
+        <p:spPr>
+          <a:xfrm>
+            <a:off x="3884613" y="8685213"/>
+            <a:ext cx="2971800" cy="458787"/>
+          </a:xfrm>
+          <a:prstGeom prst="rect">
+            <a:avLst/>
+          </a:prstGeom>
+        </p:spPr>
+        <p:txBody>
+          <a:bodyPr vert="horz" lIns="91440" tIns="45720" rIns="91440" bIns="45720" rtlCol="0" anchor="b"/>
+          <a:lstStyle>
+            <a:lvl1pPr algn="r">
+              <a:defRPr sz="1200"/>
+            </a:lvl1pPr>
+          </a:lstStyle>
+          <a:p>
+            <a:fld id="{6498F3F6-C155-4965-8CE3-A972ADF3A5EF}" type="slidenum">
+              <a:rPr lang="en-US" smtClean="0"/>
+              <a:t>‹#›</a:t>
+            </a:fld>
+            <a:endParaRPr lang="en-US"/>
+          </a:p>
+        </p:txBody>
+      </p:sp>
+    </p:spTree>
+    <p:extLst>
+      <p:ext uri="{BB962C8B-B14F-4D97-AF65-F5344CB8AC3E}">
+        <p14:creationId xmlns:p14="http://schemas.microsoft.com/office/powerpoint/2010/main" val="3369607805"/>
+      </p:ext>
+    </p:extLst>
+  </p:cSld>
+  <p:clrMap bg1="lt1" tx1="dk1" bg2="lt2" tx2="dk2" accent1="accent1" accent2="accent2" accent3="accent3" accent4="accent4" accent5="accent5" accent6="accent6" hlink="hlink" folHlink="folHlink"/>
+  <p:notesStyle>
+    <a:lvl1pPr marL="0" algn="l" defTabSz="914400" rtl="0" eaLnBrk="1" latinLnBrk="0" hangingPunct="1">
+      <a:defRPr sz="1200" kern="1200">
+        <a:solidFill>
+          <a:schemeClr val="tx1"/>
+        </a:solidFill>
+        <a:latin typeface="+mn-lt"/>
+        <a:ea typeface="+mn-ea"/>
+        <a:cs typeface="+mn-cs"/>
+      </a:defRPr>
+    </a:lvl1pPr>
+    <a:lvl2pPr marL="457200" algn="l" defTabSz="914400" rtl="0" eaLnBrk="1" latinLnBrk="0" hangingPunct="1">
+      <a:defRPr sz="1200" kern="1200">
+        <a:solidFill>
+          <a:schemeClr val="tx1"/>
+        </a:solidFill>
+        <a:latin typeface="+mn-lt"/>
+        <a:ea typeface="+mn-ea"/>
+        <a:cs typeface="+mn-cs"/>
+      </a:defRPr>
+    </a:lvl2pPr>
+    <a:lvl3pPr marL="914400" algn="l" defTabSz="914400" rtl="0" eaLnBrk="1" latinLnBrk="0" hangingPunct="1">
+      <a:defRPr sz="1200" kern="1200">
+        <a:solidFill>
+          <a:schemeClr val="tx1"/>
+        </a:solidFill>
+        <a:latin typeface="+mn-lt"/>
+        <a:ea typeface="+mn-ea"/>
+        <a:cs typeface="+mn-cs"/>
+      </a:defRPr>
+    </a:lvl3pPr>
+    <a:lvl4pPr marL="1371600" algn="l" defTabSz="914400" rtl="0" eaLnBrk="1" latinLnBrk="0" hangingPunct="1">
+      <a:defRPr sz="1200" kern="1200">
+        <a:solidFill>
+          <a:schemeClr val="tx1"/>
+        </a:solidFill>
+        <a:latin typeface="+mn-lt"/>
+        <a:ea typeface="+mn-ea"/>
+        <a:cs typeface="+mn-cs"/>
+      </a:defRPr>
+    </a:lvl4pPr>
+    <a:lvl5pPr marL="1828800" algn="l" defTabSz="914400" rtl="0" eaLnBrk="1" latinLnBrk="0" hangingPunct="1">
+      <a:defRPr sz="1200" kern="1200">
+        <a:solidFill>
+          <a:schemeClr val="tx1"/>
+        </a:solidFill>
+        <a:latin typeface="+mn-lt"/>
+        <a:ea typeface="+mn-ea"/>
+        <a:cs typeface="+mn-cs"/>
+      </a:defRPr>
+    </a:lvl5pPr>
+    <a:lvl6pPr marL="2286000" algn="l" defTabSz="914400" rtl="0" eaLnBrk="1" latinLnBrk="0" hangingPunct="1">
+      <a:defRPr sz="1200" kern="1200">
+        <a:solidFill>
+          <a:schemeClr val="tx1"/>
+        </a:solidFill>
+        <a:latin typeface="+mn-lt"/>
+        <a:ea typeface="+mn-ea"/>
+        <a:cs typeface="+mn-cs"/>
+      </a:defRPr>
+    </a:lvl6pPr>
+    <a:lvl7pPr marL="2743200" algn="l" defTabSz="914400" rtl="0" eaLnBrk="1" latinLnBrk="0" hangingPunct="1">
+      <a:defRPr sz="1200" kern="1200">
+        <a:solidFill>
+          <a:schemeClr val="tx1"/>
+        </a:solidFill>
+        <a:latin typeface="+mn-lt"/>
+        <a:ea typeface="+mn-ea"/>
+        <a:cs typeface="+mn-cs"/>
+      </a:defRPr>
+    </a:lvl7pPr>
+    <a:lvl8pPr marL="3200400" algn="l" defTabSz="914400" rtl="0" eaLnBrk="1" latinLnBrk="0" hangingPunct="1">
+      <a:defRPr sz="1200" kern="1200">
+        <a:solidFill>
+          <a:schemeClr val="tx1"/>
+        </a:solidFill>
+        <a:latin typeface="+mn-lt"/>
+        <a:ea typeface="+mn-ea"/>
+        <a:cs typeface="+mn-cs"/>
+      </a:defRPr>
+    </a:lvl8pPr>
+    <a:lvl9pPr marL="3657600" algn="l" defTabSz="914400" rtl="0" eaLnBrk="1" latinLnBrk="0" hangingPunct="1">
+      <a:defRPr sz="1200" kern="1200">
+        <a:solidFill>
+          <a:schemeClr val="tx1"/>
+        </a:solidFill>
+        <a:latin typeface="+mn-lt"/>
+        <a:ea typeface="+mn-ea"/>
+        <a:cs typeface="+mn-cs"/>
+      </a:defRPr>
+    </a:lvl9pPr>
+  </p:notesStyle>
+</p:notesMaster>
+</file>
+
+<file path=ppt/notesSlides/notesSlide1.xml><?xml version="1.0" encoding="utf-8"?>
+<p:notes xmlns:a="http://schemas.openxmlformats.org/drawingml/2006/main" xmlns:r="http://schemas.openxmlformats.org/officeDocument/2006/relationships" xmlns:p="http://schemas.openxmlformats.org/presentationml/2006/main">
+  <p:cSld>
+    <p:spTree>
+      <p:nvGrpSpPr>
+        <p:cNvPr id="1" name=""/>
+        <p:cNvGrpSpPr/>
+        <p:nvPr/>
+      </p:nvGrpSpPr>
+      <p:grpSpPr>
+        <a:xfrm>
+          <a:off x="0" y="0"/>
+          <a:ext cx="0" cy="0"/>
+          <a:chOff x="0" y="0"/>
+          <a:chExt cx="0" cy="0"/>
+        </a:xfrm>
+      </p:grpSpPr>
+      <p:sp>
+        <p:nvSpPr>
+          <p:cNvPr id="2" name="Slide Image Placeholder 1"/>
+          <p:cNvSpPr>
+            <a:spLocks noGrp="1" noRot="1" noChangeAspect="1"/>
+          </p:cNvSpPr>
+          <p:nvPr>
+            <p:ph type="sldImg"/>
+          </p:nvPr>
+        </p:nvSpPr>
+        <p:spPr/>
+      </p:sp>
+      <p:sp>
+        <p:nvSpPr>
+          <p:cNvPr id="3" name="Notes Placeholder 2"/>
+          <p:cNvSpPr>
+            <a:spLocks noGrp="1"/>
+          </p:cNvSpPr>
+          <p:nvPr>
+            <p:ph type="body" idx="1"/>
+          </p:nvPr>
+        </p:nvSpPr>
+        <p:spPr/>
+        <p:txBody>
+          <a:bodyPr/>
+          <a:lstStyle/>
+          <a:p>
+            <a:endParaRPr lang="en-US"/>
+          </a:p>
+        </p:txBody>
+      </p:sp>
+      <p:sp>
+        <p:nvSpPr>
+          <p:cNvPr id="4" name="Slide Number Placeholder 3"/>
+          <p:cNvSpPr>
+            <a:spLocks noGrp="1"/>
+          </p:cNvSpPr>
+          <p:nvPr>
+            <p:ph type="sldNum" sz="quarter" idx="5"/>
+          </p:nvPr>
+        </p:nvSpPr>
+        <p:spPr/>
+        <p:txBody>
+          <a:bodyPr/>
+          <a:lstStyle/>
+          <a:p>
+            <a:fld id="{6498F3F6-C155-4965-8CE3-A972ADF3A5EF}" type="slidenum">
+              <a:rPr lang="en-US" smtClean="0"/>
+              <a:t>1</a:t>
+            </a:fld>
+            <a:endParaRPr lang="en-US"/>
+          </a:p>
+        </p:txBody>
+      </p:sp>
+    </p:spTree>
+    <p:extLst>
+      <p:ext uri="{BB962C8B-B14F-4D97-AF65-F5344CB8AC3E}">
+        <p14:creationId xmlns:p14="http://schemas.microsoft.com/office/powerpoint/2010/main" val="2624338520"/>
+      </p:ext>
+    </p:extLst>
+  </p:cSld>
+  <p:clrMapOvr>
+    <a:masterClrMapping/>
+  </p:clrMapOvr>
+</p:notes>
 </file>
 
 <file path=ppt/slideLayouts/slideLayout1.xml><?xml version="1.0" encoding="utf-8"?>
@@ -3340,7 +3776,7 @@
         </p:nvSpPr>
         <p:spPr>
           <a:xfrm>
-            <a:off x="2038706" y="1647457"/>
+            <a:off x="1633979" y="1651050"/>
             <a:ext cx="1687419" cy="3391928"/>
           </a:xfrm>
           <a:prstGeom prst="rect">
@@ -3394,7 +3830,7 @@
         </p:nvSpPr>
         <p:spPr>
           <a:xfrm>
-            <a:off x="3710770" y="2212779"/>
+            <a:off x="3306043" y="2216372"/>
             <a:ext cx="1687419" cy="3391928"/>
           </a:xfrm>
           <a:prstGeom prst="rect">
@@ -3448,7 +3884,7 @@
         </p:nvGrpSpPr>
         <p:grpSpPr>
           <a:xfrm rot="5400000">
-            <a:off x="1732145" y="2563401"/>
+            <a:off x="1327418" y="2566994"/>
             <a:ext cx="3957250" cy="2125362"/>
             <a:chOff x="1195516" y="716691"/>
             <a:chExt cx="3957250" cy="2125362"/>
@@ -3630,64 +4066,6 @@
         </p:sp>
         <p:sp>
           <p:nvSpPr>
-            <p:cNvPr id="15" name="Rectangle 14">
-              <a:extLst>
-                <a:ext uri="{FF2B5EF4-FFF2-40B4-BE49-F238E27FC236}">
-                  <a16:creationId xmlns:a16="http://schemas.microsoft.com/office/drawing/2014/main" id="{D2530B30-4778-31A4-84CB-5870D3816D2E}"/>
-                </a:ext>
-              </a:extLst>
-            </p:cNvPr>
-            <p:cNvSpPr>
-              <a:spLocks/>
-            </p:cNvSpPr>
-            <p:nvPr/>
-          </p:nvSpPr>
-          <p:spPr>
-            <a:xfrm>
-              <a:off x="1195516" y="1779372"/>
-              <a:ext cx="1130643" cy="1062681"/>
-            </a:xfrm>
-            <a:prstGeom prst="rect">
-              <a:avLst/>
-            </a:prstGeom>
-            <a:solidFill>
-              <a:schemeClr val="bg1">
-                <a:lumMod val="65000"/>
-              </a:schemeClr>
-            </a:solidFill>
-            <a:ln w="38100">
-              <a:solidFill>
-                <a:schemeClr val="tx1"/>
-              </a:solidFill>
-            </a:ln>
-          </p:spPr>
-          <p:style>
-            <a:lnRef idx="2">
-              <a:schemeClr val="accent1">
-                <a:shade val="15000"/>
-              </a:schemeClr>
-            </a:lnRef>
-            <a:fillRef idx="1">
-              <a:schemeClr val="accent1"/>
-            </a:fillRef>
-            <a:effectRef idx="0">
-              <a:schemeClr val="accent1"/>
-            </a:effectRef>
-            <a:fontRef idx="minor">
-              <a:schemeClr val="lt1"/>
-            </a:fontRef>
-          </p:style>
-          <p:txBody>
-            <a:bodyPr rtlCol="0" anchor="ctr"/>
-            <a:lstStyle/>
-            <a:p>
-              <a:pPr algn="ctr"/>
-              <a:endParaRPr lang="en-US" dirty="0"/>
-            </a:p>
-          </p:txBody>
-        </p:sp>
-        <p:sp>
-          <p:nvSpPr>
             <p:cNvPr id="16" name="Rectangle 15">
               <a:extLst>
                 <a:ext uri="{FF2B5EF4-FFF2-40B4-BE49-F238E27FC236}">
@@ -3802,6 +4180,64 @@
             </a:p>
           </p:txBody>
         </p:sp>
+        <p:sp>
+          <p:nvSpPr>
+            <p:cNvPr id="15" name="Rectangle 14">
+              <a:extLst>
+                <a:ext uri="{FF2B5EF4-FFF2-40B4-BE49-F238E27FC236}">
+                  <a16:creationId xmlns:a16="http://schemas.microsoft.com/office/drawing/2014/main" id="{D2530B30-4778-31A4-84CB-5870D3816D2E}"/>
+                </a:ext>
+              </a:extLst>
+            </p:cNvPr>
+            <p:cNvSpPr>
+              <a:spLocks/>
+            </p:cNvSpPr>
+            <p:nvPr/>
+          </p:nvSpPr>
+          <p:spPr>
+            <a:xfrm>
+              <a:off x="1195516" y="1779372"/>
+              <a:ext cx="1130643" cy="1062681"/>
+            </a:xfrm>
+            <a:prstGeom prst="rect">
+              <a:avLst/>
+            </a:prstGeom>
+            <a:solidFill>
+              <a:schemeClr val="bg1">
+                <a:lumMod val="65000"/>
+              </a:schemeClr>
+            </a:solidFill>
+            <a:ln w="38100">
+              <a:solidFill>
+                <a:schemeClr val="tx1"/>
+              </a:solidFill>
+            </a:ln>
+          </p:spPr>
+          <p:style>
+            <a:lnRef idx="2">
+              <a:schemeClr val="accent1">
+                <a:shade val="15000"/>
+              </a:schemeClr>
+            </a:lnRef>
+            <a:fillRef idx="1">
+              <a:schemeClr val="accent1"/>
+            </a:fillRef>
+            <a:effectRef idx="0">
+              <a:schemeClr val="accent1"/>
+            </a:effectRef>
+            <a:fontRef idx="minor">
+              <a:schemeClr val="lt1"/>
+            </a:fontRef>
+          </p:style>
+          <p:txBody>
+            <a:bodyPr rtlCol="0" anchor="ctr"/>
+            <a:lstStyle/>
+            <a:p>
+              <a:pPr algn="ctr"/>
+              <a:endParaRPr lang="en-US" dirty="0"/>
+            </a:p>
+          </p:txBody>
+        </p:sp>
       </p:grpSp>
       <p:sp>
         <p:nvSpPr>
@@ -3817,7 +4253,7 @@
         </p:nvSpPr>
         <p:spPr>
           <a:xfrm rot="5400000">
-            <a:off x="7313124" y="2426487"/>
+            <a:off x="7378572" y="2556334"/>
             <a:ext cx="1687419" cy="3391928"/>
           </a:xfrm>
           <a:prstGeom prst="rect">
@@ -3871,7 +4307,7 @@
         </p:nvSpPr>
         <p:spPr>
           <a:xfrm rot="5400000">
-            <a:off x="7878445" y="739067"/>
+            <a:off x="7943893" y="868914"/>
             <a:ext cx="1687419" cy="3391928"/>
           </a:xfrm>
           <a:prstGeom prst="rect">
@@ -3925,7 +4361,7 @@
         </p:nvGrpSpPr>
         <p:grpSpPr>
           <a:xfrm>
-            <a:off x="6460870" y="2212779"/>
+            <a:off x="6526318" y="2342626"/>
             <a:ext cx="3957250" cy="2125362"/>
             <a:chOff x="1195516" y="716691"/>
             <a:chExt cx="3957250" cy="2125362"/>
@@ -4294,7 +4730,7 @@
         </p:nvGrpSpPr>
         <p:grpSpPr>
           <a:xfrm>
-            <a:off x="4839024" y="2589144"/>
+            <a:off x="4434297" y="2592737"/>
             <a:ext cx="653122" cy="2700752"/>
             <a:chOff x="2923685" y="1288471"/>
             <a:chExt cx="627293" cy="2700752"/>
@@ -4447,7 +4883,7 @@
         </p:nvGrpSpPr>
         <p:grpSpPr>
           <a:xfrm rot="16200000">
-            <a:off x="8548340" y="355773"/>
+            <a:off x="8613788" y="485620"/>
             <a:ext cx="465504" cy="2980411"/>
             <a:chOff x="2973801" y="1176799"/>
             <a:chExt cx="465504" cy="2862543"/>
@@ -4490,7 +4926,7 @@
                     </a:solidFill>
                   </a:ln>
                   <a:solidFill>
-                    <a:srgbClr val="551A8B"/>
+                    <a:srgbClr val="9647DD"/>
                   </a:solidFill>
                 </a:rPr>
                 <a:t>ME</a:t>
@@ -4580,7 +5016,7 @@
                     </a:solidFill>
                   </a:ln>
                   <a:solidFill>
-                    <a:srgbClr val="551A8B"/>
+                    <a:srgbClr val="9647DD"/>
                   </a:solidFill>
                 </a:rPr>
                 <a:t>LE</a:t>
@@ -4603,7 +5039,7 @@
         </p:nvGrpSpPr>
         <p:grpSpPr>
           <a:xfrm rot="16200000">
-            <a:off x="7983018" y="3192724"/>
+            <a:off x="8048466" y="3322571"/>
             <a:ext cx="465504" cy="2980411"/>
             <a:chOff x="2973801" y="1176799"/>
             <a:chExt cx="465504" cy="2862543"/>
@@ -4759,7 +5195,7 @@
         </p:nvSpPr>
         <p:spPr>
           <a:xfrm>
-            <a:off x="4471534" y="967800"/>
+            <a:off x="7198540" y="1066275"/>
             <a:ext cx="3248932" cy="584775"/>
           </a:xfrm>
           <a:prstGeom prst="rect">
@@ -4795,7 +5231,7 @@
         </p:nvSpPr>
         <p:spPr>
           <a:xfrm>
-            <a:off x="4554479" y="5868845"/>
+            <a:off x="6638612" y="5930779"/>
             <a:ext cx="3248932" cy="584775"/>
           </a:xfrm>
           <a:prstGeom prst="rect">
@@ -4831,7 +5267,7 @@
         </p:nvSpPr>
         <p:spPr>
           <a:xfrm>
-            <a:off x="-237420" y="3028418"/>
+            <a:off x="-688903" y="3066658"/>
             <a:ext cx="3141943" cy="584775"/>
           </a:xfrm>
           <a:prstGeom prst="rect">
@@ -4867,7 +5303,7 @@
         </p:nvSpPr>
         <p:spPr>
           <a:xfrm>
-            <a:off x="9543911" y="3026388"/>
+            <a:off x="3986122" y="3066495"/>
             <a:ext cx="3248932" cy="584775"/>
           </a:xfrm>
           <a:prstGeom prst="rect">
@@ -4903,7 +5339,7 @@
         </p:nvSpPr>
         <p:spPr>
           <a:xfrm>
-            <a:off x="2101659" y="233344"/>
+            <a:off x="1696932" y="95826"/>
             <a:ext cx="3248932" cy="646331"/>
           </a:xfrm>
           <a:prstGeom prst="rect">
@@ -4939,7 +5375,7 @@
         </p:nvSpPr>
         <p:spPr>
           <a:xfrm>
-            <a:off x="7097688" y="233343"/>
+            <a:off x="7229300" y="102994"/>
             <a:ext cx="3248932" cy="646331"/>
           </a:xfrm>
           <a:prstGeom prst="rect">
@@ -4975,7 +5411,7 @@
         </p:nvSpPr>
         <p:spPr>
           <a:xfrm rot="5400000">
-            <a:off x="7947929" y="3548631"/>
+            <a:off x="8013377" y="3678478"/>
             <a:ext cx="425782" cy="3383955"/>
           </a:xfrm>
           <a:prstGeom prst="rightBrace">
@@ -5023,7 +5459,7 @@
         </p:nvSpPr>
         <p:spPr>
           <a:xfrm>
-            <a:off x="7803411" y="5400822"/>
+            <a:off x="7868859" y="5530669"/>
             <a:ext cx="869769" cy="400110"/>
           </a:xfrm>
           <a:prstGeom prst="rect">
@@ -5065,7 +5501,7 @@
         </p:nvSpPr>
         <p:spPr>
           <a:xfrm>
-            <a:off x="9896341" y="3332474"/>
+            <a:off x="9961789" y="3462321"/>
             <a:ext cx="425782" cy="941533"/>
           </a:xfrm>
           <a:prstGeom prst="rightBrace">
@@ -5113,7 +5549,7 @@
         </p:nvSpPr>
         <p:spPr>
           <a:xfrm>
-            <a:off x="10233031" y="3590278"/>
+            <a:off x="10298479" y="3720125"/>
             <a:ext cx="910847" cy="400110"/>
           </a:xfrm>
           <a:prstGeom prst="rect">
@@ -5157,7 +5593,7 @@
         </p:nvSpPr>
         <p:spPr>
           <a:xfrm rot="5400000">
-            <a:off x="2606502" y="2136578"/>
+            <a:off x="2201775" y="2140171"/>
             <a:ext cx="1124292" cy="152401"/>
           </a:xfrm>
           <a:prstGeom prst="rect">
@@ -5165,14 +5601,15 @@
           </a:prstGeom>
           <a:solidFill>
             <a:schemeClr val="tx1">
-              <a:lumMod val="75000"/>
-              <a:lumOff val="25000"/>
+              <a:lumMod val="50000"/>
+              <a:lumOff val="50000"/>
             </a:schemeClr>
           </a:solidFill>
-          <a:ln w="38100">
+          <a:ln w="19050">
             <a:solidFill>
               <a:schemeClr val="tx1"/>
             </a:solidFill>
+            <a:prstDash val="dash"/>
           </a:ln>
         </p:spPr>
         <p:style>
@@ -5216,7 +5653,7 @@
         </p:nvSpPr>
         <p:spPr>
           <a:xfrm rot="5400000">
-            <a:off x="2603327" y="3270396"/>
+            <a:off x="2198600" y="3273989"/>
             <a:ext cx="1130643" cy="152401"/>
           </a:xfrm>
           <a:prstGeom prst="rect">
@@ -5224,14 +5661,15 @@
           </a:prstGeom>
           <a:solidFill>
             <a:schemeClr val="tx1">
-              <a:lumMod val="75000"/>
-              <a:lumOff val="25000"/>
+              <a:lumMod val="50000"/>
+              <a:lumOff val="50000"/>
             </a:schemeClr>
           </a:solidFill>
-          <a:ln w="38100">
+          <a:ln w="19050">
             <a:solidFill>
               <a:schemeClr val="tx1"/>
             </a:solidFill>
+            <a:prstDash val="dash"/>
           </a:ln>
         </p:spPr>
         <p:style>
@@ -5275,22 +5713,23 @@
         </p:nvSpPr>
         <p:spPr>
           <a:xfrm rot="5400000">
-            <a:off x="2604913" y="4399451"/>
-            <a:ext cx="1127467" cy="152401"/>
+            <a:off x="2208979" y="4394250"/>
+            <a:ext cx="1109879" cy="152401"/>
           </a:xfrm>
           <a:prstGeom prst="rect">
             <a:avLst/>
           </a:prstGeom>
           <a:solidFill>
             <a:schemeClr val="tx1">
-              <a:lumMod val="75000"/>
-              <a:lumOff val="25000"/>
+              <a:lumMod val="50000"/>
+              <a:lumOff val="50000"/>
             </a:schemeClr>
           </a:solidFill>
-          <a:ln w="38100">
+          <a:ln w="19050">
             <a:solidFill>
               <a:schemeClr val="tx1"/>
             </a:solidFill>
+            <a:prstDash val="dash"/>
           </a:ln>
         </p:spPr>
         <p:style>
@@ -5332,7 +5771,7 @@
         </p:nvGrpSpPr>
         <p:grpSpPr>
           <a:xfrm>
-            <a:off x="2859517" y="2034921"/>
+            <a:off x="2454790" y="2038514"/>
             <a:ext cx="653122" cy="3070084"/>
             <a:chOff x="2923685" y="1288471"/>
             <a:chExt cx="627293" cy="3070084"/>
@@ -5474,174 +5913,6 @@
           </p:txBody>
         </p:sp>
       </p:grpSp>
-      <p:sp>
-        <p:nvSpPr>
-          <p:cNvPr id="68" name="Rectangle 67">
-            <a:extLst>
-              <a:ext uri="{FF2B5EF4-FFF2-40B4-BE49-F238E27FC236}">
-                <a16:creationId xmlns:a16="http://schemas.microsoft.com/office/drawing/2014/main" id="{A51FE04B-8C5E-DE55-0C86-0EC6621EEA52}"/>
-              </a:ext>
-            </a:extLst>
-          </p:cNvPr>
-          <p:cNvSpPr>
-            <a:spLocks/>
-          </p:cNvSpPr>
-          <p:nvPr/>
-        </p:nvSpPr>
-        <p:spPr>
-          <a:xfrm rot="5400000">
-            <a:off x="2011208" y="2138166"/>
-            <a:ext cx="1130643" cy="152401"/>
-          </a:xfrm>
-          <a:prstGeom prst="rect">
-            <a:avLst/>
-          </a:prstGeom>
-          <a:solidFill>
-            <a:srgbClr val="B2A138"/>
-          </a:solidFill>
-          <a:ln w="38100">
-            <a:solidFill>
-              <a:schemeClr val="tx1"/>
-            </a:solidFill>
-          </a:ln>
-        </p:spPr>
-        <p:style>
-          <a:lnRef idx="2">
-            <a:schemeClr val="accent1">
-              <a:shade val="15000"/>
-            </a:schemeClr>
-          </a:lnRef>
-          <a:fillRef idx="1">
-            <a:schemeClr val="accent1"/>
-          </a:fillRef>
-          <a:effectRef idx="0">
-            <a:schemeClr val="accent1"/>
-          </a:effectRef>
-          <a:fontRef idx="minor">
-            <a:schemeClr val="lt1"/>
-          </a:fontRef>
-        </p:style>
-        <p:txBody>
-          <a:bodyPr rtlCol="0" anchor="ctr"/>
-          <a:lstStyle/>
-          <a:p>
-            <a:pPr algn="ctr"/>
-            <a:endParaRPr lang="en-US"/>
-          </a:p>
-        </p:txBody>
-      </p:sp>
-      <p:sp>
-        <p:nvSpPr>
-          <p:cNvPr id="69" name="Rectangle 68">
-            <a:extLst>
-              <a:ext uri="{FF2B5EF4-FFF2-40B4-BE49-F238E27FC236}">
-                <a16:creationId xmlns:a16="http://schemas.microsoft.com/office/drawing/2014/main" id="{5E5889C6-0CDA-E4B6-2CC8-1CA2A900A573}"/>
-              </a:ext>
-            </a:extLst>
-          </p:cNvPr>
-          <p:cNvSpPr>
-            <a:spLocks/>
-          </p:cNvSpPr>
-          <p:nvPr/>
-        </p:nvSpPr>
-        <p:spPr>
-          <a:xfrm rot="5400000">
-            <a:off x="2011209" y="3268809"/>
-            <a:ext cx="1130643" cy="152401"/>
-          </a:xfrm>
-          <a:prstGeom prst="rect">
-            <a:avLst/>
-          </a:prstGeom>
-          <a:solidFill>
-            <a:srgbClr val="B2A138"/>
-          </a:solidFill>
-          <a:ln w="38100">
-            <a:solidFill>
-              <a:schemeClr val="tx1"/>
-            </a:solidFill>
-          </a:ln>
-        </p:spPr>
-        <p:style>
-          <a:lnRef idx="2">
-            <a:schemeClr val="accent1">
-              <a:shade val="15000"/>
-            </a:schemeClr>
-          </a:lnRef>
-          <a:fillRef idx="1">
-            <a:schemeClr val="accent1"/>
-          </a:fillRef>
-          <a:effectRef idx="0">
-            <a:schemeClr val="accent1"/>
-          </a:effectRef>
-          <a:fontRef idx="minor">
-            <a:schemeClr val="lt1"/>
-          </a:fontRef>
-        </p:style>
-        <p:txBody>
-          <a:bodyPr rtlCol="0" anchor="ctr"/>
-          <a:lstStyle/>
-          <a:p>
-            <a:pPr algn="ctr"/>
-            <a:endParaRPr lang="en-US"/>
-          </a:p>
-        </p:txBody>
-      </p:sp>
-      <p:sp>
-        <p:nvSpPr>
-          <p:cNvPr id="70" name="Rectangle 69">
-            <a:extLst>
-              <a:ext uri="{FF2B5EF4-FFF2-40B4-BE49-F238E27FC236}">
-                <a16:creationId xmlns:a16="http://schemas.microsoft.com/office/drawing/2014/main" id="{4019F8EE-4C44-BDFF-CDB5-325DF6FA5549}"/>
-              </a:ext>
-            </a:extLst>
-          </p:cNvPr>
-          <p:cNvSpPr>
-            <a:spLocks/>
-          </p:cNvSpPr>
-          <p:nvPr/>
-        </p:nvSpPr>
-        <p:spPr>
-          <a:xfrm rot="5400000">
-            <a:off x="2011208" y="4391638"/>
-            <a:ext cx="1130643" cy="152401"/>
-          </a:xfrm>
-          <a:prstGeom prst="rect">
-            <a:avLst/>
-          </a:prstGeom>
-          <a:solidFill>
-            <a:srgbClr val="B2A138"/>
-          </a:solidFill>
-          <a:ln w="38100">
-            <a:solidFill>
-              <a:schemeClr val="tx1"/>
-            </a:solidFill>
-          </a:ln>
-        </p:spPr>
-        <p:style>
-          <a:lnRef idx="2">
-            <a:schemeClr val="accent1">
-              <a:shade val="15000"/>
-            </a:schemeClr>
-          </a:lnRef>
-          <a:fillRef idx="1">
-            <a:schemeClr val="accent1"/>
-          </a:fillRef>
-          <a:effectRef idx="0">
-            <a:schemeClr val="accent1"/>
-          </a:effectRef>
-          <a:fontRef idx="minor">
-            <a:schemeClr val="lt1"/>
-          </a:fontRef>
-        </p:style>
-        <p:txBody>
-          <a:bodyPr rtlCol="0" anchor="ctr"/>
-          <a:lstStyle/>
-          <a:p>
-            <a:pPr algn="ctr"/>
-            <a:endParaRPr lang="en-US"/>
-          </a:p>
-        </p:txBody>
-      </p:sp>
       <p:grpSp>
         <p:nvGrpSpPr>
           <p:cNvPr id="45" name="Group 44">
@@ -5656,7 +5927,7 @@
         </p:nvGrpSpPr>
         <p:grpSpPr>
           <a:xfrm>
-            <a:off x="1940298" y="2034921"/>
+            <a:off x="1535571" y="2038514"/>
             <a:ext cx="653330" cy="2677478"/>
             <a:chOff x="2887697" y="1281830"/>
             <a:chExt cx="627492" cy="2677478"/>
@@ -5814,7 +6085,7 @@
         </p:nvSpPr>
         <p:spPr>
           <a:xfrm rot="5400000">
-            <a:off x="3681974" y="2705074"/>
+            <a:off x="3277247" y="2708667"/>
             <a:ext cx="1130643" cy="152401"/>
           </a:xfrm>
           <a:prstGeom prst="rect">
@@ -5822,14 +6093,15 @@
           </a:prstGeom>
           <a:solidFill>
             <a:schemeClr val="tx1">
-              <a:lumMod val="75000"/>
-              <a:lumOff val="25000"/>
+              <a:lumMod val="50000"/>
+              <a:lumOff val="50000"/>
             </a:schemeClr>
           </a:solidFill>
-          <a:ln w="38100">
+          <a:ln w="19050">
             <a:solidFill>
               <a:schemeClr val="tx1"/>
             </a:solidFill>
+            <a:prstDash val="dash"/>
           </a:ln>
         </p:spPr>
         <p:style>
@@ -5873,7 +6145,7 @@
         </p:nvSpPr>
         <p:spPr>
           <a:xfrm rot="5400000">
-            <a:off x="3681974" y="3842067"/>
+            <a:off x="3277247" y="3845660"/>
             <a:ext cx="1130643" cy="152401"/>
           </a:xfrm>
           <a:prstGeom prst="rect">
@@ -5881,14 +6153,15 @@
           </a:prstGeom>
           <a:solidFill>
             <a:schemeClr val="tx1">
-              <a:lumMod val="75000"/>
-              <a:lumOff val="25000"/>
+              <a:lumMod val="50000"/>
+              <a:lumOff val="50000"/>
             </a:schemeClr>
           </a:solidFill>
-          <a:ln w="38100">
+          <a:ln w="19050">
             <a:solidFill>
               <a:schemeClr val="tx1"/>
             </a:solidFill>
+            <a:prstDash val="dash"/>
           </a:ln>
         </p:spPr>
         <p:style>
@@ -5932,7 +6205,7 @@
         </p:nvSpPr>
         <p:spPr>
           <a:xfrm rot="5400000">
-            <a:off x="3686735" y="4967948"/>
+            <a:off x="3282008" y="4971541"/>
             <a:ext cx="1121118" cy="152401"/>
           </a:xfrm>
           <a:prstGeom prst="rect">
@@ -5940,14 +6213,15 @@
           </a:prstGeom>
           <a:solidFill>
             <a:schemeClr val="tx1">
-              <a:lumMod val="75000"/>
-              <a:lumOff val="25000"/>
+              <a:lumMod val="50000"/>
+              <a:lumOff val="50000"/>
             </a:schemeClr>
           </a:solidFill>
-          <a:ln w="38100">
+          <a:ln w="19050">
             <a:solidFill>
               <a:schemeClr val="tx1"/>
             </a:solidFill>
+            <a:prstDash val="dash"/>
           </a:ln>
         </p:spPr>
         <p:style>
@@ -5975,174 +6249,6 @@
           </a:p>
         </p:txBody>
       </p:sp>
-      <p:sp>
-        <p:nvSpPr>
-          <p:cNvPr id="74" name="Rectangle 73">
-            <a:extLst>
-              <a:ext uri="{FF2B5EF4-FFF2-40B4-BE49-F238E27FC236}">
-                <a16:creationId xmlns:a16="http://schemas.microsoft.com/office/drawing/2014/main" id="{3926DF57-9DF5-F0AA-38D9-6B1DE7762350}"/>
-              </a:ext>
-            </a:extLst>
-          </p:cNvPr>
-          <p:cNvSpPr>
-            <a:spLocks/>
-          </p:cNvSpPr>
-          <p:nvPr/>
-        </p:nvSpPr>
-        <p:spPr>
-          <a:xfrm rot="5400000">
-            <a:off x="4287935" y="2701899"/>
-            <a:ext cx="1130643" cy="152401"/>
-          </a:xfrm>
-          <a:prstGeom prst="rect">
-            <a:avLst/>
-          </a:prstGeom>
-          <a:solidFill>
-            <a:srgbClr val="B2A138"/>
-          </a:solidFill>
-          <a:ln w="38100">
-            <a:solidFill>
-              <a:schemeClr val="tx1"/>
-            </a:solidFill>
-          </a:ln>
-        </p:spPr>
-        <p:style>
-          <a:lnRef idx="2">
-            <a:schemeClr val="accent1">
-              <a:shade val="15000"/>
-            </a:schemeClr>
-          </a:lnRef>
-          <a:fillRef idx="1">
-            <a:schemeClr val="accent1"/>
-          </a:fillRef>
-          <a:effectRef idx="0">
-            <a:schemeClr val="accent1"/>
-          </a:effectRef>
-          <a:fontRef idx="minor">
-            <a:schemeClr val="lt1"/>
-          </a:fontRef>
-        </p:style>
-        <p:txBody>
-          <a:bodyPr rtlCol="0" anchor="ctr"/>
-          <a:lstStyle/>
-          <a:p>
-            <a:pPr algn="ctr"/>
-            <a:endParaRPr lang="en-US"/>
-          </a:p>
-        </p:txBody>
-      </p:sp>
-      <p:sp>
-        <p:nvSpPr>
-          <p:cNvPr id="75" name="Rectangle 74">
-            <a:extLst>
-              <a:ext uri="{FF2B5EF4-FFF2-40B4-BE49-F238E27FC236}">
-                <a16:creationId xmlns:a16="http://schemas.microsoft.com/office/drawing/2014/main" id="{77EDEFC7-DC48-C39A-B154-3E0DA154DBB3}"/>
-              </a:ext>
-            </a:extLst>
-          </p:cNvPr>
-          <p:cNvSpPr>
-            <a:spLocks/>
-          </p:cNvSpPr>
-          <p:nvPr/>
-        </p:nvSpPr>
-        <p:spPr>
-          <a:xfrm rot="5400000">
-            <a:off x="4287936" y="3832542"/>
-            <a:ext cx="1130643" cy="152401"/>
-          </a:xfrm>
-          <a:prstGeom prst="rect">
-            <a:avLst/>
-          </a:prstGeom>
-          <a:solidFill>
-            <a:srgbClr val="B2A138"/>
-          </a:solidFill>
-          <a:ln w="38100">
-            <a:solidFill>
-              <a:schemeClr val="tx1"/>
-            </a:solidFill>
-          </a:ln>
-        </p:spPr>
-        <p:style>
-          <a:lnRef idx="2">
-            <a:schemeClr val="accent1">
-              <a:shade val="15000"/>
-            </a:schemeClr>
-          </a:lnRef>
-          <a:fillRef idx="1">
-            <a:schemeClr val="accent1"/>
-          </a:fillRef>
-          <a:effectRef idx="0">
-            <a:schemeClr val="accent1"/>
-          </a:effectRef>
-          <a:fontRef idx="minor">
-            <a:schemeClr val="lt1"/>
-          </a:fontRef>
-        </p:style>
-        <p:txBody>
-          <a:bodyPr rtlCol="0" anchor="ctr"/>
-          <a:lstStyle/>
-          <a:p>
-            <a:pPr algn="ctr"/>
-            <a:endParaRPr lang="en-US"/>
-          </a:p>
-        </p:txBody>
-      </p:sp>
-      <p:sp>
-        <p:nvSpPr>
-          <p:cNvPr id="76" name="Rectangle 75">
-            <a:extLst>
-              <a:ext uri="{FF2B5EF4-FFF2-40B4-BE49-F238E27FC236}">
-                <a16:creationId xmlns:a16="http://schemas.microsoft.com/office/drawing/2014/main" id="{9B5C14E1-1E83-5437-9F8A-0CBD07CB24A7}"/>
-              </a:ext>
-            </a:extLst>
-          </p:cNvPr>
-          <p:cNvSpPr>
-            <a:spLocks/>
-          </p:cNvSpPr>
-          <p:nvPr/>
-        </p:nvSpPr>
-        <p:spPr>
-          <a:xfrm rot="5400000">
-            <a:off x="4291841" y="4959278"/>
-            <a:ext cx="1122829" cy="152401"/>
-          </a:xfrm>
-          <a:prstGeom prst="rect">
-            <a:avLst/>
-          </a:prstGeom>
-          <a:solidFill>
-            <a:srgbClr val="B2A138"/>
-          </a:solidFill>
-          <a:ln w="38100">
-            <a:solidFill>
-              <a:schemeClr val="tx1"/>
-            </a:solidFill>
-          </a:ln>
-        </p:spPr>
-        <p:style>
-          <a:lnRef idx="2">
-            <a:schemeClr val="accent1">
-              <a:shade val="15000"/>
-            </a:schemeClr>
-          </a:lnRef>
-          <a:fillRef idx="1">
-            <a:schemeClr val="accent1"/>
-          </a:fillRef>
-          <a:effectRef idx="0">
-            <a:schemeClr val="accent1"/>
-          </a:effectRef>
-          <a:fontRef idx="minor">
-            <a:schemeClr val="lt1"/>
-          </a:fontRef>
-        </p:style>
-        <p:txBody>
-          <a:bodyPr rtlCol="0" anchor="ctr"/>
-          <a:lstStyle/>
-          <a:p>
-            <a:pPr algn="ctr"/>
-            <a:endParaRPr lang="en-US"/>
-          </a:p>
-        </p:txBody>
-      </p:sp>
       <p:grpSp>
         <p:nvGrpSpPr>
           <p:cNvPr id="24" name="Group 23">
@@ -6157,7 +6263,7 @@
         </p:nvGrpSpPr>
         <p:grpSpPr>
           <a:xfrm>
-            <a:off x="3934222" y="2589144"/>
+            <a:off x="3529495" y="2592737"/>
             <a:ext cx="653122" cy="2700752"/>
             <a:chOff x="2923685" y="1288471"/>
             <a:chExt cx="627293" cy="2700752"/>
@@ -6313,8 +6419,8 @@
         </p:nvSpPr>
         <p:spPr>
           <a:xfrm rot="5400000">
-            <a:off x="2760958" y="4883485"/>
-            <a:ext cx="225704" cy="649125"/>
+            <a:off x="2061555" y="5106479"/>
+            <a:ext cx="225704" cy="214647"/>
           </a:xfrm>
           <a:prstGeom prst="rightBrace">
             <a:avLst>
@@ -6361,8 +6467,8 @@
         </p:nvSpPr>
         <p:spPr>
           <a:xfrm>
-            <a:off x="2438925" y="5320899"/>
-            <a:ext cx="869769" cy="461665"/>
+            <a:off x="3257049" y="5826272"/>
+            <a:ext cx="1160664" cy="707886"/>
           </a:xfrm>
           <a:prstGeom prst="rect">
             <a:avLst/>
@@ -6377,14 +6483,14 @@
           <a:p>
             <a:pPr algn="ctr"/>
             <a:r>
-              <a:rPr lang="en-US" sz="1200" b="1" dirty="0">
+              <a:rPr lang="en-US" sz="2000" b="1" dirty="0">
                 <a:ln>
                   <a:solidFill>
                     <a:schemeClr val="tx1"/>
                   </a:solidFill>
                 </a:ln>
               </a:rPr>
-              <a:t>2 m wide transects</a:t>
+              <a:t>reef transect</a:t>
             </a:r>
           </a:p>
         </p:txBody>
@@ -6405,7 +6511,7 @@
         </p:nvSpPr>
         <p:spPr>
           <a:xfrm rot="10800000">
-            <a:off x="8721012" y="3763801"/>
+            <a:off x="8786460" y="3893648"/>
             <a:ext cx="1124292" cy="152401"/>
           </a:xfrm>
           <a:prstGeom prst="rect">
@@ -6413,14 +6519,15 @@
           </a:prstGeom>
           <a:solidFill>
             <a:schemeClr val="tx1">
-              <a:lumMod val="75000"/>
-              <a:lumOff val="25000"/>
+              <a:lumMod val="50000"/>
+              <a:lumOff val="50000"/>
             </a:schemeClr>
           </a:solidFill>
-          <a:ln w="38100">
+          <a:ln w="19050">
             <a:solidFill>
               <a:schemeClr val="tx1"/>
             </a:solidFill>
+            <a:prstDash val="dash"/>
           </a:ln>
         </p:spPr>
         <p:style>
@@ -6464,7 +6571,7 @@
         </p:nvSpPr>
         <p:spPr>
           <a:xfrm rot="10800000">
-            <a:off x="7591512" y="3762737"/>
+            <a:off x="7656960" y="3892584"/>
             <a:ext cx="1130643" cy="152401"/>
           </a:xfrm>
           <a:prstGeom prst="rect">
@@ -6472,14 +6579,15 @@
           </a:prstGeom>
           <a:solidFill>
             <a:schemeClr val="tx1">
-              <a:lumMod val="75000"/>
-              <a:lumOff val="25000"/>
+              <a:lumMod val="50000"/>
+              <a:lumOff val="50000"/>
             </a:schemeClr>
           </a:solidFill>
-          <a:ln w="38100">
+          <a:ln w="19050">
             <a:solidFill>
               <a:schemeClr val="tx1"/>
             </a:solidFill>
+            <a:prstDash val="dash"/>
           </a:ln>
         </p:spPr>
         <p:style>
@@ -6523,7 +6631,7 @@
         </p:nvSpPr>
         <p:spPr>
           <a:xfrm rot="10800000">
-            <a:off x="6460868" y="3759456"/>
+            <a:off x="6526316" y="3889303"/>
             <a:ext cx="1127467" cy="152401"/>
           </a:xfrm>
           <a:prstGeom prst="rect">
@@ -6531,14 +6639,15 @@
           </a:prstGeom>
           <a:solidFill>
             <a:schemeClr val="tx1">
-              <a:lumMod val="75000"/>
-              <a:lumOff val="25000"/>
+              <a:lumMod val="50000"/>
+              <a:lumOff val="50000"/>
             </a:schemeClr>
           </a:solidFill>
-          <a:ln w="38100">
+          <a:ln w="19050">
             <a:solidFill>
               <a:schemeClr val="tx1"/>
             </a:solidFill>
+            <a:prstDash val="dash"/>
           </a:ln>
         </p:spPr>
         <p:style>
@@ -6566,174 +6675,6 @@
           </a:p>
         </p:txBody>
       </p:sp>
-      <p:sp>
-        <p:nvSpPr>
-          <p:cNvPr id="82" name="Rectangle 81">
-            <a:extLst>
-              <a:ext uri="{FF2B5EF4-FFF2-40B4-BE49-F238E27FC236}">
-                <a16:creationId xmlns:a16="http://schemas.microsoft.com/office/drawing/2014/main" id="{FF1D7820-1590-9AFC-EBD3-4D370393C641}"/>
-              </a:ext>
-            </a:extLst>
-          </p:cNvPr>
-          <p:cNvSpPr>
-            <a:spLocks/>
-          </p:cNvSpPr>
-          <p:nvPr/>
-        </p:nvSpPr>
-        <p:spPr>
-          <a:xfrm rot="10800000">
-            <a:off x="8717836" y="4341176"/>
-            <a:ext cx="1130643" cy="152401"/>
-          </a:xfrm>
-          <a:prstGeom prst="rect">
-            <a:avLst/>
-          </a:prstGeom>
-          <a:solidFill>
-            <a:srgbClr val="B2A138"/>
-          </a:solidFill>
-          <a:ln w="38100">
-            <a:solidFill>
-              <a:schemeClr val="tx1"/>
-            </a:solidFill>
-          </a:ln>
-        </p:spPr>
-        <p:style>
-          <a:lnRef idx="2">
-            <a:schemeClr val="accent1">
-              <a:shade val="15000"/>
-            </a:schemeClr>
-          </a:lnRef>
-          <a:fillRef idx="1">
-            <a:schemeClr val="accent1"/>
-          </a:fillRef>
-          <a:effectRef idx="0">
-            <a:schemeClr val="accent1"/>
-          </a:effectRef>
-          <a:fontRef idx="minor">
-            <a:schemeClr val="lt1"/>
-          </a:fontRef>
-        </p:style>
-        <p:txBody>
-          <a:bodyPr rtlCol="0" anchor="ctr"/>
-          <a:lstStyle/>
-          <a:p>
-            <a:pPr algn="ctr"/>
-            <a:endParaRPr lang="en-US"/>
-          </a:p>
-        </p:txBody>
-      </p:sp>
-      <p:sp>
-        <p:nvSpPr>
-          <p:cNvPr id="83" name="Rectangle 82">
-            <a:extLst>
-              <a:ext uri="{FF2B5EF4-FFF2-40B4-BE49-F238E27FC236}">
-                <a16:creationId xmlns:a16="http://schemas.microsoft.com/office/drawing/2014/main" id="{CEB645B3-B5A9-596F-C8CE-9CCB0D7F7B2C}"/>
-              </a:ext>
-            </a:extLst>
-          </p:cNvPr>
-          <p:cNvSpPr>
-            <a:spLocks/>
-          </p:cNvSpPr>
-          <p:nvPr/>
-        </p:nvSpPr>
-        <p:spPr>
-          <a:xfrm rot="10800000">
-            <a:off x="7592082" y="4341176"/>
-            <a:ext cx="1129501" cy="152401"/>
-          </a:xfrm>
-          <a:prstGeom prst="rect">
-            <a:avLst/>
-          </a:prstGeom>
-          <a:solidFill>
-            <a:srgbClr val="B2A138"/>
-          </a:solidFill>
-          <a:ln w="38100">
-            <a:solidFill>
-              <a:schemeClr val="tx1"/>
-            </a:solidFill>
-          </a:ln>
-        </p:spPr>
-        <p:style>
-          <a:lnRef idx="2">
-            <a:schemeClr val="accent1">
-              <a:shade val="15000"/>
-            </a:schemeClr>
-          </a:lnRef>
-          <a:fillRef idx="1">
-            <a:schemeClr val="accent1"/>
-          </a:fillRef>
-          <a:effectRef idx="0">
-            <a:schemeClr val="accent1"/>
-          </a:effectRef>
-          <a:fontRef idx="minor">
-            <a:schemeClr val="lt1"/>
-          </a:fontRef>
-        </p:style>
-        <p:txBody>
-          <a:bodyPr rtlCol="0" anchor="ctr"/>
-          <a:lstStyle/>
-          <a:p>
-            <a:pPr algn="ctr"/>
-            <a:endParaRPr lang="en-US"/>
-          </a:p>
-        </p:txBody>
-      </p:sp>
-      <p:sp>
-        <p:nvSpPr>
-          <p:cNvPr id="84" name="Rectangle 83">
-            <a:extLst>
-              <a:ext uri="{FF2B5EF4-FFF2-40B4-BE49-F238E27FC236}">
-                <a16:creationId xmlns:a16="http://schemas.microsoft.com/office/drawing/2014/main" id="{B9A0CC45-835D-E985-D029-2768003B7215}"/>
-              </a:ext>
-            </a:extLst>
-          </p:cNvPr>
-          <p:cNvSpPr>
-            <a:spLocks/>
-          </p:cNvSpPr>
-          <p:nvPr/>
-        </p:nvSpPr>
-        <p:spPr>
-          <a:xfrm rot="10800000">
-            <a:off x="6462902" y="4341175"/>
-            <a:ext cx="1131788" cy="152401"/>
-          </a:xfrm>
-          <a:prstGeom prst="rect">
-            <a:avLst/>
-          </a:prstGeom>
-          <a:solidFill>
-            <a:srgbClr val="B2A138"/>
-          </a:solidFill>
-          <a:ln w="38100">
-            <a:solidFill>
-              <a:schemeClr val="tx1"/>
-            </a:solidFill>
-          </a:ln>
-        </p:spPr>
-        <p:style>
-          <a:lnRef idx="2">
-            <a:schemeClr val="accent1">
-              <a:shade val="15000"/>
-            </a:schemeClr>
-          </a:lnRef>
-          <a:fillRef idx="1">
-            <a:schemeClr val="accent1"/>
-          </a:fillRef>
-          <a:effectRef idx="0">
-            <a:schemeClr val="accent1"/>
-          </a:effectRef>
-          <a:fontRef idx="minor">
-            <a:schemeClr val="lt1"/>
-          </a:fontRef>
-        </p:style>
-        <p:txBody>
-          <a:bodyPr rtlCol="0" anchor="ctr"/>
-          <a:lstStyle/>
-          <a:p>
-            <a:pPr algn="ctr"/>
-            <a:endParaRPr lang="en-US"/>
-          </a:p>
-        </p:txBody>
-      </p:sp>
       <p:grpSp>
         <p:nvGrpSpPr>
           <p:cNvPr id="37" name="Group 36">
@@ -6748,7 +6689,7 @@
         </p:nvGrpSpPr>
         <p:grpSpPr>
           <a:xfrm rot="16200000">
-            <a:off x="7798352" y="2532038"/>
+            <a:off x="7863800" y="2661885"/>
             <a:ext cx="834836" cy="2980411"/>
             <a:chOff x="2604469" y="1176799"/>
             <a:chExt cx="834836" cy="2862543"/>
@@ -6906,7 +6847,7 @@
         </p:nvSpPr>
         <p:spPr>
           <a:xfrm rot="10800000">
-            <a:off x="9288492" y="2644640"/>
+            <a:off x="9353940" y="2774487"/>
             <a:ext cx="1124292" cy="152401"/>
           </a:xfrm>
           <a:prstGeom prst="rect">
@@ -6914,14 +6855,15 @@
           </a:prstGeom>
           <a:solidFill>
             <a:schemeClr val="tx1">
-              <a:lumMod val="75000"/>
-              <a:lumOff val="25000"/>
+              <a:lumMod val="50000"/>
+              <a:lumOff val="50000"/>
             </a:schemeClr>
           </a:solidFill>
-          <a:ln w="38100">
+          <a:ln w="19050">
             <a:solidFill>
               <a:schemeClr val="tx1"/>
             </a:solidFill>
+            <a:prstDash val="dash"/>
           </a:ln>
         </p:spPr>
         <p:style>
@@ -6965,7 +6907,7 @@
         </p:nvSpPr>
         <p:spPr>
           <a:xfrm rot="10800000">
-            <a:off x="8158992" y="2643576"/>
+            <a:off x="8224440" y="2773423"/>
             <a:ext cx="1130643" cy="152401"/>
           </a:xfrm>
           <a:prstGeom prst="rect">
@@ -6973,14 +6915,15 @@
           </a:prstGeom>
           <a:solidFill>
             <a:schemeClr val="tx1">
-              <a:lumMod val="75000"/>
-              <a:lumOff val="25000"/>
+              <a:lumMod val="50000"/>
+              <a:lumOff val="50000"/>
             </a:schemeClr>
           </a:solidFill>
-          <a:ln w="38100">
+          <a:ln w="19050">
             <a:solidFill>
               <a:schemeClr val="tx1"/>
             </a:solidFill>
+            <a:prstDash val="dash"/>
           </a:ln>
         </p:spPr>
         <p:style>
@@ -7024,7 +6967,7 @@
         </p:nvSpPr>
         <p:spPr>
           <a:xfrm rot="10800000">
-            <a:off x="7028348" y="2640295"/>
+            <a:off x="7093796" y="2770142"/>
             <a:ext cx="1127467" cy="152401"/>
           </a:xfrm>
           <a:prstGeom prst="rect">
@@ -7032,14 +6975,15 @@
           </a:prstGeom>
           <a:solidFill>
             <a:schemeClr val="tx1">
-              <a:lumMod val="75000"/>
-              <a:lumOff val="25000"/>
+              <a:lumMod val="50000"/>
+              <a:lumOff val="50000"/>
             </a:schemeClr>
           </a:solidFill>
-          <a:ln w="38100">
+          <a:ln w="19050">
             <a:solidFill>
               <a:schemeClr val="tx1"/>
             </a:solidFill>
+            <a:prstDash val="dash"/>
           </a:ln>
         </p:spPr>
         <p:style>
@@ -7067,174 +7011,6 @@
           </a:p>
         </p:txBody>
       </p:sp>
-      <p:sp>
-        <p:nvSpPr>
-          <p:cNvPr id="88" name="Rectangle 87">
-            <a:extLst>
-              <a:ext uri="{FF2B5EF4-FFF2-40B4-BE49-F238E27FC236}">
-                <a16:creationId xmlns:a16="http://schemas.microsoft.com/office/drawing/2014/main" id="{9523AE49-68A7-3629-A1EB-C3043F86ED15}"/>
-              </a:ext>
-            </a:extLst>
-          </p:cNvPr>
-          <p:cNvSpPr>
-            <a:spLocks/>
-          </p:cNvSpPr>
-          <p:nvPr/>
-        </p:nvSpPr>
-        <p:spPr>
-          <a:xfrm rot="10800000">
-            <a:off x="9285888" y="2059164"/>
-            <a:ext cx="1130643" cy="152401"/>
-          </a:xfrm>
-          <a:prstGeom prst="rect">
-            <a:avLst/>
-          </a:prstGeom>
-          <a:solidFill>
-            <a:srgbClr val="B2A138"/>
-          </a:solidFill>
-          <a:ln w="38100">
-            <a:solidFill>
-              <a:schemeClr val="tx1"/>
-            </a:solidFill>
-          </a:ln>
-        </p:spPr>
-        <p:style>
-          <a:lnRef idx="2">
-            <a:schemeClr val="accent1">
-              <a:shade val="15000"/>
-            </a:schemeClr>
-          </a:lnRef>
-          <a:fillRef idx="1">
-            <a:schemeClr val="accent1"/>
-          </a:fillRef>
-          <a:effectRef idx="0">
-            <a:schemeClr val="accent1"/>
-          </a:effectRef>
-          <a:fontRef idx="minor">
-            <a:schemeClr val="lt1"/>
-          </a:fontRef>
-        </p:style>
-        <p:txBody>
-          <a:bodyPr rtlCol="0" anchor="ctr"/>
-          <a:lstStyle/>
-          <a:p>
-            <a:pPr algn="ctr"/>
-            <a:endParaRPr lang="en-US"/>
-          </a:p>
-        </p:txBody>
-      </p:sp>
-      <p:sp>
-        <p:nvSpPr>
-          <p:cNvPr id="89" name="Rectangle 88">
-            <a:extLst>
-              <a:ext uri="{FF2B5EF4-FFF2-40B4-BE49-F238E27FC236}">
-                <a16:creationId xmlns:a16="http://schemas.microsoft.com/office/drawing/2014/main" id="{F7999FA9-DC1E-3F74-318E-D37793D791D8}"/>
-              </a:ext>
-            </a:extLst>
-          </p:cNvPr>
-          <p:cNvSpPr>
-            <a:spLocks/>
-          </p:cNvSpPr>
-          <p:nvPr/>
-        </p:nvSpPr>
-        <p:spPr>
-          <a:xfrm rot="10800000">
-            <a:off x="8161596" y="2059163"/>
-            <a:ext cx="1128038" cy="152401"/>
-          </a:xfrm>
-          <a:prstGeom prst="rect">
-            <a:avLst/>
-          </a:prstGeom>
-          <a:solidFill>
-            <a:srgbClr val="B2A138"/>
-          </a:solidFill>
-          <a:ln w="38100">
-            <a:solidFill>
-              <a:schemeClr val="tx1"/>
-            </a:solidFill>
-          </a:ln>
-        </p:spPr>
-        <p:style>
-          <a:lnRef idx="2">
-            <a:schemeClr val="accent1">
-              <a:shade val="15000"/>
-            </a:schemeClr>
-          </a:lnRef>
-          <a:fillRef idx="1">
-            <a:schemeClr val="accent1"/>
-          </a:fillRef>
-          <a:effectRef idx="0">
-            <a:schemeClr val="accent1"/>
-          </a:effectRef>
-          <a:fontRef idx="minor">
-            <a:schemeClr val="lt1"/>
-          </a:fontRef>
-        </p:style>
-        <p:txBody>
-          <a:bodyPr rtlCol="0" anchor="ctr"/>
-          <a:lstStyle/>
-          <a:p>
-            <a:pPr algn="ctr"/>
-            <a:endParaRPr lang="en-US"/>
-          </a:p>
-        </p:txBody>
-      </p:sp>
-      <p:sp>
-        <p:nvSpPr>
-          <p:cNvPr id="90" name="Rectangle 89">
-            <a:extLst>
-              <a:ext uri="{FF2B5EF4-FFF2-40B4-BE49-F238E27FC236}">
-                <a16:creationId xmlns:a16="http://schemas.microsoft.com/office/drawing/2014/main" id="{FAD8A02E-C9F2-FC57-D50E-F69D227C826E}"/>
-              </a:ext>
-            </a:extLst>
-          </p:cNvPr>
-          <p:cNvSpPr>
-            <a:spLocks/>
-          </p:cNvSpPr>
-          <p:nvPr/>
-        </p:nvSpPr>
-        <p:spPr>
-          <a:xfrm rot="10800000">
-            <a:off x="7030952" y="2059160"/>
-            <a:ext cx="1130642" cy="152401"/>
-          </a:xfrm>
-          <a:prstGeom prst="rect">
-            <a:avLst/>
-          </a:prstGeom>
-          <a:solidFill>
-            <a:srgbClr val="B2A138"/>
-          </a:solidFill>
-          <a:ln w="38100">
-            <a:solidFill>
-              <a:schemeClr val="tx1"/>
-            </a:solidFill>
-          </a:ln>
-        </p:spPr>
-        <p:style>
-          <a:lnRef idx="2">
-            <a:schemeClr val="accent1">
-              <a:shade val="15000"/>
-            </a:schemeClr>
-          </a:lnRef>
-          <a:fillRef idx="1">
-            <a:schemeClr val="accent1"/>
-          </a:fillRef>
-          <a:effectRef idx="0">
-            <a:schemeClr val="accent1"/>
-          </a:effectRef>
-          <a:fontRef idx="minor">
-            <a:schemeClr val="lt1"/>
-          </a:fontRef>
-        </p:style>
-        <p:txBody>
-          <a:bodyPr rtlCol="0" anchor="ctr"/>
-          <a:lstStyle/>
-          <a:p>
-            <a:pPr algn="ctr"/>
-            <a:endParaRPr lang="en-US"/>
-          </a:p>
-        </p:txBody>
-      </p:sp>
       <p:grpSp>
         <p:nvGrpSpPr>
           <p:cNvPr id="29" name="Group 28">
@@ -7249,10 +7025,10 @@
         </p:nvGrpSpPr>
         <p:grpSpPr>
           <a:xfrm rot="16200000">
-            <a:off x="8358280" y="1418408"/>
-            <a:ext cx="834836" cy="2980411"/>
-            <a:chOff x="2604470" y="1176799"/>
-            <a:chExt cx="834836" cy="2862543"/>
+            <a:off x="8608394" y="1363590"/>
+            <a:ext cx="465505" cy="2980411"/>
+            <a:chOff x="2973801" y="1176799"/>
+            <a:chExt cx="465505" cy="2862543"/>
           </a:xfrm>
         </p:grpSpPr>
         <p:sp>
@@ -7269,8 +7045,8 @@
           </p:nvSpPr>
           <p:spPr>
             <a:xfrm rot="5400000">
-              <a:off x="2708242" y="1073027"/>
-              <a:ext cx="623454" cy="830997"/>
+              <a:off x="2892908" y="1257693"/>
+              <a:ext cx="623454" cy="461665"/>
             </a:xfrm>
             <a:prstGeom prst="rect">
               <a:avLst/>
@@ -7292,7 +7068,7 @@
                     </a:solidFill>
                   </a:ln>
                   <a:solidFill>
-                    <a:srgbClr val="551A8B"/>
+                    <a:srgbClr val="9647DD"/>
                   </a:solidFill>
                 </a:rPr>
                 <a:t>MR</a:t>
@@ -7382,7 +7158,7 @@
                     </a:solidFill>
                   </a:ln>
                   <a:solidFill>
-                    <a:srgbClr val="551A8B"/>
+                    <a:srgbClr val="9647DD"/>
                   </a:solidFill>
                 </a:rPr>
                 <a:t>LR</a:t>
@@ -7391,6 +7167,480 @@
           </p:txBody>
         </p:sp>
       </p:grpSp>
+      <p:sp>
+        <p:nvSpPr>
+          <p:cNvPr id="101" name="Rectangle 100">
+            <a:extLst>
+              <a:ext uri="{FF2B5EF4-FFF2-40B4-BE49-F238E27FC236}">
+                <a16:creationId xmlns:a16="http://schemas.microsoft.com/office/drawing/2014/main" id="{348E5E79-AB37-8271-78B2-563A549C34AB}"/>
+              </a:ext>
+            </a:extLst>
+          </p:cNvPr>
+          <p:cNvSpPr/>
+          <p:nvPr/>
+        </p:nvSpPr>
+        <p:spPr>
+          <a:xfrm>
+            <a:off x="2114420" y="1668780"/>
+            <a:ext cx="125865" cy="3356610"/>
+          </a:xfrm>
+          <a:prstGeom prst="rect">
+            <a:avLst/>
+          </a:prstGeom>
+          <a:solidFill>
+            <a:srgbClr val="B2A138"/>
+          </a:solidFill>
+          <a:ln w="38100">
+            <a:noFill/>
+          </a:ln>
+        </p:spPr>
+        <p:style>
+          <a:lnRef idx="2">
+            <a:schemeClr val="accent1">
+              <a:shade val="15000"/>
+            </a:schemeClr>
+          </a:lnRef>
+          <a:fillRef idx="1">
+            <a:schemeClr val="accent1"/>
+          </a:fillRef>
+          <a:effectRef idx="0">
+            <a:schemeClr val="accent1"/>
+          </a:effectRef>
+          <a:fontRef idx="minor">
+            <a:schemeClr val="lt1"/>
+          </a:fontRef>
+        </p:style>
+        <p:txBody>
+          <a:bodyPr rtlCol="0" anchor="ctr"/>
+          <a:lstStyle/>
+          <a:p>
+            <a:pPr algn="ctr"/>
+            <a:endParaRPr lang="en-US"/>
+          </a:p>
+        </p:txBody>
+      </p:sp>
+      <p:cxnSp>
+        <p:nvCxnSpPr>
+          <p:cNvPr id="33" name="Straight Connector 32">
+            <a:extLst>
+              <a:ext uri="{FF2B5EF4-FFF2-40B4-BE49-F238E27FC236}">
+                <a16:creationId xmlns:a16="http://schemas.microsoft.com/office/drawing/2014/main" id="{7188D5E3-F90C-0F18-4B5A-E27C09BAEC21}"/>
+              </a:ext>
+            </a:extLst>
+          </p:cNvPr>
+          <p:cNvCxnSpPr>
+            <a:cxnSpLocks/>
+          </p:cNvCxnSpPr>
+          <p:nvPr/>
+        </p:nvCxnSpPr>
+        <p:spPr>
+          <a:xfrm>
+            <a:off x="2108672" y="1651050"/>
+            <a:ext cx="0" cy="3390639"/>
+          </a:xfrm>
+          <a:prstGeom prst="line">
+            <a:avLst/>
+          </a:prstGeom>
+          <a:ln>
+            <a:solidFill>
+              <a:schemeClr val="tx1"/>
+            </a:solidFill>
+            <a:prstDash val="dash"/>
+          </a:ln>
+        </p:spPr>
+        <p:style>
+          <a:lnRef idx="2">
+            <a:schemeClr val="accent1"/>
+          </a:lnRef>
+          <a:fillRef idx="0">
+            <a:schemeClr val="accent1"/>
+          </a:fillRef>
+          <a:effectRef idx="1">
+            <a:schemeClr val="accent1"/>
+          </a:effectRef>
+          <a:fontRef idx="minor">
+            <a:schemeClr val="tx1"/>
+          </a:fontRef>
+        </p:style>
+      </p:cxnSp>
+      <p:sp>
+        <p:nvSpPr>
+          <p:cNvPr id="103" name="Rectangle 102">
+            <a:extLst>
+              <a:ext uri="{FF2B5EF4-FFF2-40B4-BE49-F238E27FC236}">
+                <a16:creationId xmlns:a16="http://schemas.microsoft.com/office/drawing/2014/main" id="{25B53203-9B4A-D820-0F2F-A8BC2C925D5E}"/>
+              </a:ext>
+            </a:extLst>
+          </p:cNvPr>
+          <p:cNvSpPr/>
+          <p:nvPr/>
+        </p:nvSpPr>
+        <p:spPr>
+          <a:xfrm rot="5400000">
+            <a:off x="8160803" y="2858348"/>
+            <a:ext cx="130639" cy="3369258"/>
+          </a:xfrm>
+          <a:prstGeom prst="rect">
+            <a:avLst/>
+          </a:prstGeom>
+          <a:solidFill>
+            <a:srgbClr val="B2A138"/>
+          </a:solidFill>
+          <a:ln w="38100">
+            <a:noFill/>
+          </a:ln>
+        </p:spPr>
+        <p:style>
+          <a:lnRef idx="2">
+            <a:schemeClr val="accent1">
+              <a:shade val="15000"/>
+            </a:schemeClr>
+          </a:lnRef>
+          <a:fillRef idx="1">
+            <a:schemeClr val="accent1"/>
+          </a:fillRef>
+          <a:effectRef idx="0">
+            <a:schemeClr val="accent1"/>
+          </a:effectRef>
+          <a:fontRef idx="minor">
+            <a:schemeClr val="lt1"/>
+          </a:fontRef>
+        </p:style>
+        <p:txBody>
+          <a:bodyPr rtlCol="0" anchor="ctr"/>
+          <a:lstStyle/>
+          <a:p>
+            <a:pPr algn="ctr"/>
+            <a:endParaRPr lang="en-US"/>
+          </a:p>
+        </p:txBody>
+      </p:sp>
+      <p:cxnSp>
+        <p:nvCxnSpPr>
+          <p:cNvPr id="104" name="Straight Connector 103">
+            <a:extLst>
+              <a:ext uri="{FF2B5EF4-FFF2-40B4-BE49-F238E27FC236}">
+                <a16:creationId xmlns:a16="http://schemas.microsoft.com/office/drawing/2014/main" id="{7A86023C-5D3C-34CB-C5BE-6BFD78DDF785}"/>
+              </a:ext>
+            </a:extLst>
+          </p:cNvPr>
+          <p:cNvCxnSpPr>
+            <a:cxnSpLocks/>
+          </p:cNvCxnSpPr>
+          <p:nvPr/>
+        </p:nvCxnSpPr>
+        <p:spPr>
+          <a:xfrm rot="5400000">
+            <a:off x="8229609" y="2912977"/>
+            <a:ext cx="0" cy="3390639"/>
+          </a:xfrm>
+          <a:prstGeom prst="line">
+            <a:avLst/>
+          </a:prstGeom>
+          <a:ln>
+            <a:solidFill>
+              <a:schemeClr val="tx1"/>
+            </a:solidFill>
+            <a:prstDash val="dash"/>
+          </a:ln>
+        </p:spPr>
+        <p:style>
+          <a:lnRef idx="2">
+            <a:schemeClr val="accent1"/>
+          </a:lnRef>
+          <a:fillRef idx="0">
+            <a:schemeClr val="accent1"/>
+          </a:fillRef>
+          <a:effectRef idx="1">
+            <a:schemeClr val="accent1"/>
+          </a:effectRef>
+          <a:fontRef idx="minor">
+            <a:schemeClr val="tx1"/>
+          </a:fontRef>
+        </p:style>
+      </p:cxnSp>
+      <p:sp>
+        <p:nvSpPr>
+          <p:cNvPr id="106" name="Rectangle 105">
+            <a:extLst>
+              <a:ext uri="{FF2B5EF4-FFF2-40B4-BE49-F238E27FC236}">
+                <a16:creationId xmlns:a16="http://schemas.microsoft.com/office/drawing/2014/main" id="{8E699463-17BE-F959-8DEF-06DD220AB98E}"/>
+              </a:ext>
+            </a:extLst>
+          </p:cNvPr>
+          <p:cNvSpPr/>
+          <p:nvPr/>
+        </p:nvSpPr>
+        <p:spPr>
+          <a:xfrm rot="5400000">
+            <a:off x="8721140" y="583352"/>
+            <a:ext cx="130639" cy="3357842"/>
+          </a:xfrm>
+          <a:prstGeom prst="rect">
+            <a:avLst/>
+          </a:prstGeom>
+          <a:solidFill>
+            <a:srgbClr val="B2A138"/>
+          </a:solidFill>
+          <a:ln w="38100">
+            <a:noFill/>
+          </a:ln>
+        </p:spPr>
+        <p:style>
+          <a:lnRef idx="2">
+            <a:schemeClr val="accent1">
+              <a:shade val="15000"/>
+            </a:schemeClr>
+          </a:lnRef>
+          <a:fillRef idx="1">
+            <a:schemeClr val="accent1"/>
+          </a:fillRef>
+          <a:effectRef idx="0">
+            <a:schemeClr val="accent1"/>
+          </a:effectRef>
+          <a:fontRef idx="minor">
+            <a:schemeClr val="lt1"/>
+          </a:fontRef>
+        </p:style>
+        <p:txBody>
+          <a:bodyPr rtlCol="0" anchor="ctr"/>
+          <a:lstStyle/>
+          <a:p>
+            <a:pPr algn="ctr"/>
+            <a:endParaRPr lang="en-US"/>
+          </a:p>
+        </p:txBody>
+      </p:sp>
+      <p:cxnSp>
+        <p:nvCxnSpPr>
+          <p:cNvPr id="107" name="Straight Connector 106">
+            <a:extLst>
+              <a:ext uri="{FF2B5EF4-FFF2-40B4-BE49-F238E27FC236}">
+                <a16:creationId xmlns:a16="http://schemas.microsoft.com/office/drawing/2014/main" id="{54FCD408-5959-420B-D276-1CFE85279280}"/>
+              </a:ext>
+            </a:extLst>
+          </p:cNvPr>
+          <p:cNvCxnSpPr>
+            <a:cxnSpLocks/>
+          </p:cNvCxnSpPr>
+          <p:nvPr/>
+        </p:nvCxnSpPr>
+        <p:spPr>
+          <a:xfrm rot="5400000">
+            <a:off x="8802857" y="495587"/>
+            <a:ext cx="0" cy="3390639"/>
+          </a:xfrm>
+          <a:prstGeom prst="line">
+            <a:avLst/>
+          </a:prstGeom>
+          <a:ln>
+            <a:solidFill>
+              <a:schemeClr val="tx1"/>
+            </a:solidFill>
+            <a:prstDash val="dash"/>
+          </a:ln>
+        </p:spPr>
+        <p:style>
+          <a:lnRef idx="2">
+            <a:schemeClr val="accent1"/>
+          </a:lnRef>
+          <a:fillRef idx="0">
+            <a:schemeClr val="accent1"/>
+          </a:fillRef>
+          <a:effectRef idx="1">
+            <a:schemeClr val="accent1"/>
+          </a:effectRef>
+          <a:fontRef idx="minor">
+            <a:schemeClr val="tx1"/>
+          </a:fontRef>
+        </p:style>
+      </p:cxnSp>
+      <p:sp>
+        <p:nvSpPr>
+          <p:cNvPr id="108" name="Right Brace 107">
+            <a:extLst>
+              <a:ext uri="{FF2B5EF4-FFF2-40B4-BE49-F238E27FC236}">
+                <a16:creationId xmlns:a16="http://schemas.microsoft.com/office/drawing/2014/main" id="{181A68F4-130B-6BE2-430D-5A3A501C45E7}"/>
+              </a:ext>
+            </a:extLst>
+          </p:cNvPr>
+          <p:cNvSpPr/>
+          <p:nvPr/>
+        </p:nvSpPr>
+        <p:spPr>
+          <a:xfrm rot="5400000">
+            <a:off x="3724529" y="5636539"/>
+            <a:ext cx="225704" cy="214647"/>
+          </a:xfrm>
+          <a:prstGeom prst="rightBrace">
+            <a:avLst>
+              <a:gd name="adj1" fmla="val 19378"/>
+              <a:gd name="adj2" fmla="val 49404"/>
+            </a:avLst>
+          </a:prstGeom>
+          <a:ln w="28575"/>
+        </p:spPr>
+        <p:style>
+          <a:lnRef idx="2">
+            <a:schemeClr val="dk1"/>
+          </a:lnRef>
+          <a:fillRef idx="0">
+            <a:schemeClr val="dk1"/>
+          </a:fillRef>
+          <a:effectRef idx="1">
+            <a:schemeClr val="dk1"/>
+          </a:effectRef>
+          <a:fontRef idx="minor">
+            <a:schemeClr val="tx1"/>
+          </a:fontRef>
+        </p:style>
+        <p:txBody>
+          <a:bodyPr rtlCol="0" anchor="ctr"/>
+          <a:lstStyle/>
+          <a:p>
+            <a:pPr algn="ctr"/>
+            <a:endParaRPr lang="en-US"/>
+          </a:p>
+        </p:txBody>
+      </p:sp>
+      <p:sp>
+        <p:nvSpPr>
+          <p:cNvPr id="109" name="TextBox 108">
+            <a:extLst>
+              <a:ext uri="{FF2B5EF4-FFF2-40B4-BE49-F238E27FC236}">
+                <a16:creationId xmlns:a16="http://schemas.microsoft.com/office/drawing/2014/main" id="{76F0D07D-7CC9-74BF-A018-49FE35AEC1AA}"/>
+              </a:ext>
+            </a:extLst>
+          </p:cNvPr>
+          <p:cNvSpPr txBox="1"/>
+          <p:nvPr/>
+        </p:nvSpPr>
+        <p:spPr>
+          <a:xfrm>
+            <a:off x="1473453" y="5326654"/>
+            <a:ext cx="1458577" cy="707886"/>
+          </a:xfrm>
+          <a:prstGeom prst="rect">
+            <a:avLst/>
+          </a:prstGeom>
+          <a:noFill/>
+        </p:spPr>
+        <p:txBody>
+          <a:bodyPr wrap="square" rtlCol="0">
+            <a:spAutoFit/>
+          </a:bodyPr>
+          <a:lstStyle/>
+          <a:p>
+            <a:pPr algn="ctr"/>
+            <a:r>
+              <a:rPr lang="en-US" sz="2000" b="1" dirty="0">
+                <a:ln>
+                  <a:solidFill>
+                    <a:schemeClr val="tx1"/>
+                  </a:solidFill>
+                </a:ln>
+              </a:rPr>
+              <a:t>ecotone transect</a:t>
+            </a:r>
+          </a:p>
+        </p:txBody>
+      </p:sp>
+      <p:sp>
+        <p:nvSpPr>
+          <p:cNvPr id="110" name="Rectangle 109">
+            <a:extLst>
+              <a:ext uri="{FF2B5EF4-FFF2-40B4-BE49-F238E27FC236}">
+                <a16:creationId xmlns:a16="http://schemas.microsoft.com/office/drawing/2014/main" id="{546BBFAC-66D5-EF0F-8D3B-1EE12852A6AA}"/>
+              </a:ext>
+            </a:extLst>
+          </p:cNvPr>
+          <p:cNvSpPr/>
+          <p:nvPr/>
+        </p:nvSpPr>
+        <p:spPr>
+          <a:xfrm>
+            <a:off x="4383635" y="2234030"/>
+            <a:ext cx="138052" cy="3356610"/>
+          </a:xfrm>
+          <a:prstGeom prst="rect">
+            <a:avLst/>
+          </a:prstGeom>
+          <a:solidFill>
+            <a:srgbClr val="B2A138"/>
+          </a:solidFill>
+          <a:ln w="38100">
+            <a:noFill/>
+          </a:ln>
+        </p:spPr>
+        <p:style>
+          <a:lnRef idx="2">
+            <a:schemeClr val="accent1">
+              <a:shade val="15000"/>
+            </a:schemeClr>
+          </a:lnRef>
+          <a:fillRef idx="1">
+            <a:schemeClr val="accent1"/>
+          </a:fillRef>
+          <a:effectRef idx="0">
+            <a:schemeClr val="accent1"/>
+          </a:effectRef>
+          <a:fontRef idx="minor">
+            <a:schemeClr val="lt1"/>
+          </a:fontRef>
+        </p:style>
+        <p:txBody>
+          <a:bodyPr rtlCol="0" anchor="ctr"/>
+          <a:lstStyle/>
+          <a:p>
+            <a:pPr algn="ctr"/>
+            <a:endParaRPr lang="en-US"/>
+          </a:p>
+        </p:txBody>
+      </p:sp>
+      <p:cxnSp>
+        <p:nvCxnSpPr>
+          <p:cNvPr id="95" name="Straight Connector 94">
+            <a:extLst>
+              <a:ext uri="{FF2B5EF4-FFF2-40B4-BE49-F238E27FC236}">
+                <a16:creationId xmlns:a16="http://schemas.microsoft.com/office/drawing/2014/main" id="{23083EAD-2061-DEC4-375C-05308F22EAEA}"/>
+              </a:ext>
+            </a:extLst>
+          </p:cNvPr>
+          <p:cNvCxnSpPr>
+            <a:cxnSpLocks/>
+          </p:cNvCxnSpPr>
+          <p:nvPr/>
+        </p:nvCxnSpPr>
+        <p:spPr>
+          <a:xfrm>
+            <a:off x="4521687" y="2217015"/>
+            <a:ext cx="0" cy="3390639"/>
+          </a:xfrm>
+          <a:prstGeom prst="line">
+            <a:avLst/>
+          </a:prstGeom>
+          <a:ln>
+            <a:solidFill>
+              <a:schemeClr val="tx1"/>
+            </a:solidFill>
+            <a:prstDash val="dash"/>
+          </a:ln>
+        </p:spPr>
+        <p:style>
+          <a:lnRef idx="2">
+            <a:schemeClr val="accent1"/>
+          </a:lnRef>
+          <a:fillRef idx="0">
+            <a:schemeClr val="accent1"/>
+          </a:fillRef>
+          <a:effectRef idx="1">
+            <a:schemeClr val="accent1"/>
+          </a:effectRef>
+          <a:fontRef idx="minor">
+            <a:schemeClr val="tx1"/>
+          </a:fontRef>
+        </p:style>
+      </p:cxnSp>
     </p:spTree>
     <p:extLst>
       <p:ext uri="{BB962C8B-B14F-4D97-AF65-F5344CB8AC3E}">
@@ -7717,4 +7967,319 @@
     </a:ext>
   </a:extLst>
 </a:theme>
+</file>
+
+<file path=ppt/theme/theme2.xml><?xml version="1.0" encoding="utf-8"?>
+<a:theme xmlns:a="http://schemas.openxmlformats.org/drawingml/2006/main" name="Office Theme">
+  <a:themeElements>
+    <a:clrScheme name="Office">
+      <a:dk1>
+        <a:sysClr val="windowText" lastClr="000000"/>
+      </a:dk1>
+      <a:lt1>
+        <a:sysClr val="window" lastClr="FFFFFF"/>
+      </a:lt1>
+      <a:dk2>
+        <a:srgbClr val="0E2841"/>
+      </a:dk2>
+      <a:lt2>
+        <a:srgbClr val="E8E8E8"/>
+      </a:lt2>
+      <a:accent1>
+        <a:srgbClr val="156082"/>
+      </a:accent1>
+      <a:accent2>
+        <a:srgbClr val="E97132"/>
+      </a:accent2>
+      <a:accent3>
+        <a:srgbClr val="196B24"/>
+      </a:accent3>
+      <a:accent4>
+        <a:srgbClr val="0F9ED5"/>
+      </a:accent4>
+      <a:accent5>
+        <a:srgbClr val="A02B93"/>
+      </a:accent5>
+      <a:accent6>
+        <a:srgbClr val="4EA72E"/>
+      </a:accent6>
+      <a:hlink>
+        <a:srgbClr val="467886"/>
+      </a:hlink>
+      <a:folHlink>
+        <a:srgbClr val="96607D"/>
+      </a:folHlink>
+    </a:clrScheme>
+    <a:fontScheme name="Office">
+      <a:majorFont>
+        <a:latin typeface="Aptos Display" panose="02110004020202020204"/>
+        <a:ea typeface=""/>
+        <a:cs typeface=""/>
+        <a:font script="Jpan" typeface="游ゴシック Light"/>
+        <a:font script="Hang" typeface="맑은 고딕"/>
+        <a:font script="Hans" typeface="等线 Light"/>
+        <a:font script="Hant" typeface="新細明體"/>
+        <a:font script="Arab" typeface="Times New Roman"/>
+        <a:font script="Hebr" typeface="Times New Roman"/>
+        <a:font script="Thai" typeface="Angsana New"/>
+        <a:font script="Ethi" typeface="Nyala"/>
+        <a:font script="Beng" typeface="Vrinda"/>
+        <a:font script="Gujr" typeface="Shruti"/>
+        <a:font script="Khmr" typeface="MoolBoran"/>
+        <a:font script="Knda" typeface="Tunga"/>
+        <a:font script="Guru" typeface="Raavi"/>
+        <a:font script="Cans" typeface="Euphemia"/>
+        <a:font script="Cher" typeface="Plantagenet Cherokee"/>
+        <a:font script="Yiii" typeface="Microsoft Yi Baiti"/>
+        <a:font script="Tibt" typeface="Microsoft Himalaya"/>
+        <a:font script="Thaa" typeface="MV Boli"/>
+        <a:font script="Deva" typeface="Mangal"/>
+        <a:font script="Telu" typeface="Gautami"/>
+        <a:font script="Taml" typeface="Latha"/>
+        <a:font script="Syrc" typeface="Estrangelo Edessa"/>
+        <a:font script="Orya" typeface="Kalinga"/>
+        <a:font script="Mlym" typeface="Kartika"/>
+        <a:font script="Laoo" typeface="DokChampa"/>
+        <a:font script="Sinh" typeface="Iskoola Pota"/>
+        <a:font script="Mong" typeface="Mongolian Baiti"/>
+        <a:font script="Viet" typeface="Times New Roman"/>
+        <a:font script="Uigh" typeface="Microsoft Uighur"/>
+        <a:font script="Geor" typeface="Sylfaen"/>
+        <a:font script="Armn" typeface="Arial"/>
+        <a:font script="Bugi" typeface="Leelawadee UI"/>
+        <a:font script="Bopo" typeface="Microsoft JhengHei"/>
+        <a:font script="Java" typeface="Javanese Text"/>
+        <a:font script="Lisu" typeface="Segoe UI"/>
+        <a:font script="Mymr" typeface="Myanmar Text"/>
+        <a:font script="Nkoo" typeface="Ebrima"/>
+        <a:font script="Olck" typeface="Nirmala UI"/>
+        <a:font script="Osma" typeface="Ebrima"/>
+        <a:font script="Phag" typeface="Phagspa"/>
+        <a:font script="Syrn" typeface="Estrangelo Edessa"/>
+        <a:font script="Syrj" typeface="Estrangelo Edessa"/>
+        <a:font script="Syre" typeface="Estrangelo Edessa"/>
+        <a:font script="Sora" typeface="Nirmala UI"/>
+        <a:font script="Tale" typeface="Microsoft Tai Le"/>
+        <a:font script="Talu" typeface="Microsoft New Tai Lue"/>
+        <a:font script="Tfng" typeface="Ebrima"/>
+      </a:majorFont>
+      <a:minorFont>
+        <a:latin typeface="Aptos" panose="02110004020202020204"/>
+        <a:ea typeface=""/>
+        <a:cs typeface=""/>
+        <a:font script="Jpan" typeface="游ゴシック"/>
+        <a:font script="Hang" typeface="맑은 고딕"/>
+        <a:font script="Hans" typeface="等线"/>
+        <a:font script="Hant" typeface="新細明體"/>
+        <a:font script="Arab" typeface="Arial"/>
+        <a:font script="Hebr" typeface="Arial"/>
+        <a:font script="Thai" typeface="Cordia New"/>
+        <a:font script="Ethi" typeface="Nyala"/>
+        <a:font script="Beng" typeface="Vrinda"/>
+        <a:font script="Gujr" typeface="Shruti"/>
+        <a:font script="Khmr" typeface="DaunPenh"/>
+        <a:font script="Knda" typeface="Tunga"/>
+        <a:font script="Guru" typeface="Raavi"/>
+        <a:font script="Cans" typeface="Euphemia"/>
+        <a:font script="Cher" typeface="Plantagenet Cherokee"/>
+        <a:font script="Yiii" typeface="Microsoft Yi Baiti"/>
+        <a:font script="Tibt" typeface="Microsoft Himalaya"/>
+        <a:font script="Thaa" typeface="MV Boli"/>
+        <a:font script="Deva" typeface="Mangal"/>
+        <a:font script="Telu" typeface="Gautami"/>
+        <a:font script="Taml" typeface="Latha"/>
+        <a:font script="Syrc" typeface="Estrangelo Edessa"/>
+        <a:font script="Orya" typeface="Kalinga"/>
+        <a:font script="Mlym" typeface="Kartika"/>
+        <a:font script="Laoo" typeface="DokChampa"/>
+        <a:font script="Sinh" typeface="Iskoola Pota"/>
+        <a:font script="Mong" typeface="Mongolian Baiti"/>
+        <a:font script="Viet" typeface="Arial"/>
+        <a:font script="Uigh" typeface="Microsoft Uighur"/>
+        <a:font script="Geor" typeface="Sylfaen"/>
+        <a:font script="Armn" typeface="Arial"/>
+        <a:font script="Bugi" typeface="Leelawadee UI"/>
+        <a:font script="Bopo" typeface="Microsoft JhengHei"/>
+        <a:font script="Java" typeface="Javanese Text"/>
+        <a:font script="Lisu" typeface="Segoe UI"/>
+        <a:font script="Mymr" typeface="Myanmar Text"/>
+        <a:font script="Nkoo" typeface="Ebrima"/>
+        <a:font script="Olck" typeface="Nirmala UI"/>
+        <a:font script="Osma" typeface="Ebrima"/>
+        <a:font script="Phag" typeface="Phagspa"/>
+        <a:font script="Syrn" typeface="Estrangelo Edessa"/>
+        <a:font script="Syrj" typeface="Estrangelo Edessa"/>
+        <a:font script="Syre" typeface="Estrangelo Edessa"/>
+        <a:font script="Sora" typeface="Nirmala UI"/>
+        <a:font script="Tale" typeface="Microsoft Tai Le"/>
+        <a:font script="Talu" typeface="Microsoft New Tai Lue"/>
+        <a:font script="Tfng" typeface="Ebrima"/>
+      </a:minorFont>
+    </a:fontScheme>
+    <a:fmtScheme name="Office">
+      <a:fillStyleLst>
+        <a:solidFill>
+          <a:schemeClr val="phClr"/>
+        </a:solidFill>
+        <a:gradFill rotWithShape="1">
+          <a:gsLst>
+            <a:gs pos="0">
+              <a:schemeClr val="phClr">
+                <a:lumMod val="110000"/>
+                <a:satMod val="105000"/>
+                <a:tint val="67000"/>
+              </a:schemeClr>
+            </a:gs>
+            <a:gs pos="50000">
+              <a:schemeClr val="phClr">
+                <a:lumMod val="105000"/>
+                <a:satMod val="103000"/>
+                <a:tint val="73000"/>
+              </a:schemeClr>
+            </a:gs>
+            <a:gs pos="100000">
+              <a:schemeClr val="phClr">
+                <a:lumMod val="105000"/>
+                <a:satMod val="109000"/>
+                <a:tint val="81000"/>
+              </a:schemeClr>
+            </a:gs>
+          </a:gsLst>
+          <a:lin ang="5400000" scaled="0"/>
+        </a:gradFill>
+        <a:gradFill rotWithShape="1">
+          <a:gsLst>
+            <a:gs pos="0">
+              <a:schemeClr val="phClr">
+                <a:satMod val="103000"/>
+                <a:lumMod val="102000"/>
+                <a:tint val="94000"/>
+              </a:schemeClr>
+            </a:gs>
+            <a:gs pos="50000">
+              <a:schemeClr val="phClr">
+                <a:satMod val="110000"/>
+                <a:lumMod val="100000"/>
+                <a:shade val="100000"/>
+              </a:schemeClr>
+            </a:gs>
+            <a:gs pos="100000">
+              <a:schemeClr val="phClr">
+                <a:lumMod val="99000"/>
+                <a:satMod val="120000"/>
+                <a:shade val="78000"/>
+              </a:schemeClr>
+            </a:gs>
+          </a:gsLst>
+          <a:lin ang="5400000" scaled="0"/>
+        </a:gradFill>
+      </a:fillStyleLst>
+      <a:lnStyleLst>
+        <a:ln w="12700" cap="flat" cmpd="sng" algn="ctr">
+          <a:solidFill>
+            <a:schemeClr val="phClr"/>
+          </a:solidFill>
+          <a:prstDash val="solid"/>
+          <a:miter lim="800000"/>
+        </a:ln>
+        <a:ln w="19050" cap="flat" cmpd="sng" algn="ctr">
+          <a:solidFill>
+            <a:schemeClr val="phClr"/>
+          </a:solidFill>
+          <a:prstDash val="solid"/>
+          <a:miter lim="800000"/>
+        </a:ln>
+        <a:ln w="25400" cap="flat" cmpd="sng" algn="ctr">
+          <a:solidFill>
+            <a:schemeClr val="phClr"/>
+          </a:solidFill>
+          <a:prstDash val="solid"/>
+          <a:miter lim="800000"/>
+        </a:ln>
+      </a:lnStyleLst>
+      <a:effectStyleLst>
+        <a:effectStyle>
+          <a:effectLst/>
+        </a:effectStyle>
+        <a:effectStyle>
+          <a:effectLst/>
+        </a:effectStyle>
+        <a:effectStyle>
+          <a:effectLst>
+            <a:outerShdw blurRad="57150" dist="19050" dir="5400000" algn="ctr" rotWithShape="0">
+              <a:srgbClr val="000000">
+                <a:alpha val="63000"/>
+              </a:srgbClr>
+            </a:outerShdw>
+          </a:effectLst>
+        </a:effectStyle>
+      </a:effectStyleLst>
+      <a:bgFillStyleLst>
+        <a:solidFill>
+          <a:schemeClr val="phClr"/>
+        </a:solidFill>
+        <a:solidFill>
+          <a:schemeClr val="phClr">
+            <a:tint val="95000"/>
+            <a:satMod val="170000"/>
+          </a:schemeClr>
+        </a:solidFill>
+        <a:gradFill rotWithShape="1">
+          <a:gsLst>
+            <a:gs pos="0">
+              <a:schemeClr val="phClr">
+                <a:tint val="93000"/>
+                <a:satMod val="150000"/>
+                <a:shade val="98000"/>
+                <a:lumMod val="102000"/>
+              </a:schemeClr>
+            </a:gs>
+            <a:gs pos="50000">
+              <a:schemeClr val="phClr">
+                <a:tint val="98000"/>
+                <a:satMod val="130000"/>
+                <a:shade val="90000"/>
+                <a:lumMod val="103000"/>
+              </a:schemeClr>
+            </a:gs>
+            <a:gs pos="100000">
+              <a:schemeClr val="phClr">
+                <a:shade val="63000"/>
+                <a:satMod val="120000"/>
+              </a:schemeClr>
+            </a:gs>
+          </a:gsLst>
+          <a:lin ang="5400000" scaled="0"/>
+        </a:gradFill>
+      </a:bgFillStyleLst>
+    </a:fmtScheme>
+  </a:themeElements>
+  <a:objectDefaults>
+    <a:lnDef>
+      <a:spPr/>
+      <a:bodyPr/>
+      <a:lstStyle/>
+      <a:style>
+        <a:lnRef idx="2">
+          <a:schemeClr val="accent1"/>
+        </a:lnRef>
+        <a:fillRef idx="0">
+          <a:schemeClr val="accent1"/>
+        </a:fillRef>
+        <a:effectRef idx="1">
+          <a:schemeClr val="accent1"/>
+        </a:effectRef>
+        <a:fontRef idx="minor">
+          <a:schemeClr val="tx1"/>
+        </a:fontRef>
+      </a:style>
+    </a:lnDef>
+  </a:objectDefaults>
+  <a:extraClrSchemeLst/>
+  <a:extLst>
+    <a:ext uri="{05A4C25C-085E-4340-85A3-A5531E510DB2}">
+      <thm15:themeFamily xmlns:thm15="http://schemas.microsoft.com/office/thememl/2012/main" name="Office Theme" id="{2E142A2C-CD16-42D6-873A-C26D2A0506FA}" vid="{1BDDFF52-6CD6-40A5-AB3C-68EB2F1E4D0A}"/>
+    </a:ext>
+  </a:extLst>
+</a:theme>
 </file>
</xml_diff>